<commit_message>
+ Add tcp/ip problem
</commit_message>
<xml_diff>
--- a/后台开发面经_示意图.pptx
+++ b/后台开发面经_示意图.pptx
@@ -5,10 +5,12 @@
     <p:sldMasterId id="2147483648" r:id="rId1"/>
   </p:sldMasterIdLst>
   <p:notesMasterIdLst>
-    <p:notesMasterId r:id="rId3"/>
+    <p:notesMasterId r:id="rId5"/>
   </p:notesMasterIdLst>
   <p:sldIdLst>
     <p:sldId id="257" r:id="rId2"/>
+    <p:sldId id="258" r:id="rId3"/>
+    <p:sldId id="259" r:id="rId4"/>
   </p:sldIdLst>
   <p:sldSz cx="12192000" cy="6858000"/>
   <p:notesSz cx="6858000" cy="9144000"/>
@@ -197,7 +199,7 @@
           <a:p>
             <a:fld id="{BBE84FB9-738E-406C-B12B-1B1469D7165C}" type="datetimeFigureOut">
               <a:rPr lang="zh-CN" altLang="en-US" smtClean="0"/>
-              <a:t>2021/1/25</a:t>
+              <a:t>2021/2/8</a:t>
             </a:fld>
             <a:endParaRPr lang="zh-CN" altLang="en-US"/>
           </a:p>
@@ -555,6 +557,188 @@
 </p:notes>
 </file>
 
+<file path=ppt/notesSlides/notesSlide2.xml><?xml version="1.0" encoding="utf-8"?>
+<p:notes xmlns:a="http://schemas.openxmlformats.org/drawingml/2006/main" xmlns:r="http://schemas.openxmlformats.org/officeDocument/2006/relationships" xmlns:p="http://schemas.openxmlformats.org/presentationml/2006/main">
+  <p:cSld>
+    <p:spTree>
+      <p:nvGrpSpPr>
+        <p:cNvPr id="1" name=""/>
+        <p:cNvGrpSpPr/>
+        <p:nvPr/>
+      </p:nvGrpSpPr>
+      <p:grpSpPr>
+        <a:xfrm>
+          <a:off x="0" y="0"/>
+          <a:ext cx="0" cy="0"/>
+          <a:chOff x="0" y="0"/>
+          <a:chExt cx="0" cy="0"/>
+        </a:xfrm>
+      </p:grpSpPr>
+      <p:sp>
+        <p:nvSpPr>
+          <p:cNvPr id="2" name="幻灯片图像占位符 1"/>
+          <p:cNvSpPr>
+            <a:spLocks noGrp="1" noRot="1" noChangeAspect="1"/>
+          </p:cNvSpPr>
+          <p:nvPr>
+            <p:ph type="sldImg"/>
+          </p:nvPr>
+        </p:nvSpPr>
+        <p:spPr/>
+      </p:sp>
+      <p:sp>
+        <p:nvSpPr>
+          <p:cNvPr id="3" name="备注占位符 2"/>
+          <p:cNvSpPr>
+            <a:spLocks noGrp="1"/>
+          </p:cNvSpPr>
+          <p:nvPr>
+            <p:ph type="body" idx="1"/>
+          </p:nvPr>
+        </p:nvSpPr>
+        <p:spPr/>
+        <p:txBody>
+          <a:bodyPr/>
+          <a:lstStyle/>
+          <a:p>
+            <a:r>
+              <a:rPr lang="en-US" altLang="zh-CN" dirty="0"/>
+              <a:t>TCP </a:t>
+            </a:r>
+            <a:r>
+              <a:rPr lang="zh-CN" altLang="en-US" dirty="0"/>
+              <a:t>三次握手</a:t>
+            </a:r>
+          </a:p>
+        </p:txBody>
+      </p:sp>
+      <p:sp>
+        <p:nvSpPr>
+          <p:cNvPr id="4" name="灯片编号占位符 3"/>
+          <p:cNvSpPr>
+            <a:spLocks noGrp="1"/>
+          </p:cNvSpPr>
+          <p:nvPr>
+            <p:ph type="sldNum" sz="quarter" idx="5"/>
+          </p:nvPr>
+        </p:nvSpPr>
+        <p:spPr/>
+        <p:txBody>
+          <a:bodyPr/>
+          <a:lstStyle/>
+          <a:p>
+            <a:fld id="{3A352CEF-0789-4229-9EE3-2FF61603D4BF}" type="slidenum">
+              <a:rPr lang="zh-CN" altLang="en-US" smtClean="0"/>
+              <a:t>2</a:t>
+            </a:fld>
+            <a:endParaRPr lang="zh-CN" altLang="en-US"/>
+          </a:p>
+        </p:txBody>
+      </p:sp>
+    </p:spTree>
+    <p:extLst>
+      <p:ext uri="{BB962C8B-B14F-4D97-AF65-F5344CB8AC3E}">
+        <p14:creationId xmlns:p14="http://schemas.microsoft.com/office/powerpoint/2010/main" val="3763644924"/>
+      </p:ext>
+    </p:extLst>
+  </p:cSld>
+  <p:clrMapOvr>
+    <a:masterClrMapping/>
+  </p:clrMapOvr>
+</p:notes>
+</file>
+
+<file path=ppt/notesSlides/notesSlide3.xml><?xml version="1.0" encoding="utf-8"?>
+<p:notes xmlns:a="http://schemas.openxmlformats.org/drawingml/2006/main" xmlns:r="http://schemas.openxmlformats.org/officeDocument/2006/relationships" xmlns:p="http://schemas.openxmlformats.org/presentationml/2006/main">
+  <p:cSld>
+    <p:spTree>
+      <p:nvGrpSpPr>
+        <p:cNvPr id="1" name=""/>
+        <p:cNvGrpSpPr/>
+        <p:nvPr/>
+      </p:nvGrpSpPr>
+      <p:grpSpPr>
+        <a:xfrm>
+          <a:off x="0" y="0"/>
+          <a:ext cx="0" cy="0"/>
+          <a:chOff x="0" y="0"/>
+          <a:chExt cx="0" cy="0"/>
+        </a:xfrm>
+      </p:grpSpPr>
+      <p:sp>
+        <p:nvSpPr>
+          <p:cNvPr id="2" name="幻灯片图像占位符 1"/>
+          <p:cNvSpPr>
+            <a:spLocks noGrp="1" noRot="1" noChangeAspect="1"/>
+          </p:cNvSpPr>
+          <p:nvPr>
+            <p:ph type="sldImg"/>
+          </p:nvPr>
+        </p:nvSpPr>
+        <p:spPr/>
+      </p:sp>
+      <p:sp>
+        <p:nvSpPr>
+          <p:cNvPr id="3" name="备注占位符 2"/>
+          <p:cNvSpPr>
+            <a:spLocks noGrp="1"/>
+          </p:cNvSpPr>
+          <p:nvPr>
+            <p:ph type="body" idx="1"/>
+          </p:nvPr>
+        </p:nvSpPr>
+        <p:spPr/>
+        <p:txBody>
+          <a:bodyPr/>
+          <a:lstStyle/>
+          <a:p>
+            <a:r>
+              <a:rPr lang="en-US" altLang="zh-CN" dirty="0"/>
+              <a:t>TCP </a:t>
+            </a:r>
+            <a:r>
+              <a:rPr lang="zh-CN" altLang="en-US" dirty="0"/>
+              <a:t>四次挥手</a:t>
+            </a:r>
+          </a:p>
+        </p:txBody>
+      </p:sp>
+      <p:sp>
+        <p:nvSpPr>
+          <p:cNvPr id="4" name="灯片编号占位符 3"/>
+          <p:cNvSpPr>
+            <a:spLocks noGrp="1"/>
+          </p:cNvSpPr>
+          <p:nvPr>
+            <p:ph type="sldNum" sz="quarter" idx="5"/>
+          </p:nvPr>
+        </p:nvSpPr>
+        <p:spPr/>
+        <p:txBody>
+          <a:bodyPr/>
+          <a:lstStyle/>
+          <a:p>
+            <a:fld id="{3A352CEF-0789-4229-9EE3-2FF61603D4BF}" type="slidenum">
+              <a:rPr lang="zh-CN" altLang="en-US" smtClean="0"/>
+              <a:t>3</a:t>
+            </a:fld>
+            <a:endParaRPr lang="zh-CN" altLang="en-US"/>
+          </a:p>
+        </p:txBody>
+      </p:sp>
+    </p:spTree>
+    <p:extLst>
+      <p:ext uri="{BB962C8B-B14F-4D97-AF65-F5344CB8AC3E}">
+        <p14:creationId xmlns:p14="http://schemas.microsoft.com/office/powerpoint/2010/main" val="2599336769"/>
+      </p:ext>
+    </p:extLst>
+  </p:cSld>
+  <p:clrMapOvr>
+    <a:masterClrMapping/>
+  </p:clrMapOvr>
+</p:notes>
+</file>
+
 <file path=ppt/slideLayouts/slideLayout1.xml><?xml version="1.0" encoding="utf-8"?>
 <p:sldLayout xmlns:a="http://schemas.openxmlformats.org/drawingml/2006/main" xmlns:r="http://schemas.openxmlformats.org/officeDocument/2006/relationships" xmlns:p="http://schemas.openxmlformats.org/presentationml/2006/main" type="title" preserve="1">
   <p:cSld name="标题幻灯片">
@@ -684,7 +868,7 @@
           <a:p>
             <a:fld id="{D997B5FA-0921-464F-AAE1-844C04324D75}" type="datetimeFigureOut">
               <a:rPr lang="zh-CN" altLang="en-US" smtClean="0"/>
-              <a:t>2021/1/25</a:t>
+              <a:t>2021/2/8</a:t>
             </a:fld>
             <a:endParaRPr lang="zh-CN" altLang="en-US"/>
           </a:p>
@@ -852,7 +1036,7 @@
           <a:p>
             <a:fld id="{D997B5FA-0921-464F-AAE1-844C04324D75}" type="datetimeFigureOut">
               <a:rPr lang="zh-CN" altLang="en-US" smtClean="0"/>
-              <a:t>2021/1/25</a:t>
+              <a:t>2021/2/8</a:t>
             </a:fld>
             <a:endParaRPr lang="zh-CN" altLang="en-US"/>
           </a:p>
@@ -1030,7 +1214,7 @@
           <a:p>
             <a:fld id="{D997B5FA-0921-464F-AAE1-844C04324D75}" type="datetimeFigureOut">
               <a:rPr lang="zh-CN" altLang="en-US" smtClean="0"/>
-              <a:t>2021/1/25</a:t>
+              <a:t>2021/2/8</a:t>
             </a:fld>
             <a:endParaRPr lang="zh-CN" altLang="en-US"/>
           </a:p>
@@ -1198,7 +1382,7 @@
           <a:p>
             <a:fld id="{D997B5FA-0921-464F-AAE1-844C04324D75}" type="datetimeFigureOut">
               <a:rPr lang="zh-CN" altLang="en-US" smtClean="0"/>
-              <a:t>2021/1/25</a:t>
+              <a:t>2021/2/8</a:t>
             </a:fld>
             <a:endParaRPr lang="zh-CN" altLang="en-US"/>
           </a:p>
@@ -1443,7 +1627,7 @@
           <a:p>
             <a:fld id="{D997B5FA-0921-464F-AAE1-844C04324D75}" type="datetimeFigureOut">
               <a:rPr lang="zh-CN" altLang="en-US" smtClean="0"/>
-              <a:t>2021/1/25</a:t>
+              <a:t>2021/2/8</a:t>
             </a:fld>
             <a:endParaRPr lang="zh-CN" altLang="en-US"/>
           </a:p>
@@ -1672,7 +1856,7 @@
           <a:p>
             <a:fld id="{D997B5FA-0921-464F-AAE1-844C04324D75}" type="datetimeFigureOut">
               <a:rPr lang="zh-CN" altLang="en-US" smtClean="0"/>
-              <a:t>2021/1/25</a:t>
+              <a:t>2021/2/8</a:t>
             </a:fld>
             <a:endParaRPr lang="zh-CN" altLang="en-US"/>
           </a:p>
@@ -2036,7 +2220,7 @@
           <a:p>
             <a:fld id="{D997B5FA-0921-464F-AAE1-844C04324D75}" type="datetimeFigureOut">
               <a:rPr lang="zh-CN" altLang="en-US" smtClean="0"/>
-              <a:t>2021/1/25</a:t>
+              <a:t>2021/2/8</a:t>
             </a:fld>
             <a:endParaRPr lang="zh-CN" altLang="en-US"/>
           </a:p>
@@ -2153,7 +2337,7 @@
           <a:p>
             <a:fld id="{D997B5FA-0921-464F-AAE1-844C04324D75}" type="datetimeFigureOut">
               <a:rPr lang="zh-CN" altLang="en-US" smtClean="0"/>
-              <a:t>2021/1/25</a:t>
+              <a:t>2021/2/8</a:t>
             </a:fld>
             <a:endParaRPr lang="zh-CN" altLang="en-US"/>
           </a:p>
@@ -2248,7 +2432,7 @@
           <a:p>
             <a:fld id="{D997B5FA-0921-464F-AAE1-844C04324D75}" type="datetimeFigureOut">
               <a:rPr lang="zh-CN" altLang="en-US" smtClean="0"/>
-              <a:t>2021/1/25</a:t>
+              <a:t>2021/2/8</a:t>
             </a:fld>
             <a:endParaRPr lang="zh-CN" altLang="en-US"/>
           </a:p>
@@ -2523,7 +2707,7 @@
           <a:p>
             <a:fld id="{D997B5FA-0921-464F-AAE1-844C04324D75}" type="datetimeFigureOut">
               <a:rPr lang="zh-CN" altLang="en-US" smtClean="0"/>
-              <a:t>2021/1/25</a:t>
+              <a:t>2021/2/8</a:t>
             </a:fld>
             <a:endParaRPr lang="zh-CN" altLang="en-US"/>
           </a:p>
@@ -2775,7 +2959,7 @@
           <a:p>
             <a:fld id="{D997B5FA-0921-464F-AAE1-844C04324D75}" type="datetimeFigureOut">
               <a:rPr lang="zh-CN" altLang="en-US" smtClean="0"/>
-              <a:t>2021/1/25</a:t>
+              <a:t>2021/2/8</a:t>
             </a:fld>
             <a:endParaRPr lang="zh-CN" altLang="en-US"/>
           </a:p>
@@ -2986,7 +3170,7 @@
           <a:p>
             <a:fld id="{D997B5FA-0921-464F-AAE1-844C04324D75}" type="datetimeFigureOut">
               <a:rPr lang="zh-CN" altLang="en-US" smtClean="0"/>
-              <a:t>2021/1/25</a:t>
+              <a:t>2021/2/8</a:t>
             </a:fld>
             <a:endParaRPr lang="zh-CN" altLang="en-US"/>
           </a:p>
@@ -5718,6 +5902,2828 @@
 </p:sld>
 </file>
 
+<file path=ppt/slides/slide2.xml><?xml version="1.0" encoding="utf-8"?>
+<p:sld xmlns:a="http://schemas.openxmlformats.org/drawingml/2006/main" xmlns:r="http://schemas.openxmlformats.org/officeDocument/2006/relationships" xmlns:p="http://schemas.openxmlformats.org/presentationml/2006/main">
+  <p:cSld>
+    <p:spTree>
+      <p:nvGrpSpPr>
+        <p:cNvPr id="1" name=""/>
+        <p:cNvGrpSpPr/>
+        <p:nvPr/>
+      </p:nvGrpSpPr>
+      <p:grpSpPr>
+        <a:xfrm>
+          <a:off x="0" y="0"/>
+          <a:ext cx="0" cy="0"/>
+          <a:chOff x="0" y="0"/>
+          <a:chExt cx="0" cy="0"/>
+        </a:xfrm>
+      </p:grpSpPr>
+      <p:cxnSp>
+        <p:nvCxnSpPr>
+          <p:cNvPr id="7" name="直接箭头连接符 6">
+            <a:extLst>
+              <a:ext uri="{FF2B5EF4-FFF2-40B4-BE49-F238E27FC236}">
+                <a16:creationId xmlns:a16="http://schemas.microsoft.com/office/drawing/2014/main" id="{7919863F-1D0A-4F4D-90B4-480AE7A1681F}"/>
+              </a:ext>
+            </a:extLst>
+          </p:cNvPr>
+          <p:cNvCxnSpPr>
+            <a:cxnSpLocks/>
+          </p:cNvCxnSpPr>
+          <p:nvPr/>
+        </p:nvCxnSpPr>
+        <p:spPr>
+          <a:xfrm>
+            <a:off x="3145971" y="981777"/>
+            <a:ext cx="0" cy="4005090"/>
+          </a:xfrm>
+          <a:prstGeom prst="straightConnector1">
+            <a:avLst/>
+          </a:prstGeom>
+          <a:ln w="28575">
+            <a:tailEnd type="triangle"/>
+          </a:ln>
+        </p:spPr>
+        <p:style>
+          <a:lnRef idx="1">
+            <a:schemeClr val="dk1"/>
+          </a:lnRef>
+          <a:fillRef idx="0">
+            <a:schemeClr val="dk1"/>
+          </a:fillRef>
+          <a:effectRef idx="0">
+            <a:schemeClr val="dk1"/>
+          </a:effectRef>
+          <a:fontRef idx="minor">
+            <a:schemeClr val="tx1"/>
+          </a:fontRef>
+        </p:style>
+      </p:cxnSp>
+      <p:cxnSp>
+        <p:nvCxnSpPr>
+          <p:cNvPr id="8" name="直接箭头连接符 7">
+            <a:extLst>
+              <a:ext uri="{FF2B5EF4-FFF2-40B4-BE49-F238E27FC236}">
+                <a16:creationId xmlns:a16="http://schemas.microsoft.com/office/drawing/2014/main" id="{ECA5D9A2-B978-4E8B-910E-FE11463F6A75}"/>
+              </a:ext>
+            </a:extLst>
+          </p:cNvPr>
+          <p:cNvCxnSpPr>
+            <a:cxnSpLocks/>
+          </p:cNvCxnSpPr>
+          <p:nvPr/>
+        </p:nvCxnSpPr>
+        <p:spPr>
+          <a:xfrm>
+            <a:off x="7129223" y="981777"/>
+            <a:ext cx="0" cy="4005089"/>
+          </a:xfrm>
+          <a:prstGeom prst="straightConnector1">
+            <a:avLst/>
+          </a:prstGeom>
+          <a:ln w="28575">
+            <a:tailEnd type="triangle"/>
+          </a:ln>
+        </p:spPr>
+        <p:style>
+          <a:lnRef idx="1">
+            <a:schemeClr val="dk1"/>
+          </a:lnRef>
+          <a:fillRef idx="0">
+            <a:schemeClr val="dk1"/>
+          </a:fillRef>
+          <a:effectRef idx="0">
+            <a:schemeClr val="dk1"/>
+          </a:effectRef>
+          <a:fontRef idx="minor">
+            <a:schemeClr val="tx1"/>
+          </a:fontRef>
+        </p:style>
+      </p:cxnSp>
+      <p:sp>
+        <p:nvSpPr>
+          <p:cNvPr id="9" name="文本框 8">
+            <a:extLst>
+              <a:ext uri="{FF2B5EF4-FFF2-40B4-BE49-F238E27FC236}">
+                <a16:creationId xmlns:a16="http://schemas.microsoft.com/office/drawing/2014/main" id="{6BEB7CD8-DC7B-4BE0-8D1F-CCBA698084CA}"/>
+              </a:ext>
+            </a:extLst>
+          </p:cNvPr>
+          <p:cNvSpPr txBox="1"/>
+          <p:nvPr/>
+        </p:nvSpPr>
+        <p:spPr>
+          <a:xfrm>
+            <a:off x="2668916" y="363179"/>
+            <a:ext cx="954107" cy="400110"/>
+          </a:xfrm>
+          <a:prstGeom prst="rect">
+            <a:avLst/>
+          </a:prstGeom>
+          <a:noFill/>
+        </p:spPr>
+        <p:txBody>
+          <a:bodyPr wrap="none" rtlCol="0">
+            <a:spAutoFit/>
+          </a:bodyPr>
+          <a:lstStyle/>
+          <a:p>
+            <a:r>
+              <a:rPr lang="zh-CN" altLang="en-US" sz="2000" dirty="0">
+                <a:latin typeface="Times New Roman" panose="02020603050405020304" pitchFamily="18" charset="0"/>
+                <a:ea typeface="宋体" panose="02010600030101010101" pitchFamily="2" charset="-122"/>
+              </a:rPr>
+              <a:t>客户端</a:t>
+            </a:r>
+          </a:p>
+        </p:txBody>
+      </p:sp>
+      <p:sp>
+        <p:nvSpPr>
+          <p:cNvPr id="10" name="文本框 9">
+            <a:extLst>
+              <a:ext uri="{FF2B5EF4-FFF2-40B4-BE49-F238E27FC236}">
+                <a16:creationId xmlns:a16="http://schemas.microsoft.com/office/drawing/2014/main" id="{AD22C7C4-DAB4-455C-A5A6-ED18AC146A4F}"/>
+              </a:ext>
+            </a:extLst>
+          </p:cNvPr>
+          <p:cNvSpPr txBox="1"/>
+          <p:nvPr/>
+        </p:nvSpPr>
+        <p:spPr>
+          <a:xfrm>
+            <a:off x="6652169" y="363179"/>
+            <a:ext cx="954107" cy="400110"/>
+          </a:xfrm>
+          <a:prstGeom prst="rect">
+            <a:avLst/>
+          </a:prstGeom>
+          <a:noFill/>
+        </p:spPr>
+        <p:txBody>
+          <a:bodyPr wrap="none" rtlCol="0">
+            <a:spAutoFit/>
+          </a:bodyPr>
+          <a:lstStyle/>
+          <a:p>
+            <a:r>
+              <a:rPr lang="zh-CN" altLang="en-US" sz="2000" dirty="0">
+                <a:latin typeface="Times New Roman" panose="02020603050405020304" pitchFamily="18" charset="0"/>
+                <a:ea typeface="宋体" panose="02010600030101010101" pitchFamily="2" charset="-122"/>
+              </a:rPr>
+              <a:t>服务器</a:t>
+            </a:r>
+          </a:p>
+        </p:txBody>
+      </p:sp>
+      <p:cxnSp>
+        <p:nvCxnSpPr>
+          <p:cNvPr id="12" name="直接箭头连接符 11">
+            <a:extLst>
+              <a:ext uri="{FF2B5EF4-FFF2-40B4-BE49-F238E27FC236}">
+                <a16:creationId xmlns:a16="http://schemas.microsoft.com/office/drawing/2014/main" id="{C88BA41B-BEA2-4BF7-99C7-007B9FDEBDFF}"/>
+              </a:ext>
+            </a:extLst>
+          </p:cNvPr>
+          <p:cNvCxnSpPr>
+            <a:cxnSpLocks/>
+          </p:cNvCxnSpPr>
+          <p:nvPr/>
+        </p:nvCxnSpPr>
+        <p:spPr>
+          <a:xfrm>
+            <a:off x="3145970" y="1771048"/>
+            <a:ext cx="3983253" cy="665206"/>
+          </a:xfrm>
+          <a:prstGeom prst="straightConnector1">
+            <a:avLst/>
+          </a:prstGeom>
+          <a:ln w="25400">
+            <a:solidFill>
+              <a:srgbClr val="00B0F0"/>
+            </a:solidFill>
+            <a:headEnd w="lg" len="lg"/>
+            <a:tailEnd type="triangle" w="lg" len="lg"/>
+          </a:ln>
+        </p:spPr>
+        <p:style>
+          <a:lnRef idx="1">
+            <a:schemeClr val="dk1"/>
+          </a:lnRef>
+          <a:fillRef idx="0">
+            <a:schemeClr val="dk1"/>
+          </a:fillRef>
+          <a:effectRef idx="0">
+            <a:schemeClr val="dk1"/>
+          </a:effectRef>
+          <a:fontRef idx="minor">
+            <a:schemeClr val="tx1"/>
+          </a:fontRef>
+        </p:style>
+      </p:cxnSp>
+      <p:sp>
+        <p:nvSpPr>
+          <p:cNvPr id="14" name="文本框 13">
+            <a:extLst>
+              <a:ext uri="{FF2B5EF4-FFF2-40B4-BE49-F238E27FC236}">
+                <a16:creationId xmlns:a16="http://schemas.microsoft.com/office/drawing/2014/main" id="{B8607656-FBF0-4B11-A1CB-81C9528A6FC1}"/>
+              </a:ext>
+            </a:extLst>
+          </p:cNvPr>
+          <p:cNvSpPr txBox="1"/>
+          <p:nvPr/>
+        </p:nvSpPr>
+        <p:spPr>
+          <a:xfrm rot="546195">
+            <a:off x="4630860" y="1735357"/>
+            <a:ext cx="1353256" cy="369332"/>
+          </a:xfrm>
+          <a:prstGeom prst="rect">
+            <a:avLst/>
+          </a:prstGeom>
+          <a:noFill/>
+        </p:spPr>
+        <p:txBody>
+          <a:bodyPr wrap="none" rtlCol="0">
+            <a:spAutoFit/>
+          </a:bodyPr>
+          <a:lstStyle/>
+          <a:p>
+            <a:r>
+              <a:rPr lang="en-US" altLang="zh-CN" dirty="0">
+                <a:latin typeface="Times New Roman" panose="02020603050405020304" pitchFamily="18" charset="0"/>
+                <a:ea typeface="宋体" panose="02010600030101010101" pitchFamily="2" charset="-122"/>
+              </a:rPr>
+              <a:t>Seq=x, SYN</a:t>
+            </a:r>
+            <a:endParaRPr lang="zh-CN" altLang="en-US" dirty="0">
+              <a:latin typeface="Times New Roman" panose="02020603050405020304" pitchFamily="18" charset="0"/>
+              <a:ea typeface="宋体" panose="02010600030101010101" pitchFamily="2" charset="-122"/>
+            </a:endParaRPr>
+          </a:p>
+        </p:txBody>
+      </p:sp>
+      <p:cxnSp>
+        <p:nvCxnSpPr>
+          <p:cNvPr id="15" name="直接箭头连接符 14">
+            <a:extLst>
+              <a:ext uri="{FF2B5EF4-FFF2-40B4-BE49-F238E27FC236}">
+                <a16:creationId xmlns:a16="http://schemas.microsoft.com/office/drawing/2014/main" id="{98A0487F-E192-4584-9089-676CA58FF6B4}"/>
+              </a:ext>
+            </a:extLst>
+          </p:cNvPr>
+          <p:cNvCxnSpPr>
+            <a:cxnSpLocks/>
+          </p:cNvCxnSpPr>
+          <p:nvPr/>
+        </p:nvCxnSpPr>
+        <p:spPr>
+          <a:xfrm flipH="1">
+            <a:off x="3158721" y="2605250"/>
+            <a:ext cx="3986287" cy="669360"/>
+          </a:xfrm>
+          <a:prstGeom prst="straightConnector1">
+            <a:avLst/>
+          </a:prstGeom>
+          <a:ln w="25400">
+            <a:solidFill>
+              <a:srgbClr val="00B050"/>
+            </a:solidFill>
+            <a:tailEnd type="triangle" w="lg" len="lg"/>
+          </a:ln>
+        </p:spPr>
+        <p:style>
+          <a:lnRef idx="1">
+            <a:schemeClr val="dk1"/>
+          </a:lnRef>
+          <a:fillRef idx="0">
+            <a:schemeClr val="dk1"/>
+          </a:fillRef>
+          <a:effectRef idx="0">
+            <a:schemeClr val="dk1"/>
+          </a:effectRef>
+          <a:fontRef idx="minor">
+            <a:schemeClr val="tx1"/>
+          </a:fontRef>
+        </p:style>
+      </p:cxnSp>
+      <p:sp>
+        <p:nvSpPr>
+          <p:cNvPr id="20" name="文本框 19">
+            <a:extLst>
+              <a:ext uri="{FF2B5EF4-FFF2-40B4-BE49-F238E27FC236}">
+                <a16:creationId xmlns:a16="http://schemas.microsoft.com/office/drawing/2014/main" id="{8FDB8DBC-159F-48E7-A8AD-5CA470021148}"/>
+              </a:ext>
+            </a:extLst>
+          </p:cNvPr>
+          <p:cNvSpPr txBox="1"/>
+          <p:nvPr/>
+        </p:nvSpPr>
+        <p:spPr>
+          <a:xfrm rot="21060000">
+            <a:off x="3835805" y="2512592"/>
+            <a:ext cx="2418739" cy="369332"/>
+          </a:xfrm>
+          <a:prstGeom prst="rect">
+            <a:avLst/>
+          </a:prstGeom>
+          <a:noFill/>
+        </p:spPr>
+        <p:txBody>
+          <a:bodyPr wrap="none" rtlCol="0">
+            <a:spAutoFit/>
+          </a:bodyPr>
+          <a:lstStyle/>
+          <a:p>
+            <a:r>
+              <a:rPr lang="en-US" altLang="zh-CN" dirty="0">
+                <a:latin typeface="Times New Roman" panose="02020603050405020304" pitchFamily="18" charset="0"/>
+                <a:ea typeface="宋体" panose="02010600030101010101" pitchFamily="2" charset="-122"/>
+              </a:rPr>
+              <a:t>Seq=y, SYN, ACK=x+1</a:t>
+            </a:r>
+            <a:endParaRPr lang="zh-CN" altLang="en-US" dirty="0">
+              <a:latin typeface="Times New Roman" panose="02020603050405020304" pitchFamily="18" charset="0"/>
+              <a:ea typeface="宋体" panose="02010600030101010101" pitchFamily="2" charset="-122"/>
+            </a:endParaRPr>
+          </a:p>
+        </p:txBody>
+      </p:sp>
+      <p:sp>
+        <p:nvSpPr>
+          <p:cNvPr id="28" name="文本框 27">
+            <a:extLst>
+              <a:ext uri="{FF2B5EF4-FFF2-40B4-BE49-F238E27FC236}">
+                <a16:creationId xmlns:a16="http://schemas.microsoft.com/office/drawing/2014/main" id="{84CD8D4F-766C-435E-BA35-D93EF9E49689}"/>
+              </a:ext>
+            </a:extLst>
+          </p:cNvPr>
+          <p:cNvSpPr txBox="1"/>
+          <p:nvPr/>
+        </p:nvSpPr>
+        <p:spPr>
+          <a:xfrm rot="540000">
+            <a:off x="4256526" y="3404680"/>
+            <a:ext cx="2101922" cy="369332"/>
+          </a:xfrm>
+          <a:prstGeom prst="rect">
+            <a:avLst/>
+          </a:prstGeom>
+          <a:noFill/>
+        </p:spPr>
+        <p:txBody>
+          <a:bodyPr wrap="none" rtlCol="0">
+            <a:spAutoFit/>
+          </a:bodyPr>
+          <a:lstStyle/>
+          <a:p>
+            <a:r>
+              <a:rPr lang="en-US" altLang="zh-CN" dirty="0">
+                <a:latin typeface="Times New Roman" panose="02020603050405020304" pitchFamily="18" charset="0"/>
+                <a:ea typeface="宋体" panose="02010600030101010101" pitchFamily="2" charset="-122"/>
+              </a:rPr>
+              <a:t>Seq=x+1, ACK=y+1</a:t>
+            </a:r>
+            <a:endParaRPr lang="zh-CN" altLang="en-US" dirty="0">
+              <a:latin typeface="Times New Roman" panose="02020603050405020304" pitchFamily="18" charset="0"/>
+              <a:ea typeface="宋体" panose="02010600030101010101" pitchFamily="2" charset="-122"/>
+            </a:endParaRPr>
+          </a:p>
+        </p:txBody>
+      </p:sp>
+      <p:graphicFrame>
+        <p:nvGraphicFramePr>
+          <p:cNvPr id="32" name="表格 32">
+            <a:extLst>
+              <a:ext uri="{FF2B5EF4-FFF2-40B4-BE49-F238E27FC236}">
+                <a16:creationId xmlns:a16="http://schemas.microsoft.com/office/drawing/2014/main" id="{95E7753F-E15E-46EF-9406-B42E5BAA56FA}"/>
+              </a:ext>
+            </a:extLst>
+          </p:cNvPr>
+          <p:cNvGraphicFramePr>
+            <a:graphicFrameLocks noGrp="1"/>
+          </p:cNvGraphicFramePr>
+          <p:nvPr>
+            <p:extLst>
+              <p:ext uri="{D42A27DB-BD31-4B8C-83A1-F6EECF244321}">
+                <p14:modId xmlns:p14="http://schemas.microsoft.com/office/powerpoint/2010/main" val="3019223156"/>
+              </p:ext>
+            </p:extLst>
+          </p:nvPr>
+        </p:nvGraphicFramePr>
+        <p:xfrm>
+          <a:off x="9643793" y="2096213"/>
+          <a:ext cx="3210129" cy="1483360"/>
+        </p:xfrm>
+        <a:graphic>
+          <a:graphicData uri="http://schemas.openxmlformats.org/drawingml/2006/table">
+            <a:tbl>
+              <a:tblPr firstRow="1" bandRow="1">
+                <a:tableStyleId>{5940675A-B579-460E-94D1-54222C63F5DA}</a:tableStyleId>
+              </a:tblPr>
+              <a:tblGrid>
+                <a:gridCol w="502797">
+                  <a:extLst>
+                    <a:ext uri="{9D8B030D-6E8A-4147-A177-3AD203B41FA5}">
+                      <a16:colId xmlns:a16="http://schemas.microsoft.com/office/drawing/2014/main" val="961391142"/>
+                    </a:ext>
+                  </a:extLst>
+                </a:gridCol>
+                <a:gridCol w="902444">
+                  <a:extLst>
+                    <a:ext uri="{9D8B030D-6E8A-4147-A177-3AD203B41FA5}">
+                      <a16:colId xmlns:a16="http://schemas.microsoft.com/office/drawing/2014/main" val="1314654954"/>
+                    </a:ext>
+                  </a:extLst>
+                </a:gridCol>
+                <a:gridCol w="902444">
+                  <a:extLst>
+                    <a:ext uri="{9D8B030D-6E8A-4147-A177-3AD203B41FA5}">
+                      <a16:colId xmlns:a16="http://schemas.microsoft.com/office/drawing/2014/main" val="1364108467"/>
+                    </a:ext>
+                  </a:extLst>
+                </a:gridCol>
+                <a:gridCol w="902444">
+                  <a:extLst>
+                    <a:ext uri="{9D8B030D-6E8A-4147-A177-3AD203B41FA5}">
+                      <a16:colId xmlns:a16="http://schemas.microsoft.com/office/drawing/2014/main" val="1022649288"/>
+                    </a:ext>
+                  </a:extLst>
+                </a:gridCol>
+              </a:tblGrid>
+              <a:tr h="370840">
+                <a:tc>
+                  <a:txBody>
+                    <a:bodyPr/>
+                    <a:lstStyle/>
+                    <a:p>
+                      <a:pPr algn="ctr"/>
+                      <a:endParaRPr lang="zh-CN" altLang="en-US" baseline="0" dirty="0">
+                        <a:latin typeface="Times New Roman" panose="02020603050405020304" pitchFamily="18" charset="0"/>
+                        <a:ea typeface="宋体" panose="02010600030101010101" pitchFamily="2" charset="-122"/>
+                      </a:endParaRPr>
+                    </a:p>
+                  </a:txBody>
+                  <a:tcPr anchor="ctr"/>
+                </a:tc>
+                <a:tc>
+                  <a:txBody>
+                    <a:bodyPr/>
+                    <a:lstStyle/>
+                    <a:p>
+                      <a:pPr algn="ctr"/>
+                      <a:r>
+                        <a:rPr lang="en-US" altLang="zh-CN" baseline="0" dirty="0">
+                          <a:latin typeface="Times New Roman" panose="02020603050405020304" pitchFamily="18" charset="0"/>
+                          <a:ea typeface="宋体" panose="02010600030101010101" pitchFamily="2" charset="-122"/>
+                        </a:rPr>
+                        <a:t>Seq</a:t>
+                      </a:r>
+                      <a:endParaRPr lang="zh-CN" altLang="en-US" baseline="0" dirty="0">
+                        <a:latin typeface="Times New Roman" panose="02020603050405020304" pitchFamily="18" charset="0"/>
+                        <a:ea typeface="宋体" panose="02010600030101010101" pitchFamily="2" charset="-122"/>
+                      </a:endParaRPr>
+                    </a:p>
+                  </a:txBody>
+                  <a:tcPr anchor="ctr"/>
+                </a:tc>
+                <a:tc>
+                  <a:txBody>
+                    <a:bodyPr/>
+                    <a:lstStyle/>
+                    <a:p>
+                      <a:pPr algn="ctr"/>
+                      <a:r>
+                        <a:rPr lang="en-US" altLang="zh-CN" baseline="0" dirty="0">
+                          <a:latin typeface="Times New Roman" panose="02020603050405020304" pitchFamily="18" charset="0"/>
+                          <a:ea typeface="宋体" panose="02010600030101010101" pitchFamily="2" charset="-122"/>
+                        </a:rPr>
+                        <a:t>SYN</a:t>
+                      </a:r>
+                      <a:endParaRPr lang="zh-CN" altLang="en-US" baseline="0" dirty="0">
+                        <a:latin typeface="Times New Roman" panose="02020603050405020304" pitchFamily="18" charset="0"/>
+                        <a:ea typeface="宋体" panose="02010600030101010101" pitchFamily="2" charset="-122"/>
+                      </a:endParaRPr>
+                    </a:p>
+                  </a:txBody>
+                  <a:tcPr anchor="ctr"/>
+                </a:tc>
+                <a:tc>
+                  <a:txBody>
+                    <a:bodyPr/>
+                    <a:lstStyle/>
+                    <a:p>
+                      <a:pPr algn="ctr"/>
+                      <a:r>
+                        <a:rPr lang="en-US" altLang="zh-CN" baseline="0" dirty="0">
+                          <a:latin typeface="Times New Roman" panose="02020603050405020304" pitchFamily="18" charset="0"/>
+                          <a:ea typeface="宋体" panose="02010600030101010101" pitchFamily="2" charset="-122"/>
+                        </a:rPr>
+                        <a:t>ACK</a:t>
+                      </a:r>
+                      <a:endParaRPr lang="zh-CN" altLang="en-US" baseline="0" dirty="0">
+                        <a:latin typeface="Times New Roman" panose="02020603050405020304" pitchFamily="18" charset="0"/>
+                        <a:ea typeface="宋体" panose="02010600030101010101" pitchFamily="2" charset="-122"/>
+                      </a:endParaRPr>
+                    </a:p>
+                  </a:txBody>
+                  <a:tcPr anchor="ctr"/>
+                </a:tc>
+                <a:extLst>
+                  <a:ext uri="{0D108BD9-81ED-4DB2-BD59-A6C34878D82A}">
+                    <a16:rowId xmlns:a16="http://schemas.microsoft.com/office/drawing/2014/main" val="838475617"/>
+                  </a:ext>
+                </a:extLst>
+              </a:tr>
+              <a:tr h="370840">
+                <a:tc>
+                  <a:txBody>
+                    <a:bodyPr/>
+                    <a:lstStyle/>
+                    <a:p>
+                      <a:pPr algn="ctr"/>
+                      <a:r>
+                        <a:rPr lang="en-US" altLang="zh-CN" baseline="0" dirty="0">
+                          <a:latin typeface="Times New Roman" panose="02020603050405020304" pitchFamily="18" charset="0"/>
+                          <a:ea typeface="宋体" panose="02010600030101010101" pitchFamily="2" charset="-122"/>
+                        </a:rPr>
+                        <a:t>1</a:t>
+                      </a:r>
+                      <a:endParaRPr lang="zh-CN" altLang="en-US" baseline="0" dirty="0">
+                        <a:latin typeface="Times New Roman" panose="02020603050405020304" pitchFamily="18" charset="0"/>
+                        <a:ea typeface="宋体" panose="02010600030101010101" pitchFamily="2" charset="-122"/>
+                      </a:endParaRPr>
+                    </a:p>
+                  </a:txBody>
+                  <a:tcPr anchor="ctr">
+                    <a:solidFill>
+                      <a:schemeClr val="accent1">
+                        <a:lumMod val="20000"/>
+                        <a:lumOff val="80000"/>
+                      </a:schemeClr>
+                    </a:solidFill>
+                  </a:tcPr>
+                </a:tc>
+                <a:tc>
+                  <a:txBody>
+                    <a:bodyPr/>
+                    <a:lstStyle/>
+                    <a:p>
+                      <a:pPr algn="ctr"/>
+                      <a:r>
+                        <a:rPr lang="en-US" altLang="zh-CN" baseline="0" dirty="0">
+                          <a:latin typeface="Times New Roman" panose="02020603050405020304" pitchFamily="18" charset="0"/>
+                          <a:ea typeface="宋体" panose="02010600030101010101" pitchFamily="2" charset="-122"/>
+                        </a:rPr>
+                        <a:t>x</a:t>
+                      </a:r>
+                      <a:endParaRPr lang="zh-CN" altLang="en-US" baseline="0" dirty="0">
+                        <a:latin typeface="Times New Roman" panose="02020603050405020304" pitchFamily="18" charset="0"/>
+                        <a:ea typeface="宋体" panose="02010600030101010101" pitchFamily="2" charset="-122"/>
+                      </a:endParaRPr>
+                    </a:p>
+                  </a:txBody>
+                  <a:tcPr anchor="ctr">
+                    <a:solidFill>
+                      <a:schemeClr val="accent1">
+                        <a:lumMod val="20000"/>
+                        <a:lumOff val="80000"/>
+                      </a:schemeClr>
+                    </a:solidFill>
+                  </a:tcPr>
+                </a:tc>
+                <a:tc>
+                  <a:txBody>
+                    <a:bodyPr/>
+                    <a:lstStyle/>
+                    <a:p>
+                      <a:pPr algn="ctr"/>
+                      <a:r>
+                        <a:rPr lang="zh-CN" altLang="en-US" baseline="0" dirty="0">
+                          <a:solidFill>
+                            <a:schemeClr val="tx1"/>
+                          </a:solidFill>
+                          <a:latin typeface="Times New Roman" panose="02020603050405020304" pitchFamily="18" charset="0"/>
+                          <a:ea typeface="宋体" panose="02010600030101010101" pitchFamily="2" charset="-122"/>
+                        </a:rPr>
+                        <a:t>√</a:t>
+                      </a:r>
+                    </a:p>
+                  </a:txBody>
+                  <a:tcPr anchor="ctr">
+                    <a:solidFill>
+                      <a:schemeClr val="accent1">
+                        <a:lumMod val="20000"/>
+                        <a:lumOff val="80000"/>
+                      </a:schemeClr>
+                    </a:solidFill>
+                  </a:tcPr>
+                </a:tc>
+                <a:tc>
+                  <a:txBody>
+                    <a:bodyPr/>
+                    <a:lstStyle/>
+                    <a:p>
+                      <a:pPr algn="ctr"/>
+                      <a:endParaRPr lang="zh-CN" altLang="en-US" baseline="0" dirty="0">
+                        <a:latin typeface="Times New Roman" panose="02020603050405020304" pitchFamily="18" charset="0"/>
+                        <a:ea typeface="宋体" panose="02010600030101010101" pitchFamily="2" charset="-122"/>
+                      </a:endParaRPr>
+                    </a:p>
+                  </a:txBody>
+                  <a:tcPr anchor="ctr">
+                    <a:solidFill>
+                      <a:schemeClr val="accent1">
+                        <a:lumMod val="20000"/>
+                        <a:lumOff val="80000"/>
+                      </a:schemeClr>
+                    </a:solidFill>
+                  </a:tcPr>
+                </a:tc>
+                <a:extLst>
+                  <a:ext uri="{0D108BD9-81ED-4DB2-BD59-A6C34878D82A}">
+                    <a16:rowId xmlns:a16="http://schemas.microsoft.com/office/drawing/2014/main" val="1948815283"/>
+                  </a:ext>
+                </a:extLst>
+              </a:tr>
+              <a:tr h="370840">
+                <a:tc>
+                  <a:txBody>
+                    <a:bodyPr/>
+                    <a:lstStyle/>
+                    <a:p>
+                      <a:pPr algn="ctr"/>
+                      <a:r>
+                        <a:rPr lang="en-US" altLang="zh-CN" baseline="0" dirty="0">
+                          <a:latin typeface="Times New Roman" panose="02020603050405020304" pitchFamily="18" charset="0"/>
+                          <a:ea typeface="宋体" panose="02010600030101010101" pitchFamily="2" charset="-122"/>
+                        </a:rPr>
+                        <a:t>2</a:t>
+                      </a:r>
+                      <a:endParaRPr lang="zh-CN" altLang="en-US" baseline="0" dirty="0">
+                        <a:latin typeface="Times New Roman" panose="02020603050405020304" pitchFamily="18" charset="0"/>
+                        <a:ea typeface="宋体" panose="02010600030101010101" pitchFamily="2" charset="-122"/>
+                      </a:endParaRPr>
+                    </a:p>
+                  </a:txBody>
+                  <a:tcPr anchor="ctr">
+                    <a:solidFill>
+                      <a:schemeClr val="accent6">
+                        <a:lumMod val="20000"/>
+                        <a:lumOff val="80000"/>
+                      </a:schemeClr>
+                    </a:solidFill>
+                  </a:tcPr>
+                </a:tc>
+                <a:tc>
+                  <a:txBody>
+                    <a:bodyPr/>
+                    <a:lstStyle/>
+                    <a:p>
+                      <a:pPr algn="ctr"/>
+                      <a:r>
+                        <a:rPr lang="en-US" altLang="zh-CN" baseline="0" dirty="0">
+                          <a:latin typeface="Times New Roman" panose="02020603050405020304" pitchFamily="18" charset="0"/>
+                          <a:ea typeface="宋体" panose="02010600030101010101" pitchFamily="2" charset="-122"/>
+                        </a:rPr>
+                        <a:t>y</a:t>
+                      </a:r>
+                      <a:endParaRPr lang="zh-CN" altLang="en-US" baseline="0" dirty="0">
+                        <a:latin typeface="Times New Roman" panose="02020603050405020304" pitchFamily="18" charset="0"/>
+                        <a:ea typeface="宋体" panose="02010600030101010101" pitchFamily="2" charset="-122"/>
+                      </a:endParaRPr>
+                    </a:p>
+                  </a:txBody>
+                  <a:tcPr anchor="ctr">
+                    <a:solidFill>
+                      <a:schemeClr val="accent6">
+                        <a:lumMod val="20000"/>
+                        <a:lumOff val="80000"/>
+                      </a:schemeClr>
+                    </a:solidFill>
+                  </a:tcPr>
+                </a:tc>
+                <a:tc>
+                  <a:txBody>
+                    <a:bodyPr/>
+                    <a:lstStyle/>
+                    <a:p>
+                      <a:pPr marL="0" marR="0" lvl="0" indent="0" algn="ctr" defTabSz="914400" rtl="0" eaLnBrk="1" fontAlgn="auto" latinLnBrk="0" hangingPunct="1">
+                        <a:lnSpc>
+                          <a:spcPct val="100000"/>
+                        </a:lnSpc>
+                        <a:spcBef>
+                          <a:spcPts val="0"/>
+                        </a:spcBef>
+                        <a:spcAft>
+                          <a:spcPts val="0"/>
+                        </a:spcAft>
+                        <a:buClrTx/>
+                        <a:buSzTx/>
+                        <a:buFontTx/>
+                        <a:buNone/>
+                        <a:tabLst/>
+                        <a:defRPr/>
+                      </a:pPr>
+                      <a:r>
+                        <a:rPr lang="zh-CN" altLang="en-US" baseline="0" dirty="0">
+                          <a:solidFill>
+                            <a:schemeClr val="tx1"/>
+                          </a:solidFill>
+                          <a:latin typeface="Times New Roman" panose="02020603050405020304" pitchFamily="18" charset="0"/>
+                          <a:ea typeface="宋体" panose="02010600030101010101" pitchFamily="2" charset="-122"/>
+                        </a:rPr>
+                        <a:t>√</a:t>
+                      </a:r>
+                    </a:p>
+                  </a:txBody>
+                  <a:tcPr anchor="ctr">
+                    <a:solidFill>
+                      <a:schemeClr val="accent6">
+                        <a:lumMod val="20000"/>
+                        <a:lumOff val="80000"/>
+                      </a:schemeClr>
+                    </a:solidFill>
+                  </a:tcPr>
+                </a:tc>
+                <a:tc>
+                  <a:txBody>
+                    <a:bodyPr/>
+                    <a:lstStyle/>
+                    <a:p>
+                      <a:pPr algn="ctr"/>
+                      <a:r>
+                        <a:rPr lang="en-US" altLang="zh-CN" baseline="0" dirty="0">
+                          <a:latin typeface="Times New Roman" panose="02020603050405020304" pitchFamily="18" charset="0"/>
+                          <a:ea typeface="宋体" panose="02010600030101010101" pitchFamily="2" charset="-122"/>
+                        </a:rPr>
+                        <a:t>x+1</a:t>
+                      </a:r>
+                      <a:endParaRPr lang="zh-CN" altLang="en-US" baseline="0" dirty="0">
+                        <a:latin typeface="Times New Roman" panose="02020603050405020304" pitchFamily="18" charset="0"/>
+                        <a:ea typeface="宋体" panose="02010600030101010101" pitchFamily="2" charset="-122"/>
+                      </a:endParaRPr>
+                    </a:p>
+                  </a:txBody>
+                  <a:tcPr anchor="ctr">
+                    <a:solidFill>
+                      <a:schemeClr val="accent6">
+                        <a:lumMod val="20000"/>
+                        <a:lumOff val="80000"/>
+                      </a:schemeClr>
+                    </a:solidFill>
+                  </a:tcPr>
+                </a:tc>
+                <a:extLst>
+                  <a:ext uri="{0D108BD9-81ED-4DB2-BD59-A6C34878D82A}">
+                    <a16:rowId xmlns:a16="http://schemas.microsoft.com/office/drawing/2014/main" val="4123196707"/>
+                  </a:ext>
+                </a:extLst>
+              </a:tr>
+              <a:tr h="370840">
+                <a:tc>
+                  <a:txBody>
+                    <a:bodyPr/>
+                    <a:lstStyle/>
+                    <a:p>
+                      <a:pPr algn="ctr"/>
+                      <a:r>
+                        <a:rPr lang="en-US" altLang="zh-CN" baseline="0" dirty="0">
+                          <a:latin typeface="Times New Roman" panose="02020603050405020304" pitchFamily="18" charset="0"/>
+                          <a:ea typeface="宋体" panose="02010600030101010101" pitchFamily="2" charset="-122"/>
+                        </a:rPr>
+                        <a:t>3</a:t>
+                      </a:r>
+                      <a:endParaRPr lang="zh-CN" altLang="en-US" baseline="0" dirty="0">
+                        <a:latin typeface="Times New Roman" panose="02020603050405020304" pitchFamily="18" charset="0"/>
+                        <a:ea typeface="宋体" panose="02010600030101010101" pitchFamily="2" charset="-122"/>
+                      </a:endParaRPr>
+                    </a:p>
+                  </a:txBody>
+                  <a:tcPr anchor="ctr">
+                    <a:solidFill>
+                      <a:schemeClr val="accent1">
+                        <a:lumMod val="20000"/>
+                        <a:lumOff val="80000"/>
+                      </a:schemeClr>
+                    </a:solidFill>
+                  </a:tcPr>
+                </a:tc>
+                <a:tc>
+                  <a:txBody>
+                    <a:bodyPr/>
+                    <a:lstStyle/>
+                    <a:p>
+                      <a:pPr algn="ctr"/>
+                      <a:r>
+                        <a:rPr lang="en-US" altLang="zh-CN" baseline="0" dirty="0">
+                          <a:latin typeface="Times New Roman" panose="02020603050405020304" pitchFamily="18" charset="0"/>
+                          <a:ea typeface="宋体" panose="02010600030101010101" pitchFamily="2" charset="-122"/>
+                        </a:rPr>
+                        <a:t>x+1</a:t>
+                      </a:r>
+                      <a:endParaRPr lang="zh-CN" altLang="en-US" baseline="0" dirty="0">
+                        <a:latin typeface="Times New Roman" panose="02020603050405020304" pitchFamily="18" charset="0"/>
+                        <a:ea typeface="宋体" panose="02010600030101010101" pitchFamily="2" charset="-122"/>
+                      </a:endParaRPr>
+                    </a:p>
+                  </a:txBody>
+                  <a:tcPr anchor="ctr">
+                    <a:solidFill>
+                      <a:schemeClr val="accent1">
+                        <a:lumMod val="20000"/>
+                        <a:lumOff val="80000"/>
+                      </a:schemeClr>
+                    </a:solidFill>
+                  </a:tcPr>
+                </a:tc>
+                <a:tc>
+                  <a:txBody>
+                    <a:bodyPr/>
+                    <a:lstStyle/>
+                    <a:p>
+                      <a:pPr marL="0" marR="0" lvl="0" indent="0" algn="ctr" defTabSz="914400" rtl="0" eaLnBrk="1" fontAlgn="auto" latinLnBrk="0" hangingPunct="1">
+                        <a:lnSpc>
+                          <a:spcPct val="100000"/>
+                        </a:lnSpc>
+                        <a:spcBef>
+                          <a:spcPts val="0"/>
+                        </a:spcBef>
+                        <a:spcAft>
+                          <a:spcPts val="0"/>
+                        </a:spcAft>
+                        <a:buClrTx/>
+                        <a:buSzTx/>
+                        <a:buFontTx/>
+                        <a:buNone/>
+                        <a:tabLst/>
+                        <a:defRPr/>
+                      </a:pPr>
+                      <a:endParaRPr lang="zh-CN" altLang="en-US" baseline="0" dirty="0">
+                        <a:solidFill>
+                          <a:srgbClr val="00B050"/>
+                        </a:solidFill>
+                        <a:latin typeface="Times New Roman" panose="02020603050405020304" pitchFamily="18" charset="0"/>
+                        <a:ea typeface="宋体" panose="02010600030101010101" pitchFamily="2" charset="-122"/>
+                      </a:endParaRPr>
+                    </a:p>
+                  </a:txBody>
+                  <a:tcPr anchor="ctr">
+                    <a:solidFill>
+                      <a:schemeClr val="accent1">
+                        <a:lumMod val="20000"/>
+                        <a:lumOff val="80000"/>
+                      </a:schemeClr>
+                    </a:solidFill>
+                  </a:tcPr>
+                </a:tc>
+                <a:tc>
+                  <a:txBody>
+                    <a:bodyPr/>
+                    <a:lstStyle/>
+                    <a:p>
+                      <a:pPr algn="ctr"/>
+                      <a:r>
+                        <a:rPr lang="en-US" altLang="zh-CN" baseline="0" dirty="0">
+                          <a:latin typeface="Times New Roman" panose="02020603050405020304" pitchFamily="18" charset="0"/>
+                          <a:ea typeface="宋体" panose="02010600030101010101" pitchFamily="2" charset="-122"/>
+                        </a:rPr>
+                        <a:t>y+1</a:t>
+                      </a:r>
+                      <a:endParaRPr lang="zh-CN" altLang="en-US" baseline="0" dirty="0">
+                        <a:latin typeface="Times New Roman" panose="02020603050405020304" pitchFamily="18" charset="0"/>
+                        <a:ea typeface="宋体" panose="02010600030101010101" pitchFamily="2" charset="-122"/>
+                      </a:endParaRPr>
+                    </a:p>
+                  </a:txBody>
+                  <a:tcPr anchor="ctr">
+                    <a:solidFill>
+                      <a:schemeClr val="accent1">
+                        <a:lumMod val="20000"/>
+                        <a:lumOff val="80000"/>
+                      </a:schemeClr>
+                    </a:solidFill>
+                  </a:tcPr>
+                </a:tc>
+                <a:extLst>
+                  <a:ext uri="{0D108BD9-81ED-4DB2-BD59-A6C34878D82A}">
+                    <a16:rowId xmlns:a16="http://schemas.microsoft.com/office/drawing/2014/main" val="2767558391"/>
+                  </a:ext>
+                </a:extLst>
+              </a:tr>
+            </a:tbl>
+          </a:graphicData>
+        </a:graphic>
+      </p:graphicFrame>
+      <p:sp>
+        <p:nvSpPr>
+          <p:cNvPr id="33" name="矩形 32">
+            <a:extLst>
+              <a:ext uri="{FF2B5EF4-FFF2-40B4-BE49-F238E27FC236}">
+                <a16:creationId xmlns:a16="http://schemas.microsoft.com/office/drawing/2014/main" id="{AA5164E7-357C-4754-9A18-65FF6AE3B149}"/>
+              </a:ext>
+            </a:extLst>
+          </p:cNvPr>
+          <p:cNvSpPr/>
+          <p:nvPr/>
+        </p:nvSpPr>
+        <p:spPr>
+          <a:xfrm>
+            <a:off x="1117709" y="1024909"/>
+            <a:ext cx="1799898" cy="609845"/>
+          </a:xfrm>
+          <a:prstGeom prst="rect">
+            <a:avLst/>
+          </a:prstGeom>
+          <a:solidFill>
+            <a:schemeClr val="bg1">
+              <a:lumMod val="95000"/>
+            </a:schemeClr>
+          </a:solidFill>
+        </p:spPr>
+        <p:style>
+          <a:lnRef idx="2">
+            <a:schemeClr val="dk1"/>
+          </a:lnRef>
+          <a:fillRef idx="1">
+            <a:schemeClr val="lt1"/>
+          </a:fillRef>
+          <a:effectRef idx="0">
+            <a:schemeClr val="dk1"/>
+          </a:effectRef>
+          <a:fontRef idx="minor">
+            <a:schemeClr val="dk1"/>
+          </a:fontRef>
+        </p:style>
+        <p:txBody>
+          <a:bodyPr rtlCol="0" anchor="ctr"/>
+          <a:lstStyle/>
+          <a:p>
+            <a:pPr algn="ctr"/>
+            <a:r>
+              <a:rPr lang="en-US" altLang="zh-CN" dirty="0">
+                <a:latin typeface="Times New Roman" panose="02020603050405020304" pitchFamily="18" charset="0"/>
+                <a:ea typeface="宋体" panose="02010600030101010101" pitchFamily="2" charset="-122"/>
+              </a:rPr>
+              <a:t>CLOSED</a:t>
+            </a:r>
+            <a:endParaRPr lang="zh-CN" altLang="en-US" dirty="0">
+              <a:latin typeface="Times New Roman" panose="02020603050405020304" pitchFamily="18" charset="0"/>
+              <a:ea typeface="宋体" panose="02010600030101010101" pitchFamily="2" charset="-122"/>
+            </a:endParaRPr>
+          </a:p>
+        </p:txBody>
+      </p:sp>
+      <p:sp>
+        <p:nvSpPr>
+          <p:cNvPr id="34" name="矩形 33">
+            <a:extLst>
+              <a:ext uri="{FF2B5EF4-FFF2-40B4-BE49-F238E27FC236}">
+                <a16:creationId xmlns:a16="http://schemas.microsoft.com/office/drawing/2014/main" id="{01BB7D4D-1102-4B7F-8432-3250990103DD}"/>
+              </a:ext>
+            </a:extLst>
+          </p:cNvPr>
+          <p:cNvSpPr/>
+          <p:nvPr/>
+        </p:nvSpPr>
+        <p:spPr>
+          <a:xfrm>
+            <a:off x="1117707" y="1762818"/>
+            <a:ext cx="1799899" cy="1511792"/>
+          </a:xfrm>
+          <a:prstGeom prst="rect">
+            <a:avLst/>
+          </a:prstGeom>
+        </p:spPr>
+        <p:style>
+          <a:lnRef idx="2">
+            <a:schemeClr val="dk1"/>
+          </a:lnRef>
+          <a:fillRef idx="1">
+            <a:schemeClr val="lt1"/>
+          </a:fillRef>
+          <a:effectRef idx="0">
+            <a:schemeClr val="dk1"/>
+          </a:effectRef>
+          <a:fontRef idx="minor">
+            <a:schemeClr val="dk1"/>
+          </a:fontRef>
+        </p:style>
+        <p:txBody>
+          <a:bodyPr rtlCol="0" anchor="ctr"/>
+          <a:lstStyle/>
+          <a:p>
+            <a:pPr algn="ctr"/>
+            <a:r>
+              <a:rPr lang="en-US" altLang="zh-CN" dirty="0">
+                <a:latin typeface="Times New Roman" panose="02020603050405020304" pitchFamily="18" charset="0"/>
+                <a:ea typeface="宋体" panose="02010600030101010101" pitchFamily="2" charset="-122"/>
+              </a:rPr>
+              <a:t>SYN-SENT</a:t>
+            </a:r>
+            <a:endParaRPr lang="zh-CN" altLang="en-US" sz="2000" dirty="0">
+              <a:latin typeface="Times New Roman" panose="02020603050405020304" pitchFamily="18" charset="0"/>
+              <a:ea typeface="宋体" panose="02010600030101010101" pitchFamily="2" charset="-122"/>
+            </a:endParaRPr>
+          </a:p>
+        </p:txBody>
+      </p:sp>
+      <p:sp>
+        <p:nvSpPr>
+          <p:cNvPr id="35" name="矩形 34">
+            <a:extLst>
+              <a:ext uri="{FF2B5EF4-FFF2-40B4-BE49-F238E27FC236}">
+                <a16:creationId xmlns:a16="http://schemas.microsoft.com/office/drawing/2014/main" id="{6F881133-A9D2-4165-8D7B-DB2CD6D1CD62}"/>
+              </a:ext>
+            </a:extLst>
+          </p:cNvPr>
+          <p:cNvSpPr/>
+          <p:nvPr/>
+        </p:nvSpPr>
+        <p:spPr>
+          <a:xfrm>
+            <a:off x="1117708" y="3428999"/>
+            <a:ext cx="1799900" cy="1557867"/>
+          </a:xfrm>
+          <a:prstGeom prst="rect">
+            <a:avLst/>
+          </a:prstGeom>
+          <a:solidFill>
+            <a:schemeClr val="accent2">
+              <a:lumMod val="20000"/>
+              <a:lumOff val="80000"/>
+            </a:schemeClr>
+          </a:solidFill>
+        </p:spPr>
+        <p:style>
+          <a:lnRef idx="2">
+            <a:schemeClr val="dk1"/>
+          </a:lnRef>
+          <a:fillRef idx="1">
+            <a:schemeClr val="lt1"/>
+          </a:fillRef>
+          <a:effectRef idx="0">
+            <a:schemeClr val="dk1"/>
+          </a:effectRef>
+          <a:fontRef idx="minor">
+            <a:schemeClr val="dk1"/>
+          </a:fontRef>
+        </p:style>
+        <p:txBody>
+          <a:bodyPr rtlCol="0" anchor="ctr"/>
+          <a:lstStyle/>
+          <a:p>
+            <a:pPr algn="ctr"/>
+            <a:r>
+              <a:rPr lang="en-US" altLang="zh-CN" dirty="0">
+                <a:latin typeface="Times New Roman" panose="02020603050405020304" pitchFamily="18" charset="0"/>
+                <a:ea typeface="宋体" panose="02010600030101010101" pitchFamily="2" charset="-122"/>
+              </a:rPr>
+              <a:t>ESTABLISHED</a:t>
+            </a:r>
+            <a:endParaRPr lang="zh-CN" altLang="en-US" dirty="0">
+              <a:latin typeface="Times New Roman" panose="02020603050405020304" pitchFamily="18" charset="0"/>
+              <a:ea typeface="宋体" panose="02010600030101010101" pitchFamily="2" charset="-122"/>
+            </a:endParaRPr>
+          </a:p>
+        </p:txBody>
+      </p:sp>
+      <p:cxnSp>
+        <p:nvCxnSpPr>
+          <p:cNvPr id="38" name="直接箭头连接符 37">
+            <a:extLst>
+              <a:ext uri="{FF2B5EF4-FFF2-40B4-BE49-F238E27FC236}">
+                <a16:creationId xmlns:a16="http://schemas.microsoft.com/office/drawing/2014/main" id="{A21F9FB0-59F7-49CA-8BE9-FB2E7E5E02FE}"/>
+              </a:ext>
+            </a:extLst>
+          </p:cNvPr>
+          <p:cNvCxnSpPr>
+            <a:cxnSpLocks/>
+          </p:cNvCxnSpPr>
+          <p:nvPr/>
+        </p:nvCxnSpPr>
+        <p:spPr>
+          <a:xfrm>
+            <a:off x="3151168" y="3435069"/>
+            <a:ext cx="3983253" cy="665206"/>
+          </a:xfrm>
+          <a:prstGeom prst="straightConnector1">
+            <a:avLst/>
+          </a:prstGeom>
+          <a:ln w="25400">
+            <a:solidFill>
+              <a:srgbClr val="00B0F0"/>
+            </a:solidFill>
+            <a:headEnd w="lg" len="lg"/>
+            <a:tailEnd type="triangle" w="lg" len="lg"/>
+          </a:ln>
+        </p:spPr>
+        <p:style>
+          <a:lnRef idx="1">
+            <a:schemeClr val="dk1"/>
+          </a:lnRef>
+          <a:fillRef idx="0">
+            <a:schemeClr val="dk1"/>
+          </a:fillRef>
+          <a:effectRef idx="0">
+            <a:schemeClr val="dk1"/>
+          </a:effectRef>
+          <a:fontRef idx="minor">
+            <a:schemeClr val="tx1"/>
+          </a:fontRef>
+        </p:style>
+      </p:cxnSp>
+      <p:sp>
+        <p:nvSpPr>
+          <p:cNvPr id="49" name="矩形 48">
+            <a:extLst>
+              <a:ext uri="{FF2B5EF4-FFF2-40B4-BE49-F238E27FC236}">
+                <a16:creationId xmlns:a16="http://schemas.microsoft.com/office/drawing/2014/main" id="{4CE279B2-1B26-4C7F-A5F1-4A49F01E5E75}"/>
+              </a:ext>
+            </a:extLst>
+          </p:cNvPr>
+          <p:cNvSpPr/>
+          <p:nvPr/>
+        </p:nvSpPr>
+        <p:spPr>
+          <a:xfrm>
+            <a:off x="7374678" y="1023160"/>
+            <a:ext cx="1799898" cy="609845"/>
+          </a:xfrm>
+          <a:prstGeom prst="rect">
+            <a:avLst/>
+          </a:prstGeom>
+          <a:solidFill>
+            <a:schemeClr val="bg1">
+              <a:lumMod val="95000"/>
+            </a:schemeClr>
+          </a:solidFill>
+        </p:spPr>
+        <p:style>
+          <a:lnRef idx="2">
+            <a:schemeClr val="dk1"/>
+          </a:lnRef>
+          <a:fillRef idx="1">
+            <a:schemeClr val="lt1"/>
+          </a:fillRef>
+          <a:effectRef idx="0">
+            <a:schemeClr val="dk1"/>
+          </a:effectRef>
+          <a:fontRef idx="minor">
+            <a:schemeClr val="dk1"/>
+          </a:fontRef>
+        </p:style>
+        <p:txBody>
+          <a:bodyPr rtlCol="0" anchor="ctr"/>
+          <a:lstStyle/>
+          <a:p>
+            <a:pPr algn="ctr"/>
+            <a:r>
+              <a:rPr lang="en-US" altLang="zh-CN" dirty="0">
+                <a:latin typeface="Times New Roman" panose="02020603050405020304" pitchFamily="18" charset="0"/>
+                <a:ea typeface="宋体" panose="02010600030101010101" pitchFamily="2" charset="-122"/>
+              </a:rPr>
+              <a:t>CLOSED</a:t>
+            </a:r>
+            <a:endParaRPr lang="zh-CN" altLang="en-US" dirty="0">
+              <a:latin typeface="Times New Roman" panose="02020603050405020304" pitchFamily="18" charset="0"/>
+              <a:ea typeface="宋体" panose="02010600030101010101" pitchFamily="2" charset="-122"/>
+            </a:endParaRPr>
+          </a:p>
+        </p:txBody>
+      </p:sp>
+      <p:sp>
+        <p:nvSpPr>
+          <p:cNvPr id="50" name="矩形 49">
+            <a:extLst>
+              <a:ext uri="{FF2B5EF4-FFF2-40B4-BE49-F238E27FC236}">
+                <a16:creationId xmlns:a16="http://schemas.microsoft.com/office/drawing/2014/main" id="{585F5249-D3A0-4391-BAF2-12706F0CAD76}"/>
+              </a:ext>
+            </a:extLst>
+          </p:cNvPr>
+          <p:cNvSpPr/>
+          <p:nvPr/>
+        </p:nvSpPr>
+        <p:spPr>
+          <a:xfrm>
+            <a:off x="7374678" y="1762818"/>
+            <a:ext cx="1799898" cy="673436"/>
+          </a:xfrm>
+          <a:prstGeom prst="rect">
+            <a:avLst/>
+          </a:prstGeom>
+        </p:spPr>
+        <p:style>
+          <a:lnRef idx="2">
+            <a:schemeClr val="dk1"/>
+          </a:lnRef>
+          <a:fillRef idx="1">
+            <a:schemeClr val="lt1"/>
+          </a:fillRef>
+          <a:effectRef idx="0">
+            <a:schemeClr val="dk1"/>
+          </a:effectRef>
+          <a:fontRef idx="minor">
+            <a:schemeClr val="dk1"/>
+          </a:fontRef>
+        </p:style>
+        <p:txBody>
+          <a:bodyPr rtlCol="0" anchor="ctr"/>
+          <a:lstStyle/>
+          <a:p>
+            <a:pPr algn="ctr"/>
+            <a:r>
+              <a:rPr lang="en-US" altLang="zh-CN" dirty="0">
+                <a:latin typeface="Times New Roman" panose="02020603050405020304" pitchFamily="18" charset="0"/>
+                <a:ea typeface="宋体" panose="02010600030101010101" pitchFamily="2" charset="-122"/>
+              </a:rPr>
+              <a:t>LISTEN</a:t>
+            </a:r>
+            <a:endParaRPr lang="zh-CN" altLang="en-US" dirty="0">
+              <a:latin typeface="Times New Roman" panose="02020603050405020304" pitchFamily="18" charset="0"/>
+              <a:ea typeface="宋体" panose="02010600030101010101" pitchFamily="2" charset="-122"/>
+            </a:endParaRPr>
+          </a:p>
+        </p:txBody>
+      </p:sp>
+      <p:sp>
+        <p:nvSpPr>
+          <p:cNvPr id="51" name="矩形 50">
+            <a:extLst>
+              <a:ext uri="{FF2B5EF4-FFF2-40B4-BE49-F238E27FC236}">
+                <a16:creationId xmlns:a16="http://schemas.microsoft.com/office/drawing/2014/main" id="{70D0744A-83AA-488D-B93F-6E26274A2EAB}"/>
+              </a:ext>
+            </a:extLst>
+          </p:cNvPr>
+          <p:cNvSpPr/>
+          <p:nvPr/>
+        </p:nvSpPr>
+        <p:spPr>
+          <a:xfrm>
+            <a:off x="7374678" y="2566067"/>
+            <a:ext cx="1799896" cy="1499101"/>
+          </a:xfrm>
+          <a:prstGeom prst="rect">
+            <a:avLst/>
+          </a:prstGeom>
+        </p:spPr>
+        <p:style>
+          <a:lnRef idx="2">
+            <a:schemeClr val="dk1"/>
+          </a:lnRef>
+          <a:fillRef idx="1">
+            <a:schemeClr val="lt1"/>
+          </a:fillRef>
+          <a:effectRef idx="0">
+            <a:schemeClr val="dk1"/>
+          </a:effectRef>
+          <a:fontRef idx="minor">
+            <a:schemeClr val="dk1"/>
+          </a:fontRef>
+        </p:style>
+        <p:txBody>
+          <a:bodyPr rtlCol="0" anchor="ctr"/>
+          <a:lstStyle/>
+          <a:p>
+            <a:pPr algn="ctr"/>
+            <a:r>
+              <a:rPr lang="en-US" altLang="zh-CN" dirty="0">
+                <a:latin typeface="Times New Roman" panose="02020603050405020304" pitchFamily="18" charset="0"/>
+                <a:ea typeface="宋体" panose="02010600030101010101" pitchFamily="2" charset="-122"/>
+              </a:rPr>
+              <a:t>SYN-RCVD</a:t>
+            </a:r>
+            <a:endParaRPr lang="zh-CN" altLang="en-US" dirty="0">
+              <a:latin typeface="Times New Roman" panose="02020603050405020304" pitchFamily="18" charset="0"/>
+              <a:ea typeface="宋体" panose="02010600030101010101" pitchFamily="2" charset="-122"/>
+            </a:endParaRPr>
+          </a:p>
+        </p:txBody>
+      </p:sp>
+      <p:sp>
+        <p:nvSpPr>
+          <p:cNvPr id="54" name="矩形 53">
+            <a:extLst>
+              <a:ext uri="{FF2B5EF4-FFF2-40B4-BE49-F238E27FC236}">
+                <a16:creationId xmlns:a16="http://schemas.microsoft.com/office/drawing/2014/main" id="{884385DC-D0AD-47D5-8B92-11171335595C}"/>
+              </a:ext>
+            </a:extLst>
+          </p:cNvPr>
+          <p:cNvSpPr/>
+          <p:nvPr/>
+        </p:nvSpPr>
+        <p:spPr>
+          <a:xfrm>
+            <a:off x="7374672" y="4197459"/>
+            <a:ext cx="1799898" cy="789408"/>
+          </a:xfrm>
+          <a:prstGeom prst="rect">
+            <a:avLst/>
+          </a:prstGeom>
+          <a:solidFill>
+            <a:schemeClr val="accent2">
+              <a:lumMod val="20000"/>
+              <a:lumOff val="80000"/>
+            </a:schemeClr>
+          </a:solidFill>
+        </p:spPr>
+        <p:style>
+          <a:lnRef idx="2">
+            <a:schemeClr val="dk1"/>
+          </a:lnRef>
+          <a:fillRef idx="1">
+            <a:schemeClr val="lt1"/>
+          </a:fillRef>
+          <a:effectRef idx="0">
+            <a:schemeClr val="dk1"/>
+          </a:effectRef>
+          <a:fontRef idx="minor">
+            <a:schemeClr val="dk1"/>
+          </a:fontRef>
+        </p:style>
+        <p:txBody>
+          <a:bodyPr rtlCol="0" anchor="ctr"/>
+          <a:lstStyle/>
+          <a:p>
+            <a:pPr algn="ctr"/>
+            <a:r>
+              <a:rPr lang="en-US" altLang="zh-CN" dirty="0">
+                <a:latin typeface="Times New Roman" panose="02020603050405020304" pitchFamily="18" charset="0"/>
+                <a:ea typeface="宋体" panose="02010600030101010101" pitchFamily="2" charset="-122"/>
+              </a:rPr>
+              <a:t>ESTABLISHED</a:t>
+            </a:r>
+            <a:endParaRPr lang="zh-CN" altLang="en-US" dirty="0">
+              <a:latin typeface="Times New Roman" panose="02020603050405020304" pitchFamily="18" charset="0"/>
+              <a:ea typeface="宋体" panose="02010600030101010101" pitchFamily="2" charset="-122"/>
+            </a:endParaRPr>
+          </a:p>
+        </p:txBody>
+      </p:sp>
+    </p:spTree>
+    <p:extLst>
+      <p:ext uri="{BB962C8B-B14F-4D97-AF65-F5344CB8AC3E}">
+        <p14:creationId xmlns:p14="http://schemas.microsoft.com/office/powerpoint/2010/main" val="2909551444"/>
+      </p:ext>
+    </p:extLst>
+  </p:cSld>
+  <p:clrMapOvr>
+    <a:masterClrMapping/>
+  </p:clrMapOvr>
+</p:sld>
+</file>
+
+<file path=ppt/slides/slide3.xml><?xml version="1.0" encoding="utf-8"?>
+<p:sld xmlns:a="http://schemas.openxmlformats.org/drawingml/2006/main" xmlns:r="http://schemas.openxmlformats.org/officeDocument/2006/relationships" xmlns:p="http://schemas.openxmlformats.org/presentationml/2006/main">
+  <p:cSld>
+    <p:spTree>
+      <p:nvGrpSpPr>
+        <p:cNvPr id="1" name=""/>
+        <p:cNvGrpSpPr/>
+        <p:nvPr/>
+      </p:nvGrpSpPr>
+      <p:grpSpPr>
+        <a:xfrm>
+          <a:off x="0" y="0"/>
+          <a:ext cx="0" cy="0"/>
+          <a:chOff x="0" y="0"/>
+          <a:chExt cx="0" cy="0"/>
+        </a:xfrm>
+      </p:grpSpPr>
+      <p:cxnSp>
+        <p:nvCxnSpPr>
+          <p:cNvPr id="7" name="直接箭头连接符 6">
+            <a:extLst>
+              <a:ext uri="{FF2B5EF4-FFF2-40B4-BE49-F238E27FC236}">
+                <a16:creationId xmlns:a16="http://schemas.microsoft.com/office/drawing/2014/main" id="{7919863F-1D0A-4F4D-90B4-480AE7A1681F}"/>
+              </a:ext>
+            </a:extLst>
+          </p:cNvPr>
+          <p:cNvCxnSpPr>
+            <a:cxnSpLocks/>
+          </p:cNvCxnSpPr>
+          <p:nvPr/>
+        </p:nvCxnSpPr>
+        <p:spPr>
+          <a:xfrm>
+            <a:off x="3145971" y="981777"/>
+            <a:ext cx="0" cy="4005090"/>
+          </a:xfrm>
+          <a:prstGeom prst="straightConnector1">
+            <a:avLst/>
+          </a:prstGeom>
+          <a:ln w="28575">
+            <a:tailEnd type="triangle"/>
+          </a:ln>
+        </p:spPr>
+        <p:style>
+          <a:lnRef idx="1">
+            <a:schemeClr val="dk1"/>
+          </a:lnRef>
+          <a:fillRef idx="0">
+            <a:schemeClr val="dk1"/>
+          </a:fillRef>
+          <a:effectRef idx="0">
+            <a:schemeClr val="dk1"/>
+          </a:effectRef>
+          <a:fontRef idx="minor">
+            <a:schemeClr val="tx1"/>
+          </a:fontRef>
+        </p:style>
+      </p:cxnSp>
+      <p:cxnSp>
+        <p:nvCxnSpPr>
+          <p:cNvPr id="8" name="直接箭头连接符 7">
+            <a:extLst>
+              <a:ext uri="{FF2B5EF4-FFF2-40B4-BE49-F238E27FC236}">
+                <a16:creationId xmlns:a16="http://schemas.microsoft.com/office/drawing/2014/main" id="{ECA5D9A2-B978-4E8B-910E-FE11463F6A75}"/>
+              </a:ext>
+            </a:extLst>
+          </p:cNvPr>
+          <p:cNvCxnSpPr>
+            <a:cxnSpLocks/>
+          </p:cNvCxnSpPr>
+          <p:nvPr/>
+        </p:nvCxnSpPr>
+        <p:spPr>
+          <a:xfrm>
+            <a:off x="7129223" y="981777"/>
+            <a:ext cx="0" cy="4005089"/>
+          </a:xfrm>
+          <a:prstGeom prst="straightConnector1">
+            <a:avLst/>
+          </a:prstGeom>
+          <a:ln w="28575">
+            <a:tailEnd type="triangle"/>
+          </a:ln>
+        </p:spPr>
+        <p:style>
+          <a:lnRef idx="1">
+            <a:schemeClr val="dk1"/>
+          </a:lnRef>
+          <a:fillRef idx="0">
+            <a:schemeClr val="dk1"/>
+          </a:fillRef>
+          <a:effectRef idx="0">
+            <a:schemeClr val="dk1"/>
+          </a:effectRef>
+          <a:fontRef idx="minor">
+            <a:schemeClr val="tx1"/>
+          </a:fontRef>
+        </p:style>
+      </p:cxnSp>
+      <p:sp>
+        <p:nvSpPr>
+          <p:cNvPr id="9" name="文本框 8">
+            <a:extLst>
+              <a:ext uri="{FF2B5EF4-FFF2-40B4-BE49-F238E27FC236}">
+                <a16:creationId xmlns:a16="http://schemas.microsoft.com/office/drawing/2014/main" id="{6BEB7CD8-DC7B-4BE0-8D1F-CCBA698084CA}"/>
+              </a:ext>
+            </a:extLst>
+          </p:cNvPr>
+          <p:cNvSpPr txBox="1"/>
+          <p:nvPr/>
+        </p:nvSpPr>
+        <p:spPr>
+          <a:xfrm>
+            <a:off x="2668916" y="363179"/>
+            <a:ext cx="954107" cy="400110"/>
+          </a:xfrm>
+          <a:prstGeom prst="rect">
+            <a:avLst/>
+          </a:prstGeom>
+          <a:noFill/>
+        </p:spPr>
+        <p:txBody>
+          <a:bodyPr wrap="none" rtlCol="0">
+            <a:spAutoFit/>
+          </a:bodyPr>
+          <a:lstStyle/>
+          <a:p>
+            <a:r>
+              <a:rPr lang="zh-CN" altLang="en-US" sz="2000" dirty="0">
+                <a:latin typeface="Times New Roman" panose="02020603050405020304" pitchFamily="18" charset="0"/>
+                <a:ea typeface="宋体" panose="02010600030101010101" pitchFamily="2" charset="-122"/>
+              </a:rPr>
+              <a:t>客户端</a:t>
+            </a:r>
+          </a:p>
+        </p:txBody>
+      </p:sp>
+      <p:sp>
+        <p:nvSpPr>
+          <p:cNvPr id="10" name="文本框 9">
+            <a:extLst>
+              <a:ext uri="{FF2B5EF4-FFF2-40B4-BE49-F238E27FC236}">
+                <a16:creationId xmlns:a16="http://schemas.microsoft.com/office/drawing/2014/main" id="{AD22C7C4-DAB4-455C-A5A6-ED18AC146A4F}"/>
+              </a:ext>
+            </a:extLst>
+          </p:cNvPr>
+          <p:cNvSpPr txBox="1"/>
+          <p:nvPr/>
+        </p:nvSpPr>
+        <p:spPr>
+          <a:xfrm>
+            <a:off x="6652169" y="363179"/>
+            <a:ext cx="954107" cy="400110"/>
+          </a:xfrm>
+          <a:prstGeom prst="rect">
+            <a:avLst/>
+          </a:prstGeom>
+          <a:noFill/>
+        </p:spPr>
+        <p:txBody>
+          <a:bodyPr wrap="none" rtlCol="0">
+            <a:spAutoFit/>
+          </a:bodyPr>
+          <a:lstStyle/>
+          <a:p>
+            <a:r>
+              <a:rPr lang="zh-CN" altLang="en-US" sz="2000" dirty="0">
+                <a:latin typeface="Times New Roman" panose="02020603050405020304" pitchFamily="18" charset="0"/>
+                <a:ea typeface="宋体" panose="02010600030101010101" pitchFamily="2" charset="-122"/>
+              </a:rPr>
+              <a:t>服务器</a:t>
+            </a:r>
+          </a:p>
+        </p:txBody>
+      </p:sp>
+      <p:cxnSp>
+        <p:nvCxnSpPr>
+          <p:cNvPr id="12" name="直接箭头连接符 11">
+            <a:extLst>
+              <a:ext uri="{FF2B5EF4-FFF2-40B4-BE49-F238E27FC236}">
+                <a16:creationId xmlns:a16="http://schemas.microsoft.com/office/drawing/2014/main" id="{C88BA41B-BEA2-4BF7-99C7-007B9FDEBDFF}"/>
+              </a:ext>
+            </a:extLst>
+          </p:cNvPr>
+          <p:cNvCxnSpPr>
+            <a:cxnSpLocks/>
+          </p:cNvCxnSpPr>
+          <p:nvPr/>
+        </p:nvCxnSpPr>
+        <p:spPr>
+          <a:xfrm>
+            <a:off x="3145970" y="1771048"/>
+            <a:ext cx="3983253" cy="665206"/>
+          </a:xfrm>
+          <a:prstGeom prst="straightConnector1">
+            <a:avLst/>
+          </a:prstGeom>
+          <a:ln w="25400">
+            <a:solidFill>
+              <a:srgbClr val="00B0F0"/>
+            </a:solidFill>
+            <a:headEnd w="lg" len="lg"/>
+            <a:tailEnd type="triangle" w="lg" len="lg"/>
+          </a:ln>
+        </p:spPr>
+        <p:style>
+          <a:lnRef idx="1">
+            <a:schemeClr val="dk1"/>
+          </a:lnRef>
+          <a:fillRef idx="0">
+            <a:schemeClr val="dk1"/>
+          </a:fillRef>
+          <a:effectRef idx="0">
+            <a:schemeClr val="dk1"/>
+          </a:effectRef>
+          <a:fontRef idx="minor">
+            <a:schemeClr val="tx1"/>
+          </a:fontRef>
+        </p:style>
+      </p:cxnSp>
+      <p:sp>
+        <p:nvSpPr>
+          <p:cNvPr id="14" name="文本框 13">
+            <a:extLst>
+              <a:ext uri="{FF2B5EF4-FFF2-40B4-BE49-F238E27FC236}">
+                <a16:creationId xmlns:a16="http://schemas.microsoft.com/office/drawing/2014/main" id="{B8607656-FBF0-4B11-A1CB-81C9528A6FC1}"/>
+              </a:ext>
+            </a:extLst>
+          </p:cNvPr>
+          <p:cNvSpPr txBox="1"/>
+          <p:nvPr/>
+        </p:nvSpPr>
+        <p:spPr>
+          <a:xfrm rot="546195">
+            <a:off x="4630860" y="1735357"/>
+            <a:ext cx="1353256" cy="369332"/>
+          </a:xfrm>
+          <a:prstGeom prst="rect">
+            <a:avLst/>
+          </a:prstGeom>
+          <a:noFill/>
+        </p:spPr>
+        <p:txBody>
+          <a:bodyPr wrap="none" rtlCol="0">
+            <a:spAutoFit/>
+          </a:bodyPr>
+          <a:lstStyle/>
+          <a:p>
+            <a:r>
+              <a:rPr lang="en-US" altLang="zh-CN" dirty="0">
+                <a:latin typeface="Times New Roman" panose="02020603050405020304" pitchFamily="18" charset="0"/>
+                <a:ea typeface="宋体" panose="02010600030101010101" pitchFamily="2" charset="-122"/>
+              </a:rPr>
+              <a:t>Seq=p, SYN</a:t>
+            </a:r>
+            <a:endParaRPr lang="zh-CN" altLang="en-US" dirty="0">
+              <a:latin typeface="Times New Roman" panose="02020603050405020304" pitchFamily="18" charset="0"/>
+              <a:ea typeface="宋体" panose="02010600030101010101" pitchFamily="2" charset="-122"/>
+            </a:endParaRPr>
+          </a:p>
+        </p:txBody>
+      </p:sp>
+      <p:cxnSp>
+        <p:nvCxnSpPr>
+          <p:cNvPr id="15" name="直接箭头连接符 14">
+            <a:extLst>
+              <a:ext uri="{FF2B5EF4-FFF2-40B4-BE49-F238E27FC236}">
+                <a16:creationId xmlns:a16="http://schemas.microsoft.com/office/drawing/2014/main" id="{98A0487F-E192-4584-9089-676CA58FF6B4}"/>
+              </a:ext>
+            </a:extLst>
+          </p:cNvPr>
+          <p:cNvCxnSpPr>
+            <a:cxnSpLocks/>
+          </p:cNvCxnSpPr>
+          <p:nvPr/>
+        </p:nvCxnSpPr>
+        <p:spPr>
+          <a:xfrm flipH="1">
+            <a:off x="3158721" y="2605250"/>
+            <a:ext cx="3986287" cy="669360"/>
+          </a:xfrm>
+          <a:prstGeom prst="straightConnector1">
+            <a:avLst/>
+          </a:prstGeom>
+          <a:ln w="25400">
+            <a:solidFill>
+              <a:srgbClr val="00B050"/>
+            </a:solidFill>
+            <a:tailEnd type="triangle" w="lg" len="lg"/>
+          </a:ln>
+        </p:spPr>
+        <p:style>
+          <a:lnRef idx="1">
+            <a:schemeClr val="dk1"/>
+          </a:lnRef>
+          <a:fillRef idx="0">
+            <a:schemeClr val="dk1"/>
+          </a:fillRef>
+          <a:effectRef idx="0">
+            <a:schemeClr val="dk1"/>
+          </a:effectRef>
+          <a:fontRef idx="minor">
+            <a:schemeClr val="tx1"/>
+          </a:fontRef>
+        </p:style>
+      </p:cxnSp>
+      <p:sp>
+        <p:nvSpPr>
+          <p:cNvPr id="20" name="文本框 19">
+            <a:extLst>
+              <a:ext uri="{FF2B5EF4-FFF2-40B4-BE49-F238E27FC236}">
+                <a16:creationId xmlns:a16="http://schemas.microsoft.com/office/drawing/2014/main" id="{8FDB8DBC-159F-48E7-A8AD-5CA470021148}"/>
+              </a:ext>
+            </a:extLst>
+          </p:cNvPr>
+          <p:cNvSpPr txBox="1"/>
+          <p:nvPr/>
+        </p:nvSpPr>
+        <p:spPr>
+          <a:xfrm rot="21060000">
+            <a:off x="3835805" y="2512592"/>
+            <a:ext cx="2418739" cy="369332"/>
+          </a:xfrm>
+          <a:prstGeom prst="rect">
+            <a:avLst/>
+          </a:prstGeom>
+          <a:noFill/>
+        </p:spPr>
+        <p:txBody>
+          <a:bodyPr wrap="none" rtlCol="0">
+            <a:spAutoFit/>
+          </a:bodyPr>
+          <a:lstStyle/>
+          <a:p>
+            <a:r>
+              <a:rPr lang="en-US" altLang="zh-CN" dirty="0">
+                <a:latin typeface="Times New Roman" panose="02020603050405020304" pitchFamily="18" charset="0"/>
+                <a:ea typeface="宋体" panose="02010600030101010101" pitchFamily="2" charset="-122"/>
+              </a:rPr>
+              <a:t>Seq=y, SYN, ACK=x+1</a:t>
+            </a:r>
+            <a:endParaRPr lang="zh-CN" altLang="en-US" dirty="0">
+              <a:latin typeface="Times New Roman" panose="02020603050405020304" pitchFamily="18" charset="0"/>
+              <a:ea typeface="宋体" panose="02010600030101010101" pitchFamily="2" charset="-122"/>
+            </a:endParaRPr>
+          </a:p>
+        </p:txBody>
+      </p:sp>
+      <p:sp>
+        <p:nvSpPr>
+          <p:cNvPr id="28" name="文本框 27">
+            <a:extLst>
+              <a:ext uri="{FF2B5EF4-FFF2-40B4-BE49-F238E27FC236}">
+                <a16:creationId xmlns:a16="http://schemas.microsoft.com/office/drawing/2014/main" id="{84CD8D4F-766C-435E-BA35-D93EF9E49689}"/>
+              </a:ext>
+            </a:extLst>
+          </p:cNvPr>
+          <p:cNvSpPr txBox="1"/>
+          <p:nvPr/>
+        </p:nvSpPr>
+        <p:spPr>
+          <a:xfrm rot="540000">
+            <a:off x="4256526" y="3404680"/>
+            <a:ext cx="2101922" cy="369332"/>
+          </a:xfrm>
+          <a:prstGeom prst="rect">
+            <a:avLst/>
+          </a:prstGeom>
+          <a:noFill/>
+        </p:spPr>
+        <p:txBody>
+          <a:bodyPr wrap="none" rtlCol="0">
+            <a:spAutoFit/>
+          </a:bodyPr>
+          <a:lstStyle/>
+          <a:p>
+            <a:r>
+              <a:rPr lang="en-US" altLang="zh-CN" dirty="0">
+                <a:latin typeface="Times New Roman" panose="02020603050405020304" pitchFamily="18" charset="0"/>
+                <a:ea typeface="宋体" panose="02010600030101010101" pitchFamily="2" charset="-122"/>
+              </a:rPr>
+              <a:t>Seq=x+1, ACK=y+1</a:t>
+            </a:r>
+            <a:endParaRPr lang="zh-CN" altLang="en-US" dirty="0">
+              <a:latin typeface="Times New Roman" panose="02020603050405020304" pitchFamily="18" charset="0"/>
+              <a:ea typeface="宋体" panose="02010600030101010101" pitchFamily="2" charset="-122"/>
+            </a:endParaRPr>
+          </a:p>
+        </p:txBody>
+      </p:sp>
+      <p:sp>
+        <p:nvSpPr>
+          <p:cNvPr id="33" name="矩形 32">
+            <a:extLst>
+              <a:ext uri="{FF2B5EF4-FFF2-40B4-BE49-F238E27FC236}">
+                <a16:creationId xmlns:a16="http://schemas.microsoft.com/office/drawing/2014/main" id="{AA5164E7-357C-4754-9A18-65FF6AE3B149}"/>
+              </a:ext>
+            </a:extLst>
+          </p:cNvPr>
+          <p:cNvSpPr/>
+          <p:nvPr/>
+        </p:nvSpPr>
+        <p:spPr>
+          <a:xfrm>
+            <a:off x="1117709" y="1024909"/>
+            <a:ext cx="1799898" cy="609845"/>
+          </a:xfrm>
+          <a:prstGeom prst="rect">
+            <a:avLst/>
+          </a:prstGeom>
+          <a:solidFill>
+            <a:schemeClr val="accent2">
+              <a:lumMod val="20000"/>
+              <a:lumOff val="80000"/>
+            </a:schemeClr>
+          </a:solidFill>
+        </p:spPr>
+        <p:style>
+          <a:lnRef idx="2">
+            <a:schemeClr val="dk1"/>
+          </a:lnRef>
+          <a:fillRef idx="1">
+            <a:schemeClr val="lt1"/>
+          </a:fillRef>
+          <a:effectRef idx="0">
+            <a:schemeClr val="dk1"/>
+          </a:effectRef>
+          <a:fontRef idx="minor">
+            <a:schemeClr val="dk1"/>
+          </a:fontRef>
+        </p:style>
+        <p:txBody>
+          <a:bodyPr rtlCol="0" anchor="ctr"/>
+          <a:lstStyle/>
+          <a:p>
+            <a:pPr algn="ctr"/>
+            <a:r>
+              <a:rPr lang="en-US" altLang="zh-CN" dirty="0">
+                <a:latin typeface="Times New Roman" panose="02020603050405020304" pitchFamily="18" charset="0"/>
+                <a:ea typeface="宋体" panose="02010600030101010101" pitchFamily="2" charset="-122"/>
+              </a:rPr>
+              <a:t>ESTABLISHED</a:t>
+            </a:r>
+            <a:endParaRPr lang="zh-CN" altLang="en-US" dirty="0">
+              <a:latin typeface="Times New Roman" panose="02020603050405020304" pitchFamily="18" charset="0"/>
+              <a:ea typeface="宋体" panose="02010600030101010101" pitchFamily="2" charset="-122"/>
+            </a:endParaRPr>
+          </a:p>
+        </p:txBody>
+      </p:sp>
+      <p:sp>
+        <p:nvSpPr>
+          <p:cNvPr id="34" name="矩形 33">
+            <a:extLst>
+              <a:ext uri="{FF2B5EF4-FFF2-40B4-BE49-F238E27FC236}">
+                <a16:creationId xmlns:a16="http://schemas.microsoft.com/office/drawing/2014/main" id="{01BB7D4D-1102-4B7F-8432-3250990103DD}"/>
+              </a:ext>
+            </a:extLst>
+          </p:cNvPr>
+          <p:cNvSpPr/>
+          <p:nvPr/>
+        </p:nvSpPr>
+        <p:spPr>
+          <a:xfrm>
+            <a:off x="1117707" y="1762818"/>
+            <a:ext cx="1799899" cy="1511792"/>
+          </a:xfrm>
+          <a:prstGeom prst="rect">
+            <a:avLst/>
+          </a:prstGeom>
+        </p:spPr>
+        <p:style>
+          <a:lnRef idx="2">
+            <a:schemeClr val="dk1"/>
+          </a:lnRef>
+          <a:fillRef idx="1">
+            <a:schemeClr val="lt1"/>
+          </a:fillRef>
+          <a:effectRef idx="0">
+            <a:schemeClr val="dk1"/>
+          </a:effectRef>
+          <a:fontRef idx="minor">
+            <a:schemeClr val="dk1"/>
+          </a:fontRef>
+        </p:style>
+        <p:txBody>
+          <a:bodyPr rtlCol="0" anchor="ctr"/>
+          <a:lstStyle/>
+          <a:p>
+            <a:pPr algn="ctr"/>
+            <a:r>
+              <a:rPr lang="en-US" altLang="zh-CN" dirty="0">
+                <a:latin typeface="Times New Roman" panose="02020603050405020304" pitchFamily="18" charset="0"/>
+                <a:ea typeface="宋体" panose="02010600030101010101" pitchFamily="2" charset="-122"/>
+              </a:rPr>
+              <a:t>SYN-SENT</a:t>
+            </a:r>
+            <a:endParaRPr lang="zh-CN" altLang="en-US" sz="2000" dirty="0">
+              <a:latin typeface="Times New Roman" panose="02020603050405020304" pitchFamily="18" charset="0"/>
+              <a:ea typeface="宋体" panose="02010600030101010101" pitchFamily="2" charset="-122"/>
+            </a:endParaRPr>
+          </a:p>
+        </p:txBody>
+      </p:sp>
+      <p:sp>
+        <p:nvSpPr>
+          <p:cNvPr id="35" name="矩形 34">
+            <a:extLst>
+              <a:ext uri="{FF2B5EF4-FFF2-40B4-BE49-F238E27FC236}">
+                <a16:creationId xmlns:a16="http://schemas.microsoft.com/office/drawing/2014/main" id="{6F881133-A9D2-4165-8D7B-DB2CD6D1CD62}"/>
+              </a:ext>
+            </a:extLst>
+          </p:cNvPr>
+          <p:cNvSpPr/>
+          <p:nvPr/>
+        </p:nvSpPr>
+        <p:spPr>
+          <a:xfrm>
+            <a:off x="1117708" y="3428999"/>
+            <a:ext cx="1799900" cy="1557867"/>
+          </a:xfrm>
+          <a:prstGeom prst="rect">
+            <a:avLst/>
+          </a:prstGeom>
+          <a:solidFill>
+            <a:schemeClr val="accent2">
+              <a:lumMod val="20000"/>
+              <a:lumOff val="80000"/>
+            </a:schemeClr>
+          </a:solidFill>
+        </p:spPr>
+        <p:style>
+          <a:lnRef idx="2">
+            <a:schemeClr val="dk1"/>
+          </a:lnRef>
+          <a:fillRef idx="1">
+            <a:schemeClr val="lt1"/>
+          </a:fillRef>
+          <a:effectRef idx="0">
+            <a:schemeClr val="dk1"/>
+          </a:effectRef>
+          <a:fontRef idx="minor">
+            <a:schemeClr val="dk1"/>
+          </a:fontRef>
+        </p:style>
+        <p:txBody>
+          <a:bodyPr rtlCol="0" anchor="ctr"/>
+          <a:lstStyle/>
+          <a:p>
+            <a:pPr algn="ctr"/>
+            <a:r>
+              <a:rPr lang="en-US" altLang="zh-CN" dirty="0">
+                <a:latin typeface="Times New Roman" panose="02020603050405020304" pitchFamily="18" charset="0"/>
+                <a:ea typeface="宋体" panose="02010600030101010101" pitchFamily="2" charset="-122"/>
+              </a:rPr>
+              <a:t>ESTABLISHED</a:t>
+            </a:r>
+            <a:endParaRPr lang="zh-CN" altLang="en-US" dirty="0">
+              <a:latin typeface="Times New Roman" panose="02020603050405020304" pitchFamily="18" charset="0"/>
+              <a:ea typeface="宋体" panose="02010600030101010101" pitchFamily="2" charset="-122"/>
+            </a:endParaRPr>
+          </a:p>
+        </p:txBody>
+      </p:sp>
+      <p:cxnSp>
+        <p:nvCxnSpPr>
+          <p:cNvPr id="38" name="直接箭头连接符 37">
+            <a:extLst>
+              <a:ext uri="{FF2B5EF4-FFF2-40B4-BE49-F238E27FC236}">
+                <a16:creationId xmlns:a16="http://schemas.microsoft.com/office/drawing/2014/main" id="{A21F9FB0-59F7-49CA-8BE9-FB2E7E5E02FE}"/>
+              </a:ext>
+            </a:extLst>
+          </p:cNvPr>
+          <p:cNvCxnSpPr>
+            <a:cxnSpLocks/>
+          </p:cNvCxnSpPr>
+          <p:nvPr/>
+        </p:nvCxnSpPr>
+        <p:spPr>
+          <a:xfrm>
+            <a:off x="3151168" y="3435069"/>
+            <a:ext cx="3983253" cy="665206"/>
+          </a:xfrm>
+          <a:prstGeom prst="straightConnector1">
+            <a:avLst/>
+          </a:prstGeom>
+          <a:ln w="25400">
+            <a:solidFill>
+              <a:srgbClr val="00B0F0"/>
+            </a:solidFill>
+            <a:headEnd w="lg" len="lg"/>
+            <a:tailEnd type="triangle" w="lg" len="lg"/>
+          </a:ln>
+        </p:spPr>
+        <p:style>
+          <a:lnRef idx="1">
+            <a:schemeClr val="dk1"/>
+          </a:lnRef>
+          <a:fillRef idx="0">
+            <a:schemeClr val="dk1"/>
+          </a:fillRef>
+          <a:effectRef idx="0">
+            <a:schemeClr val="dk1"/>
+          </a:effectRef>
+          <a:fontRef idx="minor">
+            <a:schemeClr val="tx1"/>
+          </a:fontRef>
+        </p:style>
+      </p:cxnSp>
+      <p:sp>
+        <p:nvSpPr>
+          <p:cNvPr id="49" name="矩形 48">
+            <a:extLst>
+              <a:ext uri="{FF2B5EF4-FFF2-40B4-BE49-F238E27FC236}">
+                <a16:creationId xmlns:a16="http://schemas.microsoft.com/office/drawing/2014/main" id="{4CE279B2-1B26-4C7F-A5F1-4A49F01E5E75}"/>
+              </a:ext>
+            </a:extLst>
+          </p:cNvPr>
+          <p:cNvSpPr/>
+          <p:nvPr/>
+        </p:nvSpPr>
+        <p:spPr>
+          <a:xfrm>
+            <a:off x="7374678" y="1023160"/>
+            <a:ext cx="1799898" cy="609845"/>
+          </a:xfrm>
+          <a:prstGeom prst="rect">
+            <a:avLst/>
+          </a:prstGeom>
+          <a:solidFill>
+            <a:schemeClr val="accent2">
+              <a:lumMod val="20000"/>
+              <a:lumOff val="80000"/>
+            </a:schemeClr>
+          </a:solidFill>
+        </p:spPr>
+        <p:style>
+          <a:lnRef idx="2">
+            <a:schemeClr val="dk1"/>
+          </a:lnRef>
+          <a:fillRef idx="1">
+            <a:schemeClr val="lt1"/>
+          </a:fillRef>
+          <a:effectRef idx="0">
+            <a:schemeClr val="dk1"/>
+          </a:effectRef>
+          <a:fontRef idx="minor">
+            <a:schemeClr val="dk1"/>
+          </a:fontRef>
+        </p:style>
+        <p:txBody>
+          <a:bodyPr rtlCol="0" anchor="ctr"/>
+          <a:lstStyle/>
+          <a:p>
+            <a:pPr algn="ctr"/>
+            <a:r>
+              <a:rPr lang="en-US" altLang="zh-CN" dirty="0">
+                <a:latin typeface="Times New Roman" panose="02020603050405020304" pitchFamily="18" charset="0"/>
+                <a:ea typeface="宋体" panose="02010600030101010101" pitchFamily="2" charset="-122"/>
+              </a:rPr>
+              <a:t>ESTABLISHED</a:t>
+            </a:r>
+            <a:endParaRPr lang="zh-CN" altLang="en-US" dirty="0">
+              <a:latin typeface="Times New Roman" panose="02020603050405020304" pitchFamily="18" charset="0"/>
+              <a:ea typeface="宋体" panose="02010600030101010101" pitchFamily="2" charset="-122"/>
+            </a:endParaRPr>
+          </a:p>
+        </p:txBody>
+      </p:sp>
+      <p:sp>
+        <p:nvSpPr>
+          <p:cNvPr id="50" name="矩形 49">
+            <a:extLst>
+              <a:ext uri="{FF2B5EF4-FFF2-40B4-BE49-F238E27FC236}">
+                <a16:creationId xmlns:a16="http://schemas.microsoft.com/office/drawing/2014/main" id="{585F5249-D3A0-4391-BAF2-12706F0CAD76}"/>
+              </a:ext>
+            </a:extLst>
+          </p:cNvPr>
+          <p:cNvSpPr/>
+          <p:nvPr/>
+        </p:nvSpPr>
+        <p:spPr>
+          <a:xfrm>
+            <a:off x="7374678" y="1762818"/>
+            <a:ext cx="1799898" cy="673436"/>
+          </a:xfrm>
+          <a:prstGeom prst="rect">
+            <a:avLst/>
+          </a:prstGeom>
+        </p:spPr>
+        <p:style>
+          <a:lnRef idx="2">
+            <a:schemeClr val="dk1"/>
+          </a:lnRef>
+          <a:fillRef idx="1">
+            <a:schemeClr val="lt1"/>
+          </a:fillRef>
+          <a:effectRef idx="0">
+            <a:schemeClr val="dk1"/>
+          </a:effectRef>
+          <a:fontRef idx="minor">
+            <a:schemeClr val="dk1"/>
+          </a:fontRef>
+        </p:style>
+        <p:txBody>
+          <a:bodyPr rtlCol="0" anchor="ctr"/>
+          <a:lstStyle/>
+          <a:p>
+            <a:pPr algn="ctr"/>
+            <a:r>
+              <a:rPr lang="en-US" altLang="zh-CN" dirty="0">
+                <a:latin typeface="Times New Roman" panose="02020603050405020304" pitchFamily="18" charset="0"/>
+                <a:ea typeface="宋体" panose="02010600030101010101" pitchFamily="2" charset="-122"/>
+              </a:rPr>
+              <a:t>LISTEN</a:t>
+            </a:r>
+            <a:endParaRPr lang="zh-CN" altLang="en-US" dirty="0">
+              <a:latin typeface="Times New Roman" panose="02020603050405020304" pitchFamily="18" charset="0"/>
+              <a:ea typeface="宋体" panose="02010600030101010101" pitchFamily="2" charset="-122"/>
+            </a:endParaRPr>
+          </a:p>
+        </p:txBody>
+      </p:sp>
+      <p:sp>
+        <p:nvSpPr>
+          <p:cNvPr id="51" name="矩形 50">
+            <a:extLst>
+              <a:ext uri="{FF2B5EF4-FFF2-40B4-BE49-F238E27FC236}">
+                <a16:creationId xmlns:a16="http://schemas.microsoft.com/office/drawing/2014/main" id="{70D0744A-83AA-488D-B93F-6E26274A2EAB}"/>
+              </a:ext>
+            </a:extLst>
+          </p:cNvPr>
+          <p:cNvSpPr/>
+          <p:nvPr/>
+        </p:nvSpPr>
+        <p:spPr>
+          <a:xfrm>
+            <a:off x="7374678" y="2566067"/>
+            <a:ext cx="1799896" cy="1499101"/>
+          </a:xfrm>
+          <a:prstGeom prst="rect">
+            <a:avLst/>
+          </a:prstGeom>
+        </p:spPr>
+        <p:style>
+          <a:lnRef idx="2">
+            <a:schemeClr val="dk1"/>
+          </a:lnRef>
+          <a:fillRef idx="1">
+            <a:schemeClr val="lt1"/>
+          </a:fillRef>
+          <a:effectRef idx="0">
+            <a:schemeClr val="dk1"/>
+          </a:effectRef>
+          <a:fontRef idx="minor">
+            <a:schemeClr val="dk1"/>
+          </a:fontRef>
+        </p:style>
+        <p:txBody>
+          <a:bodyPr rtlCol="0" anchor="ctr"/>
+          <a:lstStyle/>
+          <a:p>
+            <a:pPr algn="ctr"/>
+            <a:r>
+              <a:rPr lang="en-US" altLang="zh-CN" dirty="0">
+                <a:latin typeface="Times New Roman" panose="02020603050405020304" pitchFamily="18" charset="0"/>
+                <a:ea typeface="宋体" panose="02010600030101010101" pitchFamily="2" charset="-122"/>
+              </a:rPr>
+              <a:t>SYN-RCVD</a:t>
+            </a:r>
+            <a:endParaRPr lang="zh-CN" altLang="en-US" dirty="0">
+              <a:latin typeface="Times New Roman" panose="02020603050405020304" pitchFamily="18" charset="0"/>
+              <a:ea typeface="宋体" panose="02010600030101010101" pitchFamily="2" charset="-122"/>
+            </a:endParaRPr>
+          </a:p>
+        </p:txBody>
+      </p:sp>
+      <p:sp>
+        <p:nvSpPr>
+          <p:cNvPr id="54" name="矩形 53">
+            <a:extLst>
+              <a:ext uri="{FF2B5EF4-FFF2-40B4-BE49-F238E27FC236}">
+                <a16:creationId xmlns:a16="http://schemas.microsoft.com/office/drawing/2014/main" id="{884385DC-D0AD-47D5-8B92-11171335595C}"/>
+              </a:ext>
+            </a:extLst>
+          </p:cNvPr>
+          <p:cNvSpPr/>
+          <p:nvPr/>
+        </p:nvSpPr>
+        <p:spPr>
+          <a:xfrm>
+            <a:off x="7374672" y="4197459"/>
+            <a:ext cx="1799898" cy="789408"/>
+          </a:xfrm>
+          <a:prstGeom prst="rect">
+            <a:avLst/>
+          </a:prstGeom>
+          <a:solidFill>
+            <a:schemeClr val="accent2">
+              <a:lumMod val="20000"/>
+              <a:lumOff val="80000"/>
+            </a:schemeClr>
+          </a:solidFill>
+        </p:spPr>
+        <p:style>
+          <a:lnRef idx="2">
+            <a:schemeClr val="dk1"/>
+          </a:lnRef>
+          <a:fillRef idx="1">
+            <a:schemeClr val="lt1"/>
+          </a:fillRef>
+          <a:effectRef idx="0">
+            <a:schemeClr val="dk1"/>
+          </a:effectRef>
+          <a:fontRef idx="minor">
+            <a:schemeClr val="dk1"/>
+          </a:fontRef>
+        </p:style>
+        <p:txBody>
+          <a:bodyPr rtlCol="0" anchor="ctr"/>
+          <a:lstStyle/>
+          <a:p>
+            <a:pPr algn="ctr"/>
+            <a:r>
+              <a:rPr lang="en-US" altLang="zh-CN" dirty="0">
+                <a:latin typeface="Times New Roman" panose="02020603050405020304" pitchFamily="18" charset="0"/>
+                <a:ea typeface="宋体" panose="02010600030101010101" pitchFamily="2" charset="-122"/>
+              </a:rPr>
+              <a:t>ESTABLISHED</a:t>
+            </a:r>
+            <a:endParaRPr lang="zh-CN" altLang="en-US" dirty="0">
+              <a:latin typeface="Times New Roman" panose="02020603050405020304" pitchFamily="18" charset="0"/>
+              <a:ea typeface="宋体" panose="02010600030101010101" pitchFamily="2" charset="-122"/>
+            </a:endParaRPr>
+          </a:p>
+        </p:txBody>
+      </p:sp>
+      <p:graphicFrame>
+        <p:nvGraphicFramePr>
+          <p:cNvPr id="21" name="表格 32">
+            <a:extLst>
+              <a:ext uri="{FF2B5EF4-FFF2-40B4-BE49-F238E27FC236}">
+                <a16:creationId xmlns:a16="http://schemas.microsoft.com/office/drawing/2014/main" id="{FCF27E4E-2F88-4696-9408-9BA6228B72C7}"/>
+              </a:ext>
+            </a:extLst>
+          </p:cNvPr>
+          <p:cNvGraphicFramePr>
+            <a:graphicFrameLocks noGrp="1"/>
+          </p:cNvGraphicFramePr>
+          <p:nvPr>
+            <p:extLst>
+              <p:ext uri="{D42A27DB-BD31-4B8C-83A1-F6EECF244321}">
+                <p14:modId xmlns:p14="http://schemas.microsoft.com/office/powerpoint/2010/main" val="3149296666"/>
+              </p:ext>
+            </p:extLst>
+          </p:nvPr>
+        </p:nvGraphicFramePr>
+        <p:xfrm>
+          <a:off x="9643793" y="2096213"/>
+          <a:ext cx="3210129" cy="1854200"/>
+        </p:xfrm>
+        <a:graphic>
+          <a:graphicData uri="http://schemas.openxmlformats.org/drawingml/2006/table">
+            <a:tbl>
+              <a:tblPr firstRow="1" bandRow="1">
+                <a:tableStyleId>{5940675A-B579-460E-94D1-54222C63F5DA}</a:tableStyleId>
+              </a:tblPr>
+              <a:tblGrid>
+                <a:gridCol w="502797">
+                  <a:extLst>
+                    <a:ext uri="{9D8B030D-6E8A-4147-A177-3AD203B41FA5}">
+                      <a16:colId xmlns:a16="http://schemas.microsoft.com/office/drawing/2014/main" val="961391142"/>
+                    </a:ext>
+                  </a:extLst>
+                </a:gridCol>
+                <a:gridCol w="902444">
+                  <a:extLst>
+                    <a:ext uri="{9D8B030D-6E8A-4147-A177-3AD203B41FA5}">
+                      <a16:colId xmlns:a16="http://schemas.microsoft.com/office/drawing/2014/main" val="1314654954"/>
+                    </a:ext>
+                  </a:extLst>
+                </a:gridCol>
+                <a:gridCol w="902444">
+                  <a:extLst>
+                    <a:ext uri="{9D8B030D-6E8A-4147-A177-3AD203B41FA5}">
+                      <a16:colId xmlns:a16="http://schemas.microsoft.com/office/drawing/2014/main" val="1364108467"/>
+                    </a:ext>
+                  </a:extLst>
+                </a:gridCol>
+                <a:gridCol w="902444">
+                  <a:extLst>
+                    <a:ext uri="{9D8B030D-6E8A-4147-A177-3AD203B41FA5}">
+                      <a16:colId xmlns:a16="http://schemas.microsoft.com/office/drawing/2014/main" val="1022649288"/>
+                    </a:ext>
+                  </a:extLst>
+                </a:gridCol>
+              </a:tblGrid>
+              <a:tr h="370840">
+                <a:tc>
+                  <a:txBody>
+                    <a:bodyPr/>
+                    <a:lstStyle/>
+                    <a:p>
+                      <a:pPr algn="ctr"/>
+                      <a:endParaRPr lang="zh-CN" altLang="en-US" baseline="0" dirty="0">
+                        <a:latin typeface="Times New Roman" panose="02020603050405020304" pitchFamily="18" charset="0"/>
+                        <a:ea typeface="宋体" panose="02010600030101010101" pitchFamily="2" charset="-122"/>
+                      </a:endParaRPr>
+                    </a:p>
+                  </a:txBody>
+                  <a:tcPr anchor="ctr"/>
+                </a:tc>
+                <a:tc>
+                  <a:txBody>
+                    <a:bodyPr/>
+                    <a:lstStyle/>
+                    <a:p>
+                      <a:pPr algn="ctr"/>
+                      <a:r>
+                        <a:rPr lang="en-US" altLang="zh-CN" baseline="0" dirty="0">
+                          <a:latin typeface="Times New Roman" panose="02020603050405020304" pitchFamily="18" charset="0"/>
+                          <a:ea typeface="宋体" panose="02010600030101010101" pitchFamily="2" charset="-122"/>
+                        </a:rPr>
+                        <a:t>Seq</a:t>
+                      </a:r>
+                      <a:endParaRPr lang="zh-CN" altLang="en-US" baseline="0" dirty="0">
+                        <a:latin typeface="Times New Roman" panose="02020603050405020304" pitchFamily="18" charset="0"/>
+                        <a:ea typeface="宋体" panose="02010600030101010101" pitchFamily="2" charset="-122"/>
+                      </a:endParaRPr>
+                    </a:p>
+                  </a:txBody>
+                  <a:tcPr anchor="ctr"/>
+                </a:tc>
+                <a:tc>
+                  <a:txBody>
+                    <a:bodyPr/>
+                    <a:lstStyle/>
+                    <a:p>
+                      <a:pPr algn="ctr"/>
+                      <a:r>
+                        <a:rPr lang="en-US" altLang="zh-CN" baseline="0" dirty="0">
+                          <a:latin typeface="Times New Roman" panose="02020603050405020304" pitchFamily="18" charset="0"/>
+                          <a:ea typeface="宋体" panose="02010600030101010101" pitchFamily="2" charset="-122"/>
+                        </a:rPr>
+                        <a:t>FIN</a:t>
+                      </a:r>
+                      <a:endParaRPr lang="zh-CN" altLang="en-US" baseline="0" dirty="0">
+                        <a:latin typeface="Times New Roman" panose="02020603050405020304" pitchFamily="18" charset="0"/>
+                        <a:ea typeface="宋体" panose="02010600030101010101" pitchFamily="2" charset="-122"/>
+                      </a:endParaRPr>
+                    </a:p>
+                  </a:txBody>
+                  <a:tcPr anchor="ctr"/>
+                </a:tc>
+                <a:tc>
+                  <a:txBody>
+                    <a:bodyPr/>
+                    <a:lstStyle/>
+                    <a:p>
+                      <a:pPr algn="ctr"/>
+                      <a:r>
+                        <a:rPr lang="en-US" altLang="zh-CN" baseline="0" dirty="0">
+                          <a:latin typeface="Times New Roman" panose="02020603050405020304" pitchFamily="18" charset="0"/>
+                          <a:ea typeface="宋体" panose="02010600030101010101" pitchFamily="2" charset="-122"/>
+                        </a:rPr>
+                        <a:t>ACK</a:t>
+                      </a:r>
+                      <a:endParaRPr lang="zh-CN" altLang="en-US" baseline="0" dirty="0">
+                        <a:latin typeface="Times New Roman" panose="02020603050405020304" pitchFamily="18" charset="0"/>
+                        <a:ea typeface="宋体" panose="02010600030101010101" pitchFamily="2" charset="-122"/>
+                      </a:endParaRPr>
+                    </a:p>
+                  </a:txBody>
+                  <a:tcPr anchor="ctr"/>
+                </a:tc>
+                <a:extLst>
+                  <a:ext uri="{0D108BD9-81ED-4DB2-BD59-A6C34878D82A}">
+                    <a16:rowId xmlns:a16="http://schemas.microsoft.com/office/drawing/2014/main" val="838475617"/>
+                  </a:ext>
+                </a:extLst>
+              </a:tr>
+              <a:tr h="370840">
+                <a:tc>
+                  <a:txBody>
+                    <a:bodyPr/>
+                    <a:lstStyle/>
+                    <a:p>
+                      <a:pPr algn="ctr"/>
+                      <a:r>
+                        <a:rPr lang="en-US" altLang="zh-CN" baseline="0" dirty="0">
+                          <a:latin typeface="Times New Roman" panose="02020603050405020304" pitchFamily="18" charset="0"/>
+                          <a:ea typeface="宋体" panose="02010600030101010101" pitchFamily="2" charset="-122"/>
+                        </a:rPr>
+                        <a:t>1</a:t>
+                      </a:r>
+                      <a:endParaRPr lang="zh-CN" altLang="en-US" baseline="0" dirty="0">
+                        <a:latin typeface="Times New Roman" panose="02020603050405020304" pitchFamily="18" charset="0"/>
+                        <a:ea typeface="宋体" panose="02010600030101010101" pitchFamily="2" charset="-122"/>
+                      </a:endParaRPr>
+                    </a:p>
+                  </a:txBody>
+                  <a:tcPr anchor="ctr">
+                    <a:solidFill>
+                      <a:schemeClr val="accent1">
+                        <a:lumMod val="20000"/>
+                        <a:lumOff val="80000"/>
+                      </a:schemeClr>
+                    </a:solidFill>
+                  </a:tcPr>
+                </a:tc>
+                <a:tc>
+                  <a:txBody>
+                    <a:bodyPr/>
+                    <a:lstStyle/>
+                    <a:p>
+                      <a:pPr algn="ctr"/>
+                      <a:endParaRPr lang="zh-CN" altLang="en-US" baseline="0" dirty="0">
+                        <a:latin typeface="Times New Roman" panose="02020603050405020304" pitchFamily="18" charset="0"/>
+                        <a:ea typeface="宋体" panose="02010600030101010101" pitchFamily="2" charset="-122"/>
+                      </a:endParaRPr>
+                    </a:p>
+                  </a:txBody>
+                  <a:tcPr anchor="ctr">
+                    <a:solidFill>
+                      <a:schemeClr val="accent1">
+                        <a:lumMod val="20000"/>
+                        <a:lumOff val="80000"/>
+                      </a:schemeClr>
+                    </a:solidFill>
+                  </a:tcPr>
+                </a:tc>
+                <a:tc>
+                  <a:txBody>
+                    <a:bodyPr/>
+                    <a:lstStyle/>
+                    <a:p>
+                      <a:pPr algn="ctr"/>
+                      <a:endParaRPr lang="zh-CN" altLang="en-US" baseline="0" dirty="0">
+                        <a:solidFill>
+                          <a:schemeClr val="tx1"/>
+                        </a:solidFill>
+                        <a:latin typeface="Times New Roman" panose="02020603050405020304" pitchFamily="18" charset="0"/>
+                        <a:ea typeface="宋体" panose="02010600030101010101" pitchFamily="2" charset="-122"/>
+                      </a:endParaRPr>
+                    </a:p>
+                  </a:txBody>
+                  <a:tcPr anchor="ctr">
+                    <a:solidFill>
+                      <a:schemeClr val="accent1">
+                        <a:lumMod val="20000"/>
+                        <a:lumOff val="80000"/>
+                      </a:schemeClr>
+                    </a:solidFill>
+                  </a:tcPr>
+                </a:tc>
+                <a:tc>
+                  <a:txBody>
+                    <a:bodyPr/>
+                    <a:lstStyle/>
+                    <a:p>
+                      <a:pPr algn="ctr"/>
+                      <a:endParaRPr lang="zh-CN" altLang="en-US" baseline="0" dirty="0">
+                        <a:latin typeface="Times New Roman" panose="02020603050405020304" pitchFamily="18" charset="0"/>
+                        <a:ea typeface="宋体" panose="02010600030101010101" pitchFamily="2" charset="-122"/>
+                      </a:endParaRPr>
+                    </a:p>
+                  </a:txBody>
+                  <a:tcPr anchor="ctr">
+                    <a:solidFill>
+                      <a:schemeClr val="accent1">
+                        <a:lumMod val="20000"/>
+                        <a:lumOff val="80000"/>
+                      </a:schemeClr>
+                    </a:solidFill>
+                  </a:tcPr>
+                </a:tc>
+                <a:extLst>
+                  <a:ext uri="{0D108BD9-81ED-4DB2-BD59-A6C34878D82A}">
+                    <a16:rowId xmlns:a16="http://schemas.microsoft.com/office/drawing/2014/main" val="1948815283"/>
+                  </a:ext>
+                </a:extLst>
+              </a:tr>
+              <a:tr h="370840">
+                <a:tc>
+                  <a:txBody>
+                    <a:bodyPr/>
+                    <a:lstStyle/>
+                    <a:p>
+                      <a:pPr algn="ctr"/>
+                      <a:r>
+                        <a:rPr lang="en-US" altLang="zh-CN" baseline="0" dirty="0">
+                          <a:latin typeface="Times New Roman" panose="02020603050405020304" pitchFamily="18" charset="0"/>
+                          <a:ea typeface="宋体" panose="02010600030101010101" pitchFamily="2" charset="-122"/>
+                        </a:rPr>
+                        <a:t>2</a:t>
+                      </a:r>
+                      <a:endParaRPr lang="zh-CN" altLang="en-US" baseline="0" dirty="0">
+                        <a:latin typeface="Times New Roman" panose="02020603050405020304" pitchFamily="18" charset="0"/>
+                        <a:ea typeface="宋体" panose="02010600030101010101" pitchFamily="2" charset="-122"/>
+                      </a:endParaRPr>
+                    </a:p>
+                  </a:txBody>
+                  <a:tcPr anchor="ctr">
+                    <a:solidFill>
+                      <a:schemeClr val="accent6">
+                        <a:lumMod val="20000"/>
+                        <a:lumOff val="80000"/>
+                      </a:schemeClr>
+                    </a:solidFill>
+                  </a:tcPr>
+                </a:tc>
+                <a:tc>
+                  <a:txBody>
+                    <a:bodyPr/>
+                    <a:lstStyle/>
+                    <a:p>
+                      <a:pPr algn="ctr"/>
+                      <a:endParaRPr lang="zh-CN" altLang="en-US" baseline="0" dirty="0">
+                        <a:latin typeface="Times New Roman" panose="02020603050405020304" pitchFamily="18" charset="0"/>
+                        <a:ea typeface="宋体" panose="02010600030101010101" pitchFamily="2" charset="-122"/>
+                      </a:endParaRPr>
+                    </a:p>
+                  </a:txBody>
+                  <a:tcPr anchor="ctr">
+                    <a:solidFill>
+                      <a:schemeClr val="accent6">
+                        <a:lumMod val="20000"/>
+                        <a:lumOff val="80000"/>
+                      </a:schemeClr>
+                    </a:solidFill>
+                  </a:tcPr>
+                </a:tc>
+                <a:tc>
+                  <a:txBody>
+                    <a:bodyPr/>
+                    <a:lstStyle/>
+                    <a:p>
+                      <a:pPr marL="0" marR="0" lvl="0" indent="0" algn="ctr" defTabSz="914400" rtl="0" eaLnBrk="1" fontAlgn="auto" latinLnBrk="0" hangingPunct="1">
+                        <a:lnSpc>
+                          <a:spcPct val="100000"/>
+                        </a:lnSpc>
+                        <a:spcBef>
+                          <a:spcPts val="0"/>
+                        </a:spcBef>
+                        <a:spcAft>
+                          <a:spcPts val="0"/>
+                        </a:spcAft>
+                        <a:buClrTx/>
+                        <a:buSzTx/>
+                        <a:buFontTx/>
+                        <a:buNone/>
+                        <a:tabLst/>
+                        <a:defRPr/>
+                      </a:pPr>
+                      <a:endParaRPr lang="zh-CN" altLang="en-US" baseline="0" dirty="0">
+                        <a:solidFill>
+                          <a:schemeClr val="tx1"/>
+                        </a:solidFill>
+                        <a:latin typeface="Times New Roman" panose="02020603050405020304" pitchFamily="18" charset="0"/>
+                        <a:ea typeface="宋体" panose="02010600030101010101" pitchFamily="2" charset="-122"/>
+                      </a:endParaRPr>
+                    </a:p>
+                  </a:txBody>
+                  <a:tcPr anchor="ctr">
+                    <a:solidFill>
+                      <a:schemeClr val="accent6">
+                        <a:lumMod val="20000"/>
+                        <a:lumOff val="80000"/>
+                      </a:schemeClr>
+                    </a:solidFill>
+                  </a:tcPr>
+                </a:tc>
+                <a:tc>
+                  <a:txBody>
+                    <a:bodyPr/>
+                    <a:lstStyle/>
+                    <a:p>
+                      <a:pPr algn="ctr"/>
+                      <a:endParaRPr lang="zh-CN" altLang="en-US" baseline="0" dirty="0">
+                        <a:latin typeface="Times New Roman" panose="02020603050405020304" pitchFamily="18" charset="0"/>
+                        <a:ea typeface="宋体" panose="02010600030101010101" pitchFamily="2" charset="-122"/>
+                      </a:endParaRPr>
+                    </a:p>
+                  </a:txBody>
+                  <a:tcPr anchor="ctr">
+                    <a:solidFill>
+                      <a:schemeClr val="accent6">
+                        <a:lumMod val="20000"/>
+                        <a:lumOff val="80000"/>
+                      </a:schemeClr>
+                    </a:solidFill>
+                  </a:tcPr>
+                </a:tc>
+                <a:extLst>
+                  <a:ext uri="{0D108BD9-81ED-4DB2-BD59-A6C34878D82A}">
+                    <a16:rowId xmlns:a16="http://schemas.microsoft.com/office/drawing/2014/main" val="4123196707"/>
+                  </a:ext>
+                </a:extLst>
+              </a:tr>
+              <a:tr h="370840">
+                <a:tc>
+                  <a:txBody>
+                    <a:bodyPr/>
+                    <a:lstStyle/>
+                    <a:p>
+                      <a:pPr algn="ctr"/>
+                      <a:r>
+                        <a:rPr lang="en-US" altLang="zh-CN" baseline="0" dirty="0">
+                          <a:latin typeface="Times New Roman" panose="02020603050405020304" pitchFamily="18" charset="0"/>
+                          <a:ea typeface="宋体" panose="02010600030101010101" pitchFamily="2" charset="-122"/>
+                        </a:rPr>
+                        <a:t>3</a:t>
+                      </a:r>
+                      <a:endParaRPr lang="zh-CN" altLang="en-US" baseline="0" dirty="0">
+                        <a:latin typeface="Times New Roman" panose="02020603050405020304" pitchFamily="18" charset="0"/>
+                        <a:ea typeface="宋体" panose="02010600030101010101" pitchFamily="2" charset="-122"/>
+                      </a:endParaRPr>
+                    </a:p>
+                  </a:txBody>
+                  <a:tcPr anchor="ctr">
+                    <a:solidFill>
+                      <a:schemeClr val="accent6">
+                        <a:lumMod val="20000"/>
+                        <a:lumOff val="80000"/>
+                      </a:schemeClr>
+                    </a:solidFill>
+                  </a:tcPr>
+                </a:tc>
+                <a:tc>
+                  <a:txBody>
+                    <a:bodyPr/>
+                    <a:lstStyle/>
+                    <a:p>
+                      <a:pPr algn="ctr"/>
+                      <a:endParaRPr lang="zh-CN" altLang="en-US" baseline="0" dirty="0">
+                        <a:latin typeface="Times New Roman" panose="02020603050405020304" pitchFamily="18" charset="0"/>
+                        <a:ea typeface="宋体" panose="02010600030101010101" pitchFamily="2" charset="-122"/>
+                      </a:endParaRPr>
+                    </a:p>
+                  </a:txBody>
+                  <a:tcPr anchor="ctr">
+                    <a:solidFill>
+                      <a:schemeClr val="accent6">
+                        <a:lumMod val="20000"/>
+                        <a:lumOff val="80000"/>
+                      </a:schemeClr>
+                    </a:solidFill>
+                  </a:tcPr>
+                </a:tc>
+                <a:tc>
+                  <a:txBody>
+                    <a:bodyPr/>
+                    <a:lstStyle/>
+                    <a:p>
+                      <a:pPr marL="0" marR="0" lvl="0" indent="0" algn="ctr" defTabSz="914400" rtl="0" eaLnBrk="1" fontAlgn="auto" latinLnBrk="0" hangingPunct="1">
+                        <a:lnSpc>
+                          <a:spcPct val="100000"/>
+                        </a:lnSpc>
+                        <a:spcBef>
+                          <a:spcPts val="0"/>
+                        </a:spcBef>
+                        <a:spcAft>
+                          <a:spcPts val="0"/>
+                        </a:spcAft>
+                        <a:buClrTx/>
+                        <a:buSzTx/>
+                        <a:buFontTx/>
+                        <a:buNone/>
+                        <a:tabLst/>
+                        <a:defRPr/>
+                      </a:pPr>
+                      <a:endParaRPr lang="zh-CN" altLang="en-US" baseline="0" dirty="0">
+                        <a:solidFill>
+                          <a:srgbClr val="00B050"/>
+                        </a:solidFill>
+                        <a:latin typeface="Times New Roman" panose="02020603050405020304" pitchFamily="18" charset="0"/>
+                        <a:ea typeface="宋体" panose="02010600030101010101" pitchFamily="2" charset="-122"/>
+                      </a:endParaRPr>
+                    </a:p>
+                  </a:txBody>
+                  <a:tcPr anchor="ctr">
+                    <a:solidFill>
+                      <a:schemeClr val="accent6">
+                        <a:lumMod val="20000"/>
+                        <a:lumOff val="80000"/>
+                      </a:schemeClr>
+                    </a:solidFill>
+                  </a:tcPr>
+                </a:tc>
+                <a:tc>
+                  <a:txBody>
+                    <a:bodyPr/>
+                    <a:lstStyle/>
+                    <a:p>
+                      <a:pPr algn="ctr"/>
+                      <a:endParaRPr lang="zh-CN" altLang="en-US" baseline="0" dirty="0">
+                        <a:latin typeface="Times New Roman" panose="02020603050405020304" pitchFamily="18" charset="0"/>
+                        <a:ea typeface="宋体" panose="02010600030101010101" pitchFamily="2" charset="-122"/>
+                      </a:endParaRPr>
+                    </a:p>
+                  </a:txBody>
+                  <a:tcPr anchor="ctr">
+                    <a:solidFill>
+                      <a:schemeClr val="accent6">
+                        <a:lumMod val="20000"/>
+                        <a:lumOff val="80000"/>
+                      </a:schemeClr>
+                    </a:solidFill>
+                  </a:tcPr>
+                </a:tc>
+                <a:extLst>
+                  <a:ext uri="{0D108BD9-81ED-4DB2-BD59-A6C34878D82A}">
+                    <a16:rowId xmlns:a16="http://schemas.microsoft.com/office/drawing/2014/main" val="2767558391"/>
+                  </a:ext>
+                </a:extLst>
+              </a:tr>
+              <a:tr h="370840">
+                <a:tc>
+                  <a:txBody>
+                    <a:bodyPr/>
+                    <a:lstStyle/>
+                    <a:p>
+                      <a:pPr algn="ctr"/>
+                      <a:r>
+                        <a:rPr lang="en-US" altLang="zh-CN" baseline="0" dirty="0">
+                          <a:latin typeface="Times New Roman" panose="02020603050405020304" pitchFamily="18" charset="0"/>
+                          <a:ea typeface="宋体" panose="02010600030101010101" pitchFamily="2" charset="-122"/>
+                        </a:rPr>
+                        <a:t>4</a:t>
+                      </a:r>
+                      <a:endParaRPr lang="zh-CN" altLang="en-US" baseline="0" dirty="0">
+                        <a:latin typeface="Times New Roman" panose="02020603050405020304" pitchFamily="18" charset="0"/>
+                        <a:ea typeface="宋体" panose="02010600030101010101" pitchFamily="2" charset="-122"/>
+                      </a:endParaRPr>
+                    </a:p>
+                  </a:txBody>
+                  <a:tcPr anchor="ctr">
+                    <a:solidFill>
+                      <a:schemeClr val="accent1">
+                        <a:lumMod val="20000"/>
+                        <a:lumOff val="80000"/>
+                      </a:schemeClr>
+                    </a:solidFill>
+                  </a:tcPr>
+                </a:tc>
+                <a:tc>
+                  <a:txBody>
+                    <a:bodyPr/>
+                    <a:lstStyle/>
+                    <a:p>
+                      <a:pPr algn="ctr"/>
+                      <a:endParaRPr lang="zh-CN" altLang="en-US" baseline="0" dirty="0">
+                        <a:latin typeface="Times New Roman" panose="02020603050405020304" pitchFamily="18" charset="0"/>
+                        <a:ea typeface="宋体" panose="02010600030101010101" pitchFamily="2" charset="-122"/>
+                      </a:endParaRPr>
+                    </a:p>
+                  </a:txBody>
+                  <a:tcPr anchor="ctr">
+                    <a:solidFill>
+                      <a:schemeClr val="accent1">
+                        <a:lumMod val="20000"/>
+                        <a:lumOff val="80000"/>
+                      </a:schemeClr>
+                    </a:solidFill>
+                  </a:tcPr>
+                </a:tc>
+                <a:tc>
+                  <a:txBody>
+                    <a:bodyPr/>
+                    <a:lstStyle/>
+                    <a:p>
+                      <a:pPr marL="0" marR="0" lvl="0" indent="0" algn="ctr" defTabSz="914400" rtl="0" eaLnBrk="1" fontAlgn="auto" latinLnBrk="0" hangingPunct="1">
+                        <a:lnSpc>
+                          <a:spcPct val="100000"/>
+                        </a:lnSpc>
+                        <a:spcBef>
+                          <a:spcPts val="0"/>
+                        </a:spcBef>
+                        <a:spcAft>
+                          <a:spcPts val="0"/>
+                        </a:spcAft>
+                        <a:buClrTx/>
+                        <a:buSzTx/>
+                        <a:buFontTx/>
+                        <a:buNone/>
+                        <a:tabLst/>
+                        <a:defRPr/>
+                      </a:pPr>
+                      <a:endParaRPr lang="zh-CN" altLang="en-US" baseline="0" dirty="0">
+                        <a:solidFill>
+                          <a:srgbClr val="00B050"/>
+                        </a:solidFill>
+                        <a:latin typeface="Times New Roman" panose="02020603050405020304" pitchFamily="18" charset="0"/>
+                        <a:ea typeface="宋体" panose="02010600030101010101" pitchFamily="2" charset="-122"/>
+                      </a:endParaRPr>
+                    </a:p>
+                  </a:txBody>
+                  <a:tcPr anchor="ctr">
+                    <a:solidFill>
+                      <a:schemeClr val="accent1">
+                        <a:lumMod val="20000"/>
+                        <a:lumOff val="80000"/>
+                      </a:schemeClr>
+                    </a:solidFill>
+                  </a:tcPr>
+                </a:tc>
+                <a:tc>
+                  <a:txBody>
+                    <a:bodyPr/>
+                    <a:lstStyle/>
+                    <a:p>
+                      <a:pPr algn="ctr"/>
+                      <a:endParaRPr lang="zh-CN" altLang="en-US" baseline="0" dirty="0">
+                        <a:latin typeface="Times New Roman" panose="02020603050405020304" pitchFamily="18" charset="0"/>
+                        <a:ea typeface="宋体" panose="02010600030101010101" pitchFamily="2" charset="-122"/>
+                      </a:endParaRPr>
+                    </a:p>
+                  </a:txBody>
+                  <a:tcPr anchor="ctr">
+                    <a:solidFill>
+                      <a:schemeClr val="accent1">
+                        <a:lumMod val="20000"/>
+                        <a:lumOff val="80000"/>
+                      </a:schemeClr>
+                    </a:solidFill>
+                  </a:tcPr>
+                </a:tc>
+                <a:extLst>
+                  <a:ext uri="{0D108BD9-81ED-4DB2-BD59-A6C34878D82A}">
+                    <a16:rowId xmlns:a16="http://schemas.microsoft.com/office/drawing/2014/main" val="3548680442"/>
+                  </a:ext>
+                </a:extLst>
+              </a:tr>
+            </a:tbl>
+          </a:graphicData>
+        </a:graphic>
+      </p:graphicFrame>
+    </p:spTree>
+    <p:extLst>
+      <p:ext uri="{BB962C8B-B14F-4D97-AF65-F5344CB8AC3E}">
+        <p14:creationId xmlns:p14="http://schemas.microsoft.com/office/powerpoint/2010/main" val="2603599775"/>
+      </p:ext>
+    </p:extLst>
+  </p:cSld>
+  <p:clrMapOvr>
+    <a:masterClrMapping/>
+  </p:clrMapOvr>
+</p:sld>
+</file>
+
 <file path=ppt/theme/theme1.xml><?xml version="1.0" encoding="utf-8"?>
 <a:theme xmlns:a="http://schemas.openxmlformats.org/drawingml/2006/main" name="Office 主题">
   <a:themeElements>
@@ -5969,7 +8975,31 @@
       </a:bgFillStyleLst>
     </a:fmtScheme>
   </a:themeElements>
-  <a:objectDefaults/>
+  <a:objectDefaults>
+    <a:lnDef>
+      <a:spPr>
+        <a:ln w="25400">
+          <a:tailEnd type="triangle" w="lg" len="lg"/>
+        </a:ln>
+      </a:spPr>
+      <a:bodyPr/>
+      <a:lstStyle/>
+      <a:style>
+        <a:lnRef idx="1">
+          <a:schemeClr val="dk1"/>
+        </a:lnRef>
+        <a:fillRef idx="0">
+          <a:schemeClr val="dk1"/>
+        </a:fillRef>
+        <a:effectRef idx="0">
+          <a:schemeClr val="dk1"/>
+        </a:effectRef>
+        <a:fontRef idx="minor">
+          <a:schemeClr val="tx1"/>
+        </a:fontRef>
+      </a:style>
+    </a:lnDef>
+  </a:objectDefaults>
   <a:extraClrSchemeLst/>
   <a:extLst>
     <a:ext uri="{05A4C25C-085E-4340-85A3-A5531E510DB2}">

</xml_diff>

<commit_message>
+ Update tcp/ip problem
</commit_message>
<xml_diff>
--- a/后台开发面经_示意图.pptx
+++ b/后台开发面经_示意图.pptx
@@ -5921,6 +5921,140 @@
       </p:grpSpPr>
       <p:cxnSp>
         <p:nvCxnSpPr>
+          <p:cNvPr id="12" name="直接箭头连接符 11">
+            <a:extLst>
+              <a:ext uri="{FF2B5EF4-FFF2-40B4-BE49-F238E27FC236}">
+                <a16:creationId xmlns:a16="http://schemas.microsoft.com/office/drawing/2014/main" id="{C88BA41B-BEA2-4BF7-99C7-007B9FDEBDFF}"/>
+              </a:ext>
+            </a:extLst>
+          </p:cNvPr>
+          <p:cNvCxnSpPr>
+            <a:cxnSpLocks/>
+          </p:cNvCxnSpPr>
+          <p:nvPr/>
+        </p:nvCxnSpPr>
+        <p:spPr>
+          <a:xfrm>
+            <a:off x="3136445" y="1771048"/>
+            <a:ext cx="3983253" cy="665206"/>
+          </a:xfrm>
+          <a:prstGeom prst="straightConnector1">
+            <a:avLst/>
+          </a:prstGeom>
+          <a:ln w="25400">
+            <a:solidFill>
+              <a:srgbClr val="00B0F0"/>
+            </a:solidFill>
+            <a:headEnd w="lg" len="lg"/>
+            <a:tailEnd type="triangle" w="lg" len="lg"/>
+          </a:ln>
+        </p:spPr>
+        <p:style>
+          <a:lnRef idx="1">
+            <a:schemeClr val="dk1"/>
+          </a:lnRef>
+          <a:fillRef idx="0">
+            <a:schemeClr val="dk1"/>
+          </a:fillRef>
+          <a:effectRef idx="0">
+            <a:schemeClr val="dk1"/>
+          </a:effectRef>
+          <a:fontRef idx="minor">
+            <a:schemeClr val="tx1"/>
+          </a:fontRef>
+        </p:style>
+      </p:cxnSp>
+      <p:cxnSp>
+        <p:nvCxnSpPr>
+          <p:cNvPr id="15" name="直接箭头连接符 14">
+            <a:extLst>
+              <a:ext uri="{FF2B5EF4-FFF2-40B4-BE49-F238E27FC236}">
+                <a16:creationId xmlns:a16="http://schemas.microsoft.com/office/drawing/2014/main" id="{98A0487F-E192-4584-9089-676CA58FF6B4}"/>
+              </a:ext>
+            </a:extLst>
+          </p:cNvPr>
+          <p:cNvCxnSpPr>
+            <a:cxnSpLocks/>
+          </p:cNvCxnSpPr>
+          <p:nvPr/>
+        </p:nvCxnSpPr>
+        <p:spPr>
+          <a:xfrm flipH="1">
+            <a:off x="3149196" y="2605250"/>
+            <a:ext cx="3986287" cy="669360"/>
+          </a:xfrm>
+          <a:prstGeom prst="straightConnector1">
+            <a:avLst/>
+          </a:prstGeom>
+          <a:ln w="25400">
+            <a:solidFill>
+              <a:srgbClr val="00B050"/>
+            </a:solidFill>
+            <a:tailEnd type="triangle" w="lg" len="lg"/>
+          </a:ln>
+        </p:spPr>
+        <p:style>
+          <a:lnRef idx="1">
+            <a:schemeClr val="dk1"/>
+          </a:lnRef>
+          <a:fillRef idx="0">
+            <a:schemeClr val="dk1"/>
+          </a:fillRef>
+          <a:effectRef idx="0">
+            <a:schemeClr val="dk1"/>
+          </a:effectRef>
+          <a:fontRef idx="minor">
+            <a:schemeClr val="tx1"/>
+          </a:fontRef>
+        </p:style>
+      </p:cxnSp>
+      <p:cxnSp>
+        <p:nvCxnSpPr>
+          <p:cNvPr id="38" name="直接箭头连接符 37">
+            <a:extLst>
+              <a:ext uri="{FF2B5EF4-FFF2-40B4-BE49-F238E27FC236}">
+                <a16:creationId xmlns:a16="http://schemas.microsoft.com/office/drawing/2014/main" id="{A21F9FB0-59F7-49CA-8BE9-FB2E7E5E02FE}"/>
+              </a:ext>
+            </a:extLst>
+          </p:cNvPr>
+          <p:cNvCxnSpPr>
+            <a:cxnSpLocks/>
+          </p:cNvCxnSpPr>
+          <p:nvPr/>
+        </p:nvCxnSpPr>
+        <p:spPr>
+          <a:xfrm>
+            <a:off x="3141643" y="3435069"/>
+            <a:ext cx="3983253" cy="665206"/>
+          </a:xfrm>
+          <a:prstGeom prst="straightConnector1">
+            <a:avLst/>
+          </a:prstGeom>
+          <a:ln w="25400">
+            <a:solidFill>
+              <a:srgbClr val="00B0F0"/>
+            </a:solidFill>
+            <a:headEnd w="lg" len="lg"/>
+            <a:tailEnd type="triangle" w="lg" len="lg"/>
+          </a:ln>
+        </p:spPr>
+        <p:style>
+          <a:lnRef idx="1">
+            <a:schemeClr val="dk1"/>
+          </a:lnRef>
+          <a:fillRef idx="0">
+            <a:schemeClr val="dk1"/>
+          </a:fillRef>
+          <a:effectRef idx="0">
+            <a:schemeClr val="dk1"/>
+          </a:effectRef>
+          <a:fontRef idx="minor">
+            <a:schemeClr val="tx1"/>
+          </a:fontRef>
+        </p:style>
+      </p:cxnSp>
+      <p:cxnSp>
+        <p:nvCxnSpPr>
           <p:cNvPr id="7" name="直接箭头连接符 6">
             <a:extLst>
               <a:ext uri="{FF2B5EF4-FFF2-40B4-BE49-F238E27FC236}">
@@ -5936,7 +6070,7 @@
         <p:spPr>
           <a:xfrm>
             <a:off x="3145971" y="981777"/>
-            <a:ext cx="0" cy="4005090"/>
+            <a:ext cx="0" cy="4377623"/>
           </a:xfrm>
           <a:prstGeom prst="straightConnector1">
             <a:avLst/>
@@ -5977,7 +6111,7 @@
         <p:spPr>
           <a:xfrm>
             <a:off x="7129223" y="981777"/>
-            <a:ext cx="0" cy="4005089"/>
+            <a:ext cx="0" cy="4377623"/>
           </a:xfrm>
           <a:prstGeom prst="straightConnector1">
             <a:avLst/>
@@ -6029,8 +6163,12 @@
           </a:bodyPr>
           <a:lstStyle/>
           <a:p>
-            <a:r>
-              <a:rPr lang="zh-CN" altLang="en-US" sz="2000" dirty="0">
+            <a:pPr algn="ctr"/>
+            <a:r>
+              <a:rPr lang="zh-CN" altLang="en-US" sz="2000" b="1" dirty="0">
+                <a:solidFill>
+                  <a:srgbClr val="00B0F0"/>
+                </a:solidFill>
                 <a:latin typeface="Times New Roman" panose="02020603050405020304" pitchFamily="18" charset="0"/>
                 <a:ea typeface="宋体" panose="02010600030101010101" pitchFamily="2" charset="-122"/>
               </a:rPr>
@@ -6067,8 +6205,12 @@
           </a:bodyPr>
           <a:lstStyle/>
           <a:p>
-            <a:r>
-              <a:rPr lang="zh-CN" altLang="en-US" sz="2000" dirty="0">
+            <a:pPr algn="ctr"/>
+            <a:r>
+              <a:rPr lang="zh-CN" altLang="en-US" sz="2000" b="1" dirty="0">
+                <a:solidFill>
+                  <a:srgbClr val="00B050"/>
+                </a:solidFill>
                 <a:latin typeface="Times New Roman" panose="02020603050405020304" pitchFamily="18" charset="0"/>
                 <a:ea typeface="宋体" panose="02010600030101010101" pitchFamily="2" charset="-122"/>
               </a:rPr>
@@ -6077,51 +6219,6 @@
           </a:p>
         </p:txBody>
       </p:sp>
-      <p:cxnSp>
-        <p:nvCxnSpPr>
-          <p:cNvPr id="12" name="直接箭头连接符 11">
-            <a:extLst>
-              <a:ext uri="{FF2B5EF4-FFF2-40B4-BE49-F238E27FC236}">
-                <a16:creationId xmlns:a16="http://schemas.microsoft.com/office/drawing/2014/main" id="{C88BA41B-BEA2-4BF7-99C7-007B9FDEBDFF}"/>
-              </a:ext>
-            </a:extLst>
-          </p:cNvPr>
-          <p:cNvCxnSpPr>
-            <a:cxnSpLocks/>
-          </p:cNvCxnSpPr>
-          <p:nvPr/>
-        </p:nvCxnSpPr>
-        <p:spPr>
-          <a:xfrm>
-            <a:off x="3145970" y="1771048"/>
-            <a:ext cx="3983253" cy="665206"/>
-          </a:xfrm>
-          <a:prstGeom prst="straightConnector1">
-            <a:avLst/>
-          </a:prstGeom>
-          <a:ln w="25400">
-            <a:solidFill>
-              <a:srgbClr val="00B0F0"/>
-            </a:solidFill>
-            <a:headEnd w="lg" len="lg"/>
-            <a:tailEnd type="triangle" w="lg" len="lg"/>
-          </a:ln>
-        </p:spPr>
-        <p:style>
-          <a:lnRef idx="1">
-            <a:schemeClr val="dk1"/>
-          </a:lnRef>
-          <a:fillRef idx="0">
-            <a:schemeClr val="dk1"/>
-          </a:fillRef>
-          <a:effectRef idx="0">
-            <a:schemeClr val="dk1"/>
-          </a:effectRef>
-          <a:fontRef idx="minor">
-            <a:schemeClr val="tx1"/>
-          </a:fontRef>
-        </p:style>
-      </p:cxnSp>
       <p:sp>
         <p:nvSpPr>
           <p:cNvPr id="14" name="文本框 13">
@@ -6136,7 +6233,7 @@
         </p:nvSpPr>
         <p:spPr>
           <a:xfrm rot="546195">
-            <a:off x="4630860" y="1735357"/>
+            <a:off x="4570105" y="1725810"/>
             <a:ext cx="1353256" cy="369332"/>
           </a:xfrm>
           <a:prstGeom prst="rect">
@@ -6164,50 +6261,6 @@
           </a:p>
         </p:txBody>
       </p:sp>
-      <p:cxnSp>
-        <p:nvCxnSpPr>
-          <p:cNvPr id="15" name="直接箭头连接符 14">
-            <a:extLst>
-              <a:ext uri="{FF2B5EF4-FFF2-40B4-BE49-F238E27FC236}">
-                <a16:creationId xmlns:a16="http://schemas.microsoft.com/office/drawing/2014/main" id="{98A0487F-E192-4584-9089-676CA58FF6B4}"/>
-              </a:ext>
-            </a:extLst>
-          </p:cNvPr>
-          <p:cNvCxnSpPr>
-            <a:cxnSpLocks/>
-          </p:cNvCxnSpPr>
-          <p:nvPr/>
-        </p:nvCxnSpPr>
-        <p:spPr>
-          <a:xfrm flipH="1">
-            <a:off x="3158721" y="2605250"/>
-            <a:ext cx="3986287" cy="669360"/>
-          </a:xfrm>
-          <a:prstGeom prst="straightConnector1">
-            <a:avLst/>
-          </a:prstGeom>
-          <a:ln w="25400">
-            <a:solidFill>
-              <a:srgbClr val="00B050"/>
-            </a:solidFill>
-            <a:tailEnd type="triangle" w="lg" len="lg"/>
-          </a:ln>
-        </p:spPr>
-        <p:style>
-          <a:lnRef idx="1">
-            <a:schemeClr val="dk1"/>
-          </a:lnRef>
-          <a:fillRef idx="0">
-            <a:schemeClr val="dk1"/>
-          </a:fillRef>
-          <a:effectRef idx="0">
-            <a:schemeClr val="dk1"/>
-          </a:effectRef>
-          <a:fontRef idx="minor">
-            <a:schemeClr val="tx1"/>
-          </a:fontRef>
-        </p:style>
-      </p:cxnSp>
       <p:sp>
         <p:nvSpPr>
           <p:cNvPr id="20" name="文本框 19">
@@ -6307,13 +6360,13 @@
           <p:nvPr>
             <p:extLst>
               <p:ext uri="{D42A27DB-BD31-4B8C-83A1-F6EECF244321}">
-                <p14:modId xmlns:p14="http://schemas.microsoft.com/office/powerpoint/2010/main" val="3019223156"/>
+                <p14:modId xmlns:p14="http://schemas.microsoft.com/office/powerpoint/2010/main" val="2201340875"/>
               </p:ext>
             </p:extLst>
           </p:nvPr>
         </p:nvGraphicFramePr>
         <p:xfrm>
-          <a:off x="9643793" y="2096213"/>
+          <a:off x="10586935" y="2105986"/>
           <a:ext cx="3210129" cy="1483360"/>
         </p:xfrm>
         <a:graphic>
@@ -6838,7 +6891,7 @@
           </a:prstGeom>
           <a:solidFill>
             <a:schemeClr val="bg1">
-              <a:lumMod val="95000"/>
+              <a:lumMod val="85000"/>
             </a:schemeClr>
           </a:solidFill>
         </p:spPr>
@@ -6944,15 +6997,15 @@
         <p:spPr>
           <a:xfrm>
             <a:off x="1117708" y="3428999"/>
-            <a:ext cx="1799900" cy="1557867"/>
+            <a:ext cx="1799900" cy="1798371"/>
           </a:xfrm>
           <a:prstGeom prst="rect">
             <a:avLst/>
           </a:prstGeom>
           <a:solidFill>
             <a:schemeClr val="accent2">
-              <a:lumMod val="20000"/>
-              <a:lumOff val="80000"/>
+              <a:lumMod val="40000"/>
+              <a:lumOff val="60000"/>
             </a:schemeClr>
           </a:solidFill>
         </p:spPr>
@@ -6989,51 +7042,6 @@
           </a:p>
         </p:txBody>
       </p:sp>
-      <p:cxnSp>
-        <p:nvCxnSpPr>
-          <p:cNvPr id="38" name="直接箭头连接符 37">
-            <a:extLst>
-              <a:ext uri="{FF2B5EF4-FFF2-40B4-BE49-F238E27FC236}">
-                <a16:creationId xmlns:a16="http://schemas.microsoft.com/office/drawing/2014/main" id="{A21F9FB0-59F7-49CA-8BE9-FB2E7E5E02FE}"/>
-              </a:ext>
-            </a:extLst>
-          </p:cNvPr>
-          <p:cNvCxnSpPr>
-            <a:cxnSpLocks/>
-          </p:cNvCxnSpPr>
-          <p:nvPr/>
-        </p:nvCxnSpPr>
-        <p:spPr>
-          <a:xfrm>
-            <a:off x="3151168" y="3435069"/>
-            <a:ext cx="3983253" cy="665206"/>
-          </a:xfrm>
-          <a:prstGeom prst="straightConnector1">
-            <a:avLst/>
-          </a:prstGeom>
-          <a:ln w="25400">
-            <a:solidFill>
-              <a:srgbClr val="00B0F0"/>
-            </a:solidFill>
-            <a:headEnd w="lg" len="lg"/>
-            <a:tailEnd type="triangle" w="lg" len="lg"/>
-          </a:ln>
-        </p:spPr>
-        <p:style>
-          <a:lnRef idx="1">
-            <a:schemeClr val="dk1"/>
-          </a:lnRef>
-          <a:fillRef idx="0">
-            <a:schemeClr val="dk1"/>
-          </a:fillRef>
-          <a:effectRef idx="0">
-            <a:schemeClr val="dk1"/>
-          </a:effectRef>
-          <a:fontRef idx="minor">
-            <a:schemeClr val="tx1"/>
-          </a:fontRef>
-        </p:style>
-      </p:cxnSp>
       <p:sp>
         <p:nvSpPr>
           <p:cNvPr id="49" name="矩形 48">
@@ -7056,7 +7064,7 @@
           </a:prstGeom>
           <a:solidFill>
             <a:schemeClr val="bg1">
-              <a:lumMod val="95000"/>
+              <a:lumMod val="85000"/>
             </a:schemeClr>
           </a:solidFill>
         </p:spPr>
@@ -7215,16 +7223,16 @@
         </p:nvSpPr>
         <p:spPr>
           <a:xfrm>
-            <a:off x="7374672" y="4197459"/>
-            <a:ext cx="1799898" cy="789408"/>
+            <a:off x="7374672" y="4197458"/>
+            <a:ext cx="1799898" cy="1029911"/>
           </a:xfrm>
           <a:prstGeom prst="rect">
             <a:avLst/>
           </a:prstGeom>
           <a:solidFill>
             <a:schemeClr val="accent2">
-              <a:lumMod val="20000"/>
-              <a:lumOff val="80000"/>
+              <a:lumMod val="40000"/>
+              <a:lumOff val="60000"/>
             </a:schemeClr>
           </a:solidFill>
         </p:spPr>
@@ -7258,6 +7266,385 @@
               <a:latin typeface="Times New Roman" panose="02020603050405020304" pitchFamily="18" charset="0"/>
               <a:ea typeface="宋体" panose="02010600030101010101" pitchFamily="2" charset="-122"/>
             </a:endParaRPr>
+          </a:p>
+        </p:txBody>
+      </p:sp>
+      <p:cxnSp>
+        <p:nvCxnSpPr>
+          <p:cNvPr id="3" name="直接箭头连接符 2">
+            <a:extLst>
+              <a:ext uri="{FF2B5EF4-FFF2-40B4-BE49-F238E27FC236}">
+                <a16:creationId xmlns:a16="http://schemas.microsoft.com/office/drawing/2014/main" id="{CDB74200-72A7-450B-9D3E-15E2C61393C7}"/>
+              </a:ext>
+            </a:extLst>
+          </p:cNvPr>
+          <p:cNvCxnSpPr/>
+          <p:nvPr/>
+        </p:nvCxnSpPr>
+        <p:spPr>
+          <a:xfrm>
+            <a:off x="3623023" y="4838700"/>
+            <a:ext cx="3029146" cy="0"/>
+          </a:xfrm>
+          <a:prstGeom prst="straightConnector1">
+            <a:avLst/>
+          </a:prstGeom>
+          <a:ln w="31750">
+            <a:headEnd type="triangle" w="lg" len="lg"/>
+            <a:tailEnd type="triangle" w="lg" len="lg"/>
+          </a:ln>
+        </p:spPr>
+        <p:style>
+          <a:lnRef idx="1">
+            <a:schemeClr val="dk1"/>
+          </a:lnRef>
+          <a:fillRef idx="0">
+            <a:schemeClr val="dk1"/>
+          </a:fillRef>
+          <a:effectRef idx="0">
+            <a:schemeClr val="dk1"/>
+          </a:effectRef>
+          <a:fontRef idx="minor">
+            <a:schemeClr val="tx1"/>
+          </a:fontRef>
+        </p:style>
+      </p:cxnSp>
+      <p:sp>
+        <p:nvSpPr>
+          <p:cNvPr id="22" name="文本框 21">
+            <a:extLst>
+              <a:ext uri="{FF2B5EF4-FFF2-40B4-BE49-F238E27FC236}">
+                <a16:creationId xmlns:a16="http://schemas.microsoft.com/office/drawing/2014/main" id="{8956D88C-8296-4910-B64C-AF3B83355BDD}"/>
+              </a:ext>
+            </a:extLst>
+          </p:cNvPr>
+          <p:cNvSpPr txBox="1"/>
+          <p:nvPr/>
+        </p:nvSpPr>
+        <p:spPr>
+          <a:xfrm>
+            <a:off x="4651017" y="4392108"/>
+            <a:ext cx="1210588" cy="400110"/>
+          </a:xfrm>
+          <a:prstGeom prst="rect">
+            <a:avLst/>
+          </a:prstGeom>
+          <a:noFill/>
+        </p:spPr>
+        <p:txBody>
+          <a:bodyPr wrap="none" rtlCol="0">
+            <a:spAutoFit/>
+          </a:bodyPr>
+          <a:lstStyle/>
+          <a:p>
+            <a:pPr algn="ctr"/>
+            <a:r>
+              <a:rPr lang="zh-CN" altLang="en-US" sz="2000" dirty="0">
+                <a:latin typeface="Times New Roman" panose="02020603050405020304" pitchFamily="18" charset="0"/>
+                <a:ea typeface="宋体" panose="02010600030101010101" pitchFamily="2" charset="-122"/>
+              </a:rPr>
+              <a:t>数据传输</a:t>
+            </a:r>
+          </a:p>
+        </p:txBody>
+      </p:sp>
+      <p:cxnSp>
+        <p:nvCxnSpPr>
+          <p:cNvPr id="5" name="连接符: 肘形 4">
+            <a:extLst>
+              <a:ext uri="{FF2B5EF4-FFF2-40B4-BE49-F238E27FC236}">
+                <a16:creationId xmlns:a16="http://schemas.microsoft.com/office/drawing/2014/main" id="{BC5D265D-7367-403B-A023-A5B2C34DE8BF}"/>
+              </a:ext>
+            </a:extLst>
+          </p:cNvPr>
+          <p:cNvCxnSpPr>
+            <a:cxnSpLocks/>
+            <a:stCxn id="9" idx="1"/>
+            <a:endCxn id="11" idx="1"/>
+          </p:cNvCxnSpPr>
+          <p:nvPr/>
+        </p:nvCxnSpPr>
+        <p:spPr>
+          <a:xfrm rot="10800000" flipV="1">
+            <a:off x="1022548" y="563234"/>
+            <a:ext cx="1646368" cy="1133490"/>
+          </a:xfrm>
+          <a:prstGeom prst="bentConnector3">
+            <a:avLst>
+              <a:gd name="adj1" fmla="val 113885"/>
+            </a:avLst>
+          </a:prstGeom>
+          <a:ln w="19050" cmpd="sng">
+            <a:prstDash val="solid"/>
+            <a:tailEnd type="triangle"/>
+          </a:ln>
+        </p:spPr>
+        <p:style>
+          <a:lnRef idx="1">
+            <a:schemeClr val="dk1"/>
+          </a:lnRef>
+          <a:fillRef idx="0">
+            <a:schemeClr val="dk1"/>
+          </a:fillRef>
+          <a:effectRef idx="0">
+            <a:schemeClr val="dk1"/>
+          </a:effectRef>
+          <a:fontRef idx="minor">
+            <a:schemeClr val="tx1"/>
+          </a:fontRef>
+        </p:style>
+      </p:cxnSp>
+      <p:sp>
+        <p:nvSpPr>
+          <p:cNvPr id="11" name="矩形 10">
+            <a:extLst>
+              <a:ext uri="{FF2B5EF4-FFF2-40B4-BE49-F238E27FC236}">
+                <a16:creationId xmlns:a16="http://schemas.microsoft.com/office/drawing/2014/main" id="{556B0665-4471-4CCE-92DA-5A5EB35A95BF}"/>
+              </a:ext>
+            </a:extLst>
+          </p:cNvPr>
+          <p:cNvSpPr/>
+          <p:nvPr/>
+        </p:nvSpPr>
+        <p:spPr>
+          <a:xfrm>
+            <a:off x="1022548" y="1630630"/>
+            <a:ext cx="428967" cy="132188"/>
+          </a:xfrm>
+          <a:prstGeom prst="rect">
+            <a:avLst/>
+          </a:prstGeom>
+          <a:ln w="15875">
+            <a:noFill/>
+            <a:tailEnd type="none" w="lg" len="lg"/>
+          </a:ln>
+        </p:spPr>
+        <p:style>
+          <a:lnRef idx="1">
+            <a:schemeClr val="dk1"/>
+          </a:lnRef>
+          <a:fillRef idx="0">
+            <a:schemeClr val="dk1"/>
+          </a:fillRef>
+          <a:effectRef idx="0">
+            <a:schemeClr val="dk1"/>
+          </a:effectRef>
+          <a:fontRef idx="minor">
+            <a:schemeClr val="tx1"/>
+          </a:fontRef>
+        </p:style>
+        <p:txBody>
+          <a:bodyPr rtlCol="0" anchor="ctr"/>
+          <a:lstStyle/>
+          <a:p>
+            <a:pPr algn="ctr"/>
+            <a:endParaRPr lang="zh-CN" altLang="en-US"/>
+          </a:p>
+        </p:txBody>
+      </p:sp>
+      <p:sp>
+        <p:nvSpPr>
+          <p:cNvPr id="29" name="文本框 28">
+            <a:extLst>
+              <a:ext uri="{FF2B5EF4-FFF2-40B4-BE49-F238E27FC236}">
+                <a16:creationId xmlns:a16="http://schemas.microsoft.com/office/drawing/2014/main" id="{24F760A8-549A-4769-A8F9-2F53D6027121}"/>
+              </a:ext>
+            </a:extLst>
+          </p:cNvPr>
+          <p:cNvSpPr txBox="1"/>
+          <p:nvPr/>
+        </p:nvSpPr>
+        <p:spPr>
+          <a:xfrm>
+            <a:off x="-638865" y="776036"/>
+            <a:ext cx="1433049" cy="707886"/>
+          </a:xfrm>
+          <a:prstGeom prst="rect">
+            <a:avLst/>
+          </a:prstGeom>
+          <a:noFill/>
+        </p:spPr>
+        <p:txBody>
+          <a:bodyPr wrap="square" rtlCol="0">
+            <a:spAutoFit/>
+          </a:bodyPr>
+          <a:lstStyle/>
+          <a:p>
+            <a:pPr algn="ctr"/>
+            <a:r>
+              <a:rPr lang="zh-CN" altLang="en-US" sz="2000" dirty="0">
+                <a:latin typeface="Times New Roman" panose="02020603050405020304" pitchFamily="18" charset="0"/>
+                <a:ea typeface="宋体" panose="02010600030101010101" pitchFamily="2" charset="-122"/>
+              </a:rPr>
+              <a:t>建立</a:t>
+            </a:r>
+            <a:r>
+              <a:rPr lang="en-US" altLang="zh-CN" sz="2000" dirty="0">
+                <a:latin typeface="Times New Roman" panose="02020603050405020304" pitchFamily="18" charset="0"/>
+                <a:ea typeface="宋体" panose="02010600030101010101" pitchFamily="2" charset="-122"/>
+              </a:rPr>
+              <a:t>TCB</a:t>
+            </a:r>
+          </a:p>
+          <a:p>
+            <a:pPr algn="ctr"/>
+            <a:r>
+              <a:rPr lang="zh-CN" altLang="en-US" sz="2000" dirty="0">
+                <a:latin typeface="Times New Roman" panose="02020603050405020304" pitchFamily="18" charset="0"/>
+                <a:ea typeface="宋体" panose="02010600030101010101" pitchFamily="2" charset="-122"/>
+              </a:rPr>
+              <a:t>主动打开</a:t>
+            </a:r>
+          </a:p>
+        </p:txBody>
+      </p:sp>
+      <p:cxnSp>
+        <p:nvCxnSpPr>
+          <p:cNvPr id="36" name="连接符: 肘形 35">
+            <a:extLst>
+              <a:ext uri="{FF2B5EF4-FFF2-40B4-BE49-F238E27FC236}">
+                <a16:creationId xmlns:a16="http://schemas.microsoft.com/office/drawing/2014/main" id="{A4BA51C5-2A02-4CA8-8D92-E14A7DF209E0}"/>
+              </a:ext>
+            </a:extLst>
+          </p:cNvPr>
+          <p:cNvCxnSpPr>
+            <a:cxnSpLocks/>
+            <a:stCxn id="10" idx="3"/>
+            <a:endCxn id="37" idx="3"/>
+          </p:cNvCxnSpPr>
+          <p:nvPr/>
+        </p:nvCxnSpPr>
+        <p:spPr>
+          <a:xfrm>
+            <a:off x="7606276" y="563234"/>
+            <a:ext cx="1663968" cy="1141720"/>
+          </a:xfrm>
+          <a:prstGeom prst="bentConnector3">
+            <a:avLst>
+              <a:gd name="adj1" fmla="val 113738"/>
+            </a:avLst>
+          </a:prstGeom>
+          <a:ln w="19050" cmpd="sng">
+            <a:prstDash val="solid"/>
+            <a:tailEnd type="triangle"/>
+          </a:ln>
+        </p:spPr>
+        <p:style>
+          <a:lnRef idx="1">
+            <a:schemeClr val="dk1"/>
+          </a:lnRef>
+          <a:fillRef idx="0">
+            <a:schemeClr val="dk1"/>
+          </a:fillRef>
+          <a:effectRef idx="0">
+            <a:schemeClr val="dk1"/>
+          </a:effectRef>
+          <a:fontRef idx="minor">
+            <a:schemeClr val="tx1"/>
+          </a:fontRef>
+        </p:style>
+      </p:cxnSp>
+      <p:sp>
+        <p:nvSpPr>
+          <p:cNvPr id="37" name="矩形 36">
+            <a:extLst>
+              <a:ext uri="{FF2B5EF4-FFF2-40B4-BE49-F238E27FC236}">
+                <a16:creationId xmlns:a16="http://schemas.microsoft.com/office/drawing/2014/main" id="{66280717-461C-44D0-A318-E689CAC0257E}"/>
+              </a:ext>
+            </a:extLst>
+          </p:cNvPr>
+          <p:cNvSpPr/>
+          <p:nvPr/>
+        </p:nvSpPr>
+        <p:spPr>
+          <a:xfrm>
+            <a:off x="8841277" y="1638860"/>
+            <a:ext cx="428967" cy="132188"/>
+          </a:xfrm>
+          <a:prstGeom prst="rect">
+            <a:avLst/>
+          </a:prstGeom>
+          <a:ln w="15875">
+            <a:noFill/>
+            <a:tailEnd type="none" w="lg" len="lg"/>
+          </a:ln>
+        </p:spPr>
+        <p:style>
+          <a:lnRef idx="1">
+            <a:schemeClr val="dk1"/>
+          </a:lnRef>
+          <a:fillRef idx="0">
+            <a:schemeClr val="dk1"/>
+          </a:fillRef>
+          <a:effectRef idx="0">
+            <a:schemeClr val="dk1"/>
+          </a:effectRef>
+          <a:fontRef idx="minor">
+            <a:schemeClr val="tx1"/>
+          </a:fontRef>
+        </p:style>
+        <p:txBody>
+          <a:bodyPr rtlCol="0" anchor="ctr"/>
+          <a:lstStyle/>
+          <a:p>
+            <a:pPr algn="ctr"/>
+            <a:endParaRPr lang="zh-CN" altLang="en-US"/>
+          </a:p>
+        </p:txBody>
+      </p:sp>
+      <p:sp>
+        <p:nvSpPr>
+          <p:cNvPr id="39" name="文本框 38">
+            <a:extLst>
+              <a:ext uri="{FF2B5EF4-FFF2-40B4-BE49-F238E27FC236}">
+                <a16:creationId xmlns:a16="http://schemas.microsoft.com/office/drawing/2014/main" id="{F41517F9-DED1-4707-AADC-33823A28EDC6}"/>
+              </a:ext>
+            </a:extLst>
+          </p:cNvPr>
+          <p:cNvSpPr txBox="1"/>
+          <p:nvPr/>
+        </p:nvSpPr>
+        <p:spPr>
+          <a:xfrm>
+            <a:off x="9406174" y="669217"/>
+            <a:ext cx="1433049" cy="707886"/>
+          </a:xfrm>
+          <a:prstGeom prst="rect">
+            <a:avLst/>
+          </a:prstGeom>
+          <a:noFill/>
+        </p:spPr>
+        <p:txBody>
+          <a:bodyPr wrap="square" rtlCol="0">
+            <a:spAutoFit/>
+          </a:bodyPr>
+          <a:lstStyle/>
+          <a:p>
+            <a:pPr algn="ctr"/>
+            <a:r>
+              <a:rPr lang="zh-CN" altLang="en-US" sz="2000" dirty="0">
+                <a:latin typeface="Times New Roman" panose="02020603050405020304" pitchFamily="18" charset="0"/>
+                <a:ea typeface="宋体" panose="02010600030101010101" pitchFamily="2" charset="-122"/>
+              </a:rPr>
+              <a:t>建立</a:t>
+            </a:r>
+            <a:r>
+              <a:rPr lang="en-US" altLang="zh-CN" sz="2000" dirty="0">
+                <a:latin typeface="Times New Roman" panose="02020603050405020304" pitchFamily="18" charset="0"/>
+                <a:ea typeface="宋体" panose="02010600030101010101" pitchFamily="2" charset="-122"/>
+              </a:rPr>
+              <a:t>TCB</a:t>
+            </a:r>
+          </a:p>
+          <a:p>
+            <a:pPr algn="ctr"/>
+            <a:r>
+              <a:rPr lang="zh-CN" altLang="en-US" sz="2000" dirty="0">
+                <a:latin typeface="Times New Roman" panose="02020603050405020304" pitchFamily="18" charset="0"/>
+                <a:ea typeface="宋体" panose="02010600030101010101" pitchFamily="2" charset="-122"/>
+              </a:rPr>
+              <a:t>被动打开</a:t>
+            </a:r>
           </a:p>
         </p:txBody>
       </p:sp>
@@ -7293,6 +7680,184 @@
       </p:grpSpPr>
       <p:cxnSp>
         <p:nvCxnSpPr>
+          <p:cNvPr id="12" name="直接箭头连接符 11">
+            <a:extLst>
+              <a:ext uri="{FF2B5EF4-FFF2-40B4-BE49-F238E27FC236}">
+                <a16:creationId xmlns:a16="http://schemas.microsoft.com/office/drawing/2014/main" id="{C88BA41B-BEA2-4BF7-99C7-007B9FDEBDFF}"/>
+              </a:ext>
+            </a:extLst>
+          </p:cNvPr>
+          <p:cNvCxnSpPr>
+            <a:cxnSpLocks/>
+          </p:cNvCxnSpPr>
+          <p:nvPr/>
+        </p:nvCxnSpPr>
+        <p:spPr>
+          <a:xfrm>
+            <a:off x="3136445" y="1771048"/>
+            <a:ext cx="3983253" cy="665206"/>
+          </a:xfrm>
+          <a:prstGeom prst="straightConnector1">
+            <a:avLst/>
+          </a:prstGeom>
+          <a:ln w="25400">
+            <a:solidFill>
+              <a:srgbClr val="00B0F0"/>
+            </a:solidFill>
+            <a:headEnd w="lg" len="lg"/>
+            <a:tailEnd type="triangle" w="lg" len="lg"/>
+          </a:ln>
+        </p:spPr>
+        <p:style>
+          <a:lnRef idx="1">
+            <a:schemeClr val="dk1"/>
+          </a:lnRef>
+          <a:fillRef idx="0">
+            <a:schemeClr val="dk1"/>
+          </a:fillRef>
+          <a:effectRef idx="0">
+            <a:schemeClr val="dk1"/>
+          </a:effectRef>
+          <a:fontRef idx="minor">
+            <a:schemeClr val="tx1"/>
+          </a:fontRef>
+        </p:style>
+      </p:cxnSp>
+      <p:cxnSp>
+        <p:nvCxnSpPr>
+          <p:cNvPr id="15" name="直接箭头连接符 14">
+            <a:extLst>
+              <a:ext uri="{FF2B5EF4-FFF2-40B4-BE49-F238E27FC236}">
+                <a16:creationId xmlns:a16="http://schemas.microsoft.com/office/drawing/2014/main" id="{98A0487F-E192-4584-9089-676CA58FF6B4}"/>
+              </a:ext>
+            </a:extLst>
+          </p:cNvPr>
+          <p:cNvCxnSpPr>
+            <a:cxnSpLocks/>
+          </p:cNvCxnSpPr>
+          <p:nvPr/>
+        </p:nvCxnSpPr>
+        <p:spPr>
+          <a:xfrm flipH="1">
+            <a:off x="3149196" y="2605250"/>
+            <a:ext cx="3986287" cy="669360"/>
+          </a:xfrm>
+          <a:prstGeom prst="straightConnector1">
+            <a:avLst/>
+          </a:prstGeom>
+          <a:ln w="25400">
+            <a:solidFill>
+              <a:srgbClr val="00B050"/>
+            </a:solidFill>
+            <a:tailEnd type="triangle" w="lg" len="lg"/>
+          </a:ln>
+        </p:spPr>
+        <p:style>
+          <a:lnRef idx="1">
+            <a:schemeClr val="dk1"/>
+          </a:lnRef>
+          <a:fillRef idx="0">
+            <a:schemeClr val="dk1"/>
+          </a:fillRef>
+          <a:effectRef idx="0">
+            <a:schemeClr val="dk1"/>
+          </a:effectRef>
+          <a:fontRef idx="minor">
+            <a:schemeClr val="tx1"/>
+          </a:fontRef>
+        </p:style>
+      </p:cxnSp>
+      <p:cxnSp>
+        <p:nvCxnSpPr>
+          <p:cNvPr id="38" name="直接箭头连接符 37">
+            <a:extLst>
+              <a:ext uri="{FF2B5EF4-FFF2-40B4-BE49-F238E27FC236}">
+                <a16:creationId xmlns:a16="http://schemas.microsoft.com/office/drawing/2014/main" id="{A21F9FB0-59F7-49CA-8BE9-FB2E7E5E02FE}"/>
+              </a:ext>
+            </a:extLst>
+          </p:cNvPr>
+          <p:cNvCxnSpPr>
+            <a:cxnSpLocks/>
+          </p:cNvCxnSpPr>
+          <p:nvPr/>
+        </p:nvCxnSpPr>
+        <p:spPr>
+          <a:xfrm>
+            <a:off x="3130186" y="4354415"/>
+            <a:ext cx="3983253" cy="665206"/>
+          </a:xfrm>
+          <a:prstGeom prst="straightConnector1">
+            <a:avLst/>
+          </a:prstGeom>
+          <a:ln w="25400">
+            <a:solidFill>
+              <a:srgbClr val="00B0F0"/>
+            </a:solidFill>
+            <a:headEnd w="lg" len="lg"/>
+            <a:tailEnd type="triangle" w="lg" len="lg"/>
+          </a:ln>
+        </p:spPr>
+        <p:style>
+          <a:lnRef idx="1">
+            <a:schemeClr val="dk1"/>
+          </a:lnRef>
+          <a:fillRef idx="0">
+            <a:schemeClr val="dk1"/>
+          </a:fillRef>
+          <a:effectRef idx="0">
+            <a:schemeClr val="dk1"/>
+          </a:effectRef>
+          <a:fontRef idx="minor">
+            <a:schemeClr val="tx1"/>
+          </a:fontRef>
+        </p:style>
+      </p:cxnSp>
+      <p:cxnSp>
+        <p:nvCxnSpPr>
+          <p:cNvPr id="22" name="直接箭头连接符 21">
+            <a:extLst>
+              <a:ext uri="{FF2B5EF4-FFF2-40B4-BE49-F238E27FC236}">
+                <a16:creationId xmlns:a16="http://schemas.microsoft.com/office/drawing/2014/main" id="{5F18F225-730D-49A0-822E-C290A589D66E}"/>
+              </a:ext>
+            </a:extLst>
+          </p:cNvPr>
+          <p:cNvCxnSpPr>
+            <a:cxnSpLocks/>
+          </p:cNvCxnSpPr>
+          <p:nvPr/>
+        </p:nvCxnSpPr>
+        <p:spPr>
+          <a:xfrm flipH="1">
+            <a:off x="3146202" y="3508656"/>
+            <a:ext cx="3986287" cy="669360"/>
+          </a:xfrm>
+          <a:prstGeom prst="straightConnector1">
+            <a:avLst/>
+          </a:prstGeom>
+          <a:ln w="25400">
+            <a:solidFill>
+              <a:srgbClr val="00B050"/>
+            </a:solidFill>
+            <a:tailEnd type="triangle" w="lg" len="lg"/>
+          </a:ln>
+        </p:spPr>
+        <p:style>
+          <a:lnRef idx="1">
+            <a:schemeClr val="dk1"/>
+          </a:lnRef>
+          <a:fillRef idx="0">
+            <a:schemeClr val="dk1"/>
+          </a:fillRef>
+          <a:effectRef idx="0">
+            <a:schemeClr val="dk1"/>
+          </a:effectRef>
+          <a:fontRef idx="minor">
+            <a:schemeClr val="tx1"/>
+          </a:fontRef>
+        </p:style>
+      </p:cxnSp>
+      <p:cxnSp>
+        <p:nvCxnSpPr>
           <p:cNvPr id="7" name="直接箭头连接符 6">
             <a:extLst>
               <a:ext uri="{FF2B5EF4-FFF2-40B4-BE49-F238E27FC236}">
@@ -7308,7 +7873,7 @@
         <p:spPr>
           <a:xfrm>
             <a:off x="3145971" y="981777"/>
-            <a:ext cx="0" cy="4005090"/>
+            <a:ext cx="0" cy="5681670"/>
           </a:xfrm>
           <a:prstGeom prst="straightConnector1">
             <a:avLst/>
@@ -7349,7 +7914,7 @@
         <p:spPr>
           <a:xfrm>
             <a:off x="7129223" y="981777"/>
-            <a:ext cx="0" cy="4005089"/>
+            <a:ext cx="0" cy="5681670"/>
           </a:xfrm>
           <a:prstGeom prst="straightConnector1">
             <a:avLst/>
@@ -7401,6 +7966,7 @@
           </a:bodyPr>
           <a:lstStyle/>
           <a:p>
+            <a:pPr algn="ctr"/>
             <a:r>
               <a:rPr lang="zh-CN" altLang="en-US" sz="2000" dirty="0">
                 <a:latin typeface="Times New Roman" panose="02020603050405020304" pitchFamily="18" charset="0"/>
@@ -7439,6 +8005,7 @@
           </a:bodyPr>
           <a:lstStyle/>
           <a:p>
+            <a:pPr algn="ctr"/>
             <a:r>
               <a:rPr lang="zh-CN" altLang="en-US" sz="2000" dirty="0">
                 <a:latin typeface="Times New Roman" panose="02020603050405020304" pitchFamily="18" charset="0"/>
@@ -7449,51 +8016,6 @@
           </a:p>
         </p:txBody>
       </p:sp>
-      <p:cxnSp>
-        <p:nvCxnSpPr>
-          <p:cNvPr id="12" name="直接箭头连接符 11">
-            <a:extLst>
-              <a:ext uri="{FF2B5EF4-FFF2-40B4-BE49-F238E27FC236}">
-                <a16:creationId xmlns:a16="http://schemas.microsoft.com/office/drawing/2014/main" id="{C88BA41B-BEA2-4BF7-99C7-007B9FDEBDFF}"/>
-              </a:ext>
-            </a:extLst>
-          </p:cNvPr>
-          <p:cNvCxnSpPr>
-            <a:cxnSpLocks/>
-          </p:cNvCxnSpPr>
-          <p:nvPr/>
-        </p:nvCxnSpPr>
-        <p:spPr>
-          <a:xfrm>
-            <a:off x="3145970" y="1771048"/>
-            <a:ext cx="3983253" cy="665206"/>
-          </a:xfrm>
-          <a:prstGeom prst="straightConnector1">
-            <a:avLst/>
-          </a:prstGeom>
-          <a:ln w="25400">
-            <a:solidFill>
-              <a:srgbClr val="00B0F0"/>
-            </a:solidFill>
-            <a:headEnd w="lg" len="lg"/>
-            <a:tailEnd type="triangle" w="lg" len="lg"/>
-          </a:ln>
-        </p:spPr>
-        <p:style>
-          <a:lnRef idx="1">
-            <a:schemeClr val="dk1"/>
-          </a:lnRef>
-          <a:fillRef idx="0">
-            <a:schemeClr val="dk1"/>
-          </a:fillRef>
-          <a:effectRef idx="0">
-            <a:schemeClr val="dk1"/>
-          </a:effectRef>
-          <a:fontRef idx="minor">
-            <a:schemeClr val="tx1"/>
-          </a:fontRef>
-        </p:style>
-      </p:cxnSp>
       <p:sp>
         <p:nvSpPr>
           <p:cNvPr id="14" name="文本框 13">
@@ -7508,8 +8030,8 @@
         </p:nvSpPr>
         <p:spPr>
           <a:xfrm rot="546195">
-            <a:off x="4630860" y="1735357"/>
-            <a:ext cx="1353256" cy="369332"/>
+            <a:off x="4258129" y="1735357"/>
+            <a:ext cx="2098716" cy="369332"/>
           </a:xfrm>
           <a:prstGeom prst="rect">
             <a:avLst/>
@@ -7527,7 +8049,7 @@
                 <a:latin typeface="Times New Roman" panose="02020603050405020304" pitchFamily="18" charset="0"/>
                 <a:ea typeface="宋体" panose="02010600030101010101" pitchFamily="2" charset="-122"/>
               </a:rPr>
-              <a:t>Seq=p, SYN</a:t>
+              <a:t>Seq=u, FIN, ACK=*</a:t>
             </a:r>
             <a:endParaRPr lang="zh-CN" altLang="en-US" dirty="0">
               <a:latin typeface="Times New Roman" panose="02020603050405020304" pitchFamily="18" charset="0"/>
@@ -7536,50 +8058,6 @@
           </a:p>
         </p:txBody>
       </p:sp>
-      <p:cxnSp>
-        <p:nvCxnSpPr>
-          <p:cNvPr id="15" name="直接箭头连接符 14">
-            <a:extLst>
-              <a:ext uri="{FF2B5EF4-FFF2-40B4-BE49-F238E27FC236}">
-                <a16:creationId xmlns:a16="http://schemas.microsoft.com/office/drawing/2014/main" id="{98A0487F-E192-4584-9089-676CA58FF6B4}"/>
-              </a:ext>
-            </a:extLst>
-          </p:cNvPr>
-          <p:cNvCxnSpPr>
-            <a:cxnSpLocks/>
-          </p:cNvCxnSpPr>
-          <p:nvPr/>
-        </p:nvCxnSpPr>
-        <p:spPr>
-          <a:xfrm flipH="1">
-            <a:off x="3158721" y="2605250"/>
-            <a:ext cx="3986287" cy="669360"/>
-          </a:xfrm>
-          <a:prstGeom prst="straightConnector1">
-            <a:avLst/>
-          </a:prstGeom>
-          <a:ln w="25400">
-            <a:solidFill>
-              <a:srgbClr val="00B050"/>
-            </a:solidFill>
-            <a:tailEnd type="triangle" w="lg" len="lg"/>
-          </a:ln>
-        </p:spPr>
-        <p:style>
-          <a:lnRef idx="1">
-            <a:schemeClr val="dk1"/>
-          </a:lnRef>
-          <a:fillRef idx="0">
-            <a:schemeClr val="dk1"/>
-          </a:fillRef>
-          <a:effectRef idx="0">
-            <a:schemeClr val="dk1"/>
-          </a:effectRef>
-          <a:fontRef idx="minor">
-            <a:schemeClr val="tx1"/>
-          </a:fontRef>
-        </p:style>
-      </p:cxnSp>
       <p:sp>
         <p:nvSpPr>
           <p:cNvPr id="20" name="文本框 19">
@@ -7594,8 +8072,8 @@
         </p:nvSpPr>
         <p:spPr>
           <a:xfrm rot="21060000">
-            <a:off x="3835805" y="2512592"/>
-            <a:ext cx="2418739" cy="369332"/>
+            <a:off x="4124345" y="2512592"/>
+            <a:ext cx="1841658" cy="369332"/>
           </a:xfrm>
           <a:prstGeom prst="rect">
             <a:avLst/>
@@ -7613,49 +8091,7 @@
                 <a:latin typeface="Times New Roman" panose="02020603050405020304" pitchFamily="18" charset="0"/>
                 <a:ea typeface="宋体" panose="02010600030101010101" pitchFamily="2" charset="-122"/>
               </a:rPr>
-              <a:t>Seq=y, SYN, ACK=x+1</a:t>
-            </a:r>
-            <a:endParaRPr lang="zh-CN" altLang="en-US" dirty="0">
-              <a:latin typeface="Times New Roman" panose="02020603050405020304" pitchFamily="18" charset="0"/>
-              <a:ea typeface="宋体" panose="02010600030101010101" pitchFamily="2" charset="-122"/>
-            </a:endParaRPr>
-          </a:p>
-        </p:txBody>
-      </p:sp>
-      <p:sp>
-        <p:nvSpPr>
-          <p:cNvPr id="28" name="文本框 27">
-            <a:extLst>
-              <a:ext uri="{FF2B5EF4-FFF2-40B4-BE49-F238E27FC236}">
-                <a16:creationId xmlns:a16="http://schemas.microsoft.com/office/drawing/2014/main" id="{84CD8D4F-766C-435E-BA35-D93EF9E49689}"/>
-              </a:ext>
-            </a:extLst>
-          </p:cNvPr>
-          <p:cNvSpPr txBox="1"/>
-          <p:nvPr/>
-        </p:nvSpPr>
-        <p:spPr>
-          <a:xfrm rot="540000">
-            <a:off x="4256526" y="3404680"/>
-            <a:ext cx="2101922" cy="369332"/>
-          </a:xfrm>
-          <a:prstGeom prst="rect">
-            <a:avLst/>
-          </a:prstGeom>
-          <a:noFill/>
-        </p:spPr>
-        <p:txBody>
-          <a:bodyPr wrap="none" rtlCol="0">
-            <a:spAutoFit/>
-          </a:bodyPr>
-          <a:lstStyle/>
-          <a:p>
-            <a:r>
-              <a:rPr lang="en-US" altLang="zh-CN" dirty="0">
-                <a:latin typeface="Times New Roman" panose="02020603050405020304" pitchFamily="18" charset="0"/>
-                <a:ea typeface="宋体" panose="02010600030101010101" pitchFamily="2" charset="-122"/>
-              </a:rPr>
-              <a:t>Seq=x+1, ACK=y+1</a:t>
+              <a:t>Seq=v, ACK=u+1</a:t>
             </a:r>
             <a:endParaRPr lang="zh-CN" altLang="en-US" dirty="0">
               <a:latin typeface="Times New Roman" panose="02020603050405020304" pitchFamily="18" charset="0"/>
@@ -7686,8 +8122,8 @@
           </a:prstGeom>
           <a:solidFill>
             <a:schemeClr val="accent2">
-              <a:lumMod val="20000"/>
-              <a:lumOff val="80000"/>
+              <a:lumMod val="40000"/>
+              <a:lumOff val="60000"/>
             </a:schemeClr>
           </a:solidFill>
         </p:spPr>
@@ -7769,7 +8205,7 @@
                 <a:latin typeface="Times New Roman" panose="02020603050405020304" pitchFamily="18" charset="0"/>
                 <a:ea typeface="宋体" panose="02010600030101010101" pitchFamily="2" charset="-122"/>
               </a:rPr>
-              <a:t>SYN-SENT</a:t>
+              <a:t>FIN-WAIT-1</a:t>
             </a:r>
             <a:endParaRPr lang="zh-CN" altLang="en-US" sz="2000" dirty="0">
               <a:latin typeface="Times New Roman" panose="02020603050405020304" pitchFamily="18" charset="0"/>
@@ -7792,18 +8228,13 @@
         </p:nvSpPr>
         <p:spPr>
           <a:xfrm>
-            <a:off x="1117708" y="3428999"/>
-            <a:ext cx="1799900" cy="1557867"/>
+            <a:off x="1117707" y="4354415"/>
+            <a:ext cx="1799900" cy="1198660"/>
           </a:xfrm>
           <a:prstGeom prst="rect">
             <a:avLst/>
           </a:prstGeom>
-          <a:solidFill>
-            <a:schemeClr val="accent2">
-              <a:lumMod val="20000"/>
-              <a:lumOff val="80000"/>
-            </a:schemeClr>
-          </a:solidFill>
+          <a:noFill/>
         </p:spPr>
         <p:style>
           <a:lnRef idx="2">
@@ -7829,7 +8260,7 @@
                 <a:latin typeface="Times New Roman" panose="02020603050405020304" pitchFamily="18" charset="0"/>
                 <a:ea typeface="宋体" panose="02010600030101010101" pitchFamily="2" charset="-122"/>
               </a:rPr>
-              <a:t>ESTABLISHED</a:t>
+              <a:t>TIME-WAIT</a:t>
             </a:r>
             <a:endParaRPr lang="zh-CN" altLang="en-US" dirty="0">
               <a:latin typeface="Times New Roman" panose="02020603050405020304" pitchFamily="18" charset="0"/>
@@ -7838,51 +8269,6 @@
           </a:p>
         </p:txBody>
       </p:sp>
-      <p:cxnSp>
-        <p:nvCxnSpPr>
-          <p:cNvPr id="38" name="直接箭头连接符 37">
-            <a:extLst>
-              <a:ext uri="{FF2B5EF4-FFF2-40B4-BE49-F238E27FC236}">
-                <a16:creationId xmlns:a16="http://schemas.microsoft.com/office/drawing/2014/main" id="{A21F9FB0-59F7-49CA-8BE9-FB2E7E5E02FE}"/>
-              </a:ext>
-            </a:extLst>
-          </p:cNvPr>
-          <p:cNvCxnSpPr>
-            <a:cxnSpLocks/>
-          </p:cNvCxnSpPr>
-          <p:nvPr/>
-        </p:nvCxnSpPr>
-        <p:spPr>
-          <a:xfrm>
-            <a:off x="3151168" y="3435069"/>
-            <a:ext cx="3983253" cy="665206"/>
-          </a:xfrm>
-          <a:prstGeom prst="straightConnector1">
-            <a:avLst/>
-          </a:prstGeom>
-          <a:ln w="25400">
-            <a:solidFill>
-              <a:srgbClr val="00B0F0"/>
-            </a:solidFill>
-            <a:headEnd w="lg" len="lg"/>
-            <a:tailEnd type="triangle" w="lg" len="lg"/>
-          </a:ln>
-        </p:spPr>
-        <p:style>
-          <a:lnRef idx="1">
-            <a:schemeClr val="dk1"/>
-          </a:lnRef>
-          <a:fillRef idx="0">
-            <a:schemeClr val="dk1"/>
-          </a:fillRef>
-          <a:effectRef idx="0">
-            <a:schemeClr val="dk1"/>
-          </a:effectRef>
-          <a:fontRef idx="minor">
-            <a:schemeClr val="tx1"/>
-          </a:fontRef>
-        </p:style>
-      </p:cxnSp>
       <p:sp>
         <p:nvSpPr>
           <p:cNvPr id="49" name="矩形 48">
@@ -7898,15 +8284,15 @@
         <p:spPr>
           <a:xfrm>
             <a:off x="7374678" y="1023160"/>
-            <a:ext cx="1799898" cy="609845"/>
+            <a:ext cx="1799898" cy="1453266"/>
           </a:xfrm>
           <a:prstGeom prst="rect">
             <a:avLst/>
           </a:prstGeom>
           <a:solidFill>
             <a:schemeClr val="accent2">
-              <a:lumMod val="20000"/>
-              <a:lumOff val="80000"/>
+              <a:lumMod val="40000"/>
+              <a:lumOff val="60000"/>
             </a:schemeClr>
           </a:solidFill>
         </p:spPr>
@@ -7957,8 +8343,8 @@
         </p:nvSpPr>
         <p:spPr>
           <a:xfrm>
-            <a:off x="7374678" y="1762818"/>
-            <a:ext cx="1799898" cy="673436"/>
+            <a:off x="7374672" y="2601174"/>
+            <a:ext cx="1799898" cy="789408"/>
           </a:xfrm>
           <a:prstGeom prst="rect">
             <a:avLst/>
@@ -7988,7 +8374,7 @@
                 <a:latin typeface="Times New Roman" panose="02020603050405020304" pitchFamily="18" charset="0"/>
                 <a:ea typeface="宋体" panose="02010600030101010101" pitchFamily="2" charset="-122"/>
               </a:rPr>
-              <a:t>LISTEN</a:t>
+              <a:t>CLOSE-WAIT</a:t>
             </a:r>
             <a:endParaRPr lang="zh-CN" altLang="en-US" dirty="0">
               <a:latin typeface="Times New Roman" panose="02020603050405020304" pitchFamily="18" charset="0"/>
@@ -8011,8 +8397,8 @@
         </p:nvSpPr>
         <p:spPr>
           <a:xfrm>
-            <a:off x="7374678" y="2566067"/>
-            <a:ext cx="1799896" cy="1499101"/>
+            <a:off x="7374674" y="3515330"/>
+            <a:ext cx="1799896" cy="1471536"/>
           </a:xfrm>
           <a:prstGeom prst="rect">
             <a:avLst/>
@@ -8042,7 +8428,7 @@
                 <a:latin typeface="Times New Roman" panose="02020603050405020304" pitchFamily="18" charset="0"/>
                 <a:ea typeface="宋体" panose="02010600030101010101" pitchFamily="2" charset="-122"/>
               </a:rPr>
-              <a:t>SYN-RCVD</a:t>
+              <a:t>LAST-ACK</a:t>
             </a:r>
             <a:endParaRPr lang="zh-CN" altLang="en-US" dirty="0">
               <a:latin typeface="Times New Roman" panose="02020603050405020304" pitchFamily="18" charset="0"/>
@@ -8065,16 +8451,15 @@
         </p:nvSpPr>
         <p:spPr>
           <a:xfrm>
-            <a:off x="7374672" y="4197459"/>
+            <a:off x="7374672" y="5111614"/>
             <a:ext cx="1799898" cy="789408"/>
           </a:xfrm>
           <a:prstGeom prst="rect">
             <a:avLst/>
           </a:prstGeom>
           <a:solidFill>
-            <a:schemeClr val="accent2">
-              <a:lumMod val="20000"/>
-              <a:lumOff val="80000"/>
+            <a:schemeClr val="bg1">
+              <a:lumMod val="85000"/>
             </a:schemeClr>
           </a:solidFill>
         </p:spPr>
@@ -8102,7 +8487,7 @@
                 <a:latin typeface="Times New Roman" panose="02020603050405020304" pitchFamily="18" charset="0"/>
                 <a:ea typeface="宋体" panose="02010600030101010101" pitchFamily="2" charset="-122"/>
               </a:rPr>
-              <a:t>ESTABLISHED</a:t>
+              <a:t>CLOSED</a:t>
             </a:r>
             <a:endParaRPr lang="zh-CN" altLang="en-US" dirty="0">
               <a:latin typeface="Times New Roman" panose="02020603050405020304" pitchFamily="18" charset="0"/>
@@ -8126,7 +8511,7 @@
           <p:nvPr>
             <p:extLst>
               <p:ext uri="{D42A27DB-BD31-4B8C-83A1-F6EECF244321}">
-                <p14:modId xmlns:p14="http://schemas.microsoft.com/office/powerpoint/2010/main" val="3149296666"/>
+                <p14:modId xmlns:p14="http://schemas.microsoft.com/office/powerpoint/2010/main" val="1707137296"/>
               </p:ext>
             </p:extLst>
           </p:nvPr>
@@ -8264,53 +8649,14 @@
                       <a:pPr algn="ctr"/>
                       <a:r>
                         <a:rPr lang="en-US" altLang="zh-CN" baseline="0" dirty="0">
+                          <a:solidFill>
+                            <a:schemeClr val="tx1"/>
+                          </a:solidFill>
                           <a:latin typeface="Times New Roman" panose="02020603050405020304" pitchFamily="18" charset="0"/>
                           <a:ea typeface="宋体" panose="02010600030101010101" pitchFamily="2" charset="-122"/>
                         </a:rPr>
                         <a:t>1</a:t>
                       </a:r>
-                      <a:endParaRPr lang="zh-CN" altLang="en-US" baseline="0" dirty="0">
-                        <a:latin typeface="Times New Roman" panose="02020603050405020304" pitchFamily="18" charset="0"/>
-                        <a:ea typeface="宋体" panose="02010600030101010101" pitchFamily="2" charset="-122"/>
-                      </a:endParaRPr>
-                    </a:p>
-                  </a:txBody>
-                  <a:tcPr anchor="ctr">
-                    <a:solidFill>
-                      <a:schemeClr val="accent1">
-                        <a:lumMod val="20000"/>
-                        <a:lumOff val="80000"/>
-                      </a:schemeClr>
-                    </a:solidFill>
-                  </a:tcPr>
-                </a:tc>
-                <a:tc>
-                  <a:txBody>
-                    <a:bodyPr/>
-                    <a:lstStyle/>
-                    <a:p>
-                      <a:pPr algn="ctr"/>
-                      <a:endParaRPr lang="zh-CN" altLang="en-US" baseline="0" dirty="0">
-                        <a:latin typeface="Times New Roman" panose="02020603050405020304" pitchFamily="18" charset="0"/>
-                        <a:ea typeface="宋体" panose="02010600030101010101" pitchFamily="2" charset="-122"/>
-                      </a:endParaRPr>
-                    </a:p>
-                  </a:txBody>
-                  <a:tcPr anchor="ctr">
-                    <a:solidFill>
-                      <a:schemeClr val="accent1">
-                        <a:lumMod val="20000"/>
-                        <a:lumOff val="80000"/>
-                      </a:schemeClr>
-                    </a:solidFill>
-                  </a:tcPr>
-                </a:tc>
-                <a:tc>
-                  <a:txBody>
-                    <a:bodyPr/>
-                    <a:lstStyle/>
-                    <a:p>
-                      <a:pPr algn="ctr"/>
                       <a:endParaRPr lang="zh-CN" altLang="en-US" baseline="0" dirty="0">
                         <a:solidFill>
                           <a:schemeClr val="tx1"/>
@@ -8335,7 +8681,81 @@
                     <a:lstStyle/>
                     <a:p>
                       <a:pPr algn="ctr"/>
+                      <a:r>
+                        <a:rPr lang="en-US" altLang="zh-CN" baseline="0" dirty="0">
+                          <a:solidFill>
+                            <a:schemeClr val="tx1"/>
+                          </a:solidFill>
+                          <a:latin typeface="Times New Roman" panose="02020603050405020304" pitchFamily="18" charset="0"/>
+                          <a:ea typeface="宋体" panose="02010600030101010101" pitchFamily="2" charset="-122"/>
+                        </a:rPr>
+                        <a:t>u</a:t>
+                      </a:r>
                       <a:endParaRPr lang="zh-CN" altLang="en-US" baseline="0" dirty="0">
+                        <a:solidFill>
+                          <a:schemeClr val="tx1"/>
+                        </a:solidFill>
+                        <a:latin typeface="Times New Roman" panose="02020603050405020304" pitchFamily="18" charset="0"/>
+                        <a:ea typeface="宋体" panose="02010600030101010101" pitchFamily="2" charset="-122"/>
+                      </a:endParaRPr>
+                    </a:p>
+                  </a:txBody>
+                  <a:tcPr anchor="ctr">
+                    <a:solidFill>
+                      <a:schemeClr val="accent1">
+                        <a:lumMod val="20000"/>
+                        <a:lumOff val="80000"/>
+                      </a:schemeClr>
+                    </a:solidFill>
+                  </a:tcPr>
+                </a:tc>
+                <a:tc>
+                  <a:txBody>
+                    <a:bodyPr/>
+                    <a:lstStyle/>
+                    <a:p>
+                      <a:pPr algn="ctr"/>
+                      <a:r>
+                        <a:rPr lang="zh-CN" altLang="en-US" baseline="0" dirty="0">
+                          <a:solidFill>
+                            <a:schemeClr val="tx1"/>
+                          </a:solidFill>
+                          <a:latin typeface="Times New Roman" panose="02020603050405020304" pitchFamily="18" charset="0"/>
+                          <a:ea typeface="宋体" panose="02010600030101010101" pitchFamily="2" charset="-122"/>
+                        </a:rPr>
+                        <a:t>√</a:t>
+                      </a:r>
+                    </a:p>
+                  </a:txBody>
+                  <a:tcPr anchor="ctr">
+                    <a:solidFill>
+                      <a:schemeClr val="accent1">
+                        <a:lumMod val="20000"/>
+                        <a:lumOff val="80000"/>
+                      </a:schemeClr>
+                    </a:solidFill>
+                  </a:tcPr>
+                </a:tc>
+                <a:tc>
+                  <a:txBody>
+                    <a:bodyPr/>
+                    <a:lstStyle/>
+                    <a:p>
+                      <a:pPr algn="ctr"/>
+                      <a:r>
+                        <a:rPr lang="en-US" altLang="zh-CN" baseline="0" dirty="0">
+                          <a:solidFill>
+                            <a:schemeClr val="tx1"/>
+                          </a:solidFill>
+                          <a:latin typeface="Times New Roman" panose="02020603050405020304" pitchFamily="18" charset="0"/>
+                          <a:ea typeface="宋体" panose="02010600030101010101" pitchFamily="2" charset="-122"/>
+                        </a:rPr>
+                        <a:t>*</a:t>
+                      </a:r>
+                      <a:endParaRPr lang="zh-CN" altLang="en-US" baseline="0" dirty="0">
+                        <a:solidFill>
+                          <a:schemeClr val="tx1"/>
+                        </a:solidFill>
                         <a:latin typeface="Times New Roman" panose="02020603050405020304" pitchFamily="18" charset="0"/>
                         <a:ea typeface="宋体" panose="02010600030101010101" pitchFamily="2" charset="-122"/>
                       </a:endParaRPr>
@@ -8365,12 +8785,18 @@
                       <a:pPr algn="ctr"/>
                       <a:r>
                         <a:rPr lang="en-US" altLang="zh-CN" baseline="0" dirty="0">
+                          <a:solidFill>
+                            <a:schemeClr val="tx1"/>
+                          </a:solidFill>
                           <a:latin typeface="Times New Roman" panose="02020603050405020304" pitchFamily="18" charset="0"/>
                           <a:ea typeface="宋体" panose="02010600030101010101" pitchFamily="2" charset="-122"/>
                         </a:rPr>
                         <a:t>2</a:t>
                       </a:r>
                       <a:endParaRPr lang="zh-CN" altLang="en-US" baseline="0" dirty="0">
+                        <a:solidFill>
+                          <a:schemeClr val="tx1"/>
+                        </a:solidFill>
                         <a:latin typeface="Times New Roman" panose="02020603050405020304" pitchFamily="18" charset="0"/>
                         <a:ea typeface="宋体" panose="02010600030101010101" pitchFamily="2" charset="-122"/>
                       </a:endParaRPr>
@@ -8391,7 +8817,20 @@
                     <a:lstStyle/>
                     <a:p>
                       <a:pPr algn="ctr"/>
+                      <a:r>
+                        <a:rPr lang="en-US" altLang="zh-CN" baseline="0" dirty="0">
+                          <a:solidFill>
+                            <a:schemeClr val="tx1"/>
+                          </a:solidFill>
+                          <a:latin typeface="Times New Roman" panose="02020603050405020304" pitchFamily="18" charset="0"/>
+                          <a:ea typeface="宋体" panose="02010600030101010101" pitchFamily="2" charset="-122"/>
+                        </a:rPr>
+                        <a:t>v</a:t>
+                      </a:r>
                       <a:endParaRPr lang="zh-CN" altLang="en-US" baseline="0" dirty="0">
+                        <a:solidFill>
+                          <a:schemeClr val="tx1"/>
+                        </a:solidFill>
                         <a:latin typeface="Times New Roman" panose="02020603050405020304" pitchFamily="18" charset="0"/>
                         <a:ea typeface="宋体" panose="02010600030101010101" pitchFamily="2" charset="-122"/>
                       </a:endParaRPr>
@@ -8452,7 +8891,20 @@
                     <a:lstStyle/>
                     <a:p>
                       <a:pPr algn="ctr"/>
+                      <a:r>
+                        <a:rPr lang="en-US" altLang="zh-CN" baseline="0" dirty="0">
+                          <a:solidFill>
+                            <a:schemeClr val="tx1"/>
+                          </a:solidFill>
+                          <a:latin typeface="Times New Roman" panose="02020603050405020304" pitchFamily="18" charset="0"/>
+                          <a:ea typeface="宋体" panose="02010600030101010101" pitchFamily="2" charset="-122"/>
+                        </a:rPr>
+                        <a:t>u+1</a:t>
+                      </a:r>
                       <a:endParaRPr lang="zh-CN" altLang="en-US" baseline="0" dirty="0">
+                        <a:solidFill>
+                          <a:schemeClr val="tx1"/>
+                        </a:solidFill>
                         <a:latin typeface="Times New Roman" panose="02020603050405020304" pitchFamily="18" charset="0"/>
                         <a:ea typeface="宋体" panose="02010600030101010101" pitchFamily="2" charset="-122"/>
                       </a:endParaRPr>
@@ -8482,12 +8934,18 @@
                       <a:pPr algn="ctr"/>
                       <a:r>
                         <a:rPr lang="en-US" altLang="zh-CN" baseline="0" dirty="0">
+                          <a:solidFill>
+                            <a:schemeClr val="tx1"/>
+                          </a:solidFill>
                           <a:latin typeface="Times New Roman" panose="02020603050405020304" pitchFamily="18" charset="0"/>
                           <a:ea typeface="宋体" panose="02010600030101010101" pitchFamily="2" charset="-122"/>
                         </a:rPr>
                         <a:t>3</a:t>
                       </a:r>
                       <a:endParaRPr lang="zh-CN" altLang="en-US" baseline="0" dirty="0">
+                        <a:solidFill>
+                          <a:schemeClr val="tx1"/>
+                        </a:solidFill>
                         <a:latin typeface="Times New Roman" panose="02020603050405020304" pitchFamily="18" charset="0"/>
                         <a:ea typeface="宋体" panose="02010600030101010101" pitchFamily="2" charset="-122"/>
                       </a:endParaRPr>
@@ -8508,7 +8966,20 @@
                     <a:lstStyle/>
                     <a:p>
                       <a:pPr algn="ctr"/>
+                      <a:r>
+                        <a:rPr lang="en-US" altLang="zh-CN" baseline="0" dirty="0">
+                          <a:solidFill>
+                            <a:schemeClr val="tx1"/>
+                          </a:solidFill>
+                          <a:latin typeface="Times New Roman" panose="02020603050405020304" pitchFamily="18" charset="0"/>
+                          <a:ea typeface="宋体" panose="02010600030101010101" pitchFamily="2" charset="-122"/>
+                        </a:rPr>
+                        <a:t>w</a:t>
+                      </a:r>
                       <a:endParaRPr lang="zh-CN" altLang="en-US" baseline="0" dirty="0">
+                        <a:solidFill>
+                          <a:schemeClr val="tx1"/>
+                        </a:solidFill>
                         <a:latin typeface="Times New Roman" panose="02020603050405020304" pitchFamily="18" charset="0"/>
                         <a:ea typeface="宋体" panose="02010600030101010101" pitchFamily="2" charset="-122"/>
                       </a:endParaRPr>
@@ -8545,13 +9016,16 @@
                         <a:tabLst/>
                         <a:defRPr/>
                       </a:pPr>
-                      <a:endParaRPr lang="zh-CN" altLang="en-US" baseline="0" dirty="0">
-                        <a:solidFill>
-                          <a:srgbClr val="00B050"/>
-                        </a:solidFill>
-                        <a:latin typeface="Times New Roman" panose="02020603050405020304" pitchFamily="18" charset="0"/>
-                        <a:ea typeface="宋体" panose="02010600030101010101" pitchFamily="2" charset="-122"/>
-                      </a:endParaRPr>
+                      <a:r>
+                        <a:rPr lang="zh-CN" altLang="en-US" baseline="0" dirty="0">
+                          <a:solidFill>
+                            <a:schemeClr val="tx1"/>
+                          </a:solidFill>
+                          <a:latin typeface="Times New Roman" panose="02020603050405020304" pitchFamily="18" charset="0"/>
+                          <a:ea typeface="宋体" panose="02010600030101010101" pitchFamily="2" charset="-122"/>
+                        </a:rPr>
+                        <a:t>√</a:t>
+                      </a:r>
                     </a:p>
                   </a:txBody>
                   <a:tcPr anchor="ctr">
@@ -8569,7 +9043,20 @@
                     <a:lstStyle/>
                     <a:p>
                       <a:pPr algn="ctr"/>
+                      <a:r>
+                        <a:rPr lang="en-US" altLang="zh-CN" baseline="0" dirty="0">
+                          <a:solidFill>
+                            <a:schemeClr val="tx1"/>
+                          </a:solidFill>
+                          <a:latin typeface="Times New Roman" panose="02020603050405020304" pitchFamily="18" charset="0"/>
+                          <a:ea typeface="宋体" panose="02010600030101010101" pitchFamily="2" charset="-122"/>
+                        </a:rPr>
+                        <a:t>u+1</a:t>
+                      </a:r>
                       <a:endParaRPr lang="zh-CN" altLang="en-US" baseline="0" dirty="0">
+                        <a:solidFill>
+                          <a:schemeClr val="tx1"/>
+                        </a:solidFill>
                         <a:latin typeface="Times New Roman" panose="02020603050405020304" pitchFamily="18" charset="0"/>
                         <a:ea typeface="宋体" panose="02010600030101010101" pitchFamily="2" charset="-122"/>
                       </a:endParaRPr>
@@ -8599,12 +9086,18 @@
                       <a:pPr algn="ctr"/>
                       <a:r>
                         <a:rPr lang="en-US" altLang="zh-CN" baseline="0" dirty="0">
+                          <a:solidFill>
+                            <a:schemeClr val="tx1"/>
+                          </a:solidFill>
                           <a:latin typeface="Times New Roman" panose="02020603050405020304" pitchFamily="18" charset="0"/>
                           <a:ea typeface="宋体" panose="02010600030101010101" pitchFamily="2" charset="-122"/>
                         </a:rPr>
                         <a:t>4</a:t>
                       </a:r>
                       <a:endParaRPr lang="zh-CN" altLang="en-US" baseline="0" dirty="0">
+                        <a:solidFill>
+                          <a:schemeClr val="tx1"/>
+                        </a:solidFill>
                         <a:latin typeface="Times New Roman" panose="02020603050405020304" pitchFamily="18" charset="0"/>
                         <a:ea typeface="宋体" panose="02010600030101010101" pitchFamily="2" charset="-122"/>
                       </a:endParaRPr>
@@ -8625,7 +9118,20 @@
                     <a:lstStyle/>
                     <a:p>
                       <a:pPr algn="ctr"/>
+                      <a:r>
+                        <a:rPr lang="en-US" altLang="zh-CN" baseline="0" dirty="0">
+                          <a:solidFill>
+                            <a:schemeClr val="tx1"/>
+                          </a:solidFill>
+                          <a:latin typeface="Times New Roman" panose="02020603050405020304" pitchFamily="18" charset="0"/>
+                          <a:ea typeface="宋体" panose="02010600030101010101" pitchFamily="2" charset="-122"/>
+                        </a:rPr>
+                        <a:t>u+1</a:t>
+                      </a:r>
                       <a:endParaRPr lang="zh-CN" altLang="en-US" baseline="0" dirty="0">
+                        <a:solidFill>
+                          <a:schemeClr val="tx1"/>
+                        </a:solidFill>
                         <a:latin typeface="Times New Roman" panose="02020603050405020304" pitchFamily="18" charset="0"/>
                         <a:ea typeface="宋体" panose="02010600030101010101" pitchFamily="2" charset="-122"/>
                       </a:endParaRPr>
@@ -8664,7 +9170,7 @@
                       </a:pPr>
                       <a:endParaRPr lang="zh-CN" altLang="en-US" baseline="0" dirty="0">
                         <a:solidFill>
-                          <a:srgbClr val="00B050"/>
+                          <a:schemeClr val="tx1"/>
                         </a:solidFill>
                         <a:latin typeface="Times New Roman" panose="02020603050405020304" pitchFamily="18" charset="0"/>
                         <a:ea typeface="宋体" panose="02010600030101010101" pitchFamily="2" charset="-122"/>
@@ -8686,7 +9192,20 @@
                     <a:lstStyle/>
                     <a:p>
                       <a:pPr algn="ctr"/>
+                      <a:r>
+                        <a:rPr lang="en-US" altLang="zh-CN" baseline="0" dirty="0">
+                          <a:solidFill>
+                            <a:schemeClr val="tx1"/>
+                          </a:solidFill>
+                          <a:latin typeface="Times New Roman" panose="02020603050405020304" pitchFamily="18" charset="0"/>
+                          <a:ea typeface="宋体" panose="02010600030101010101" pitchFamily="2" charset="-122"/>
+                        </a:rPr>
+                        <a:t>w+1</a:t>
+                      </a:r>
                       <a:endParaRPr lang="zh-CN" altLang="en-US" baseline="0" dirty="0">
+                        <a:solidFill>
+                          <a:schemeClr val="tx1"/>
+                        </a:solidFill>
                         <a:latin typeface="Times New Roman" panose="02020603050405020304" pitchFamily="18" charset="0"/>
                         <a:ea typeface="宋体" panose="02010600030101010101" pitchFamily="2" charset="-122"/>
                       </a:endParaRPr>
@@ -8711,6 +9230,377 @@
           </a:graphicData>
         </a:graphic>
       </p:graphicFrame>
+      <p:sp>
+        <p:nvSpPr>
+          <p:cNvPr id="23" name="矩形 22">
+            <a:extLst>
+              <a:ext uri="{FF2B5EF4-FFF2-40B4-BE49-F238E27FC236}">
+                <a16:creationId xmlns:a16="http://schemas.microsoft.com/office/drawing/2014/main" id="{E4BD2BEA-49DF-43A7-B859-4455C91386C8}"/>
+              </a:ext>
+            </a:extLst>
+          </p:cNvPr>
+          <p:cNvSpPr/>
+          <p:nvPr/>
+        </p:nvSpPr>
+        <p:spPr>
+          <a:xfrm>
+            <a:off x="1117707" y="3403345"/>
+            <a:ext cx="1799899" cy="778130"/>
+          </a:xfrm>
+          <a:prstGeom prst="rect">
+            <a:avLst/>
+          </a:prstGeom>
+        </p:spPr>
+        <p:style>
+          <a:lnRef idx="2">
+            <a:schemeClr val="dk1"/>
+          </a:lnRef>
+          <a:fillRef idx="1">
+            <a:schemeClr val="lt1"/>
+          </a:fillRef>
+          <a:effectRef idx="0">
+            <a:schemeClr val="dk1"/>
+          </a:effectRef>
+          <a:fontRef idx="minor">
+            <a:schemeClr val="dk1"/>
+          </a:fontRef>
+        </p:style>
+        <p:txBody>
+          <a:bodyPr rtlCol="0" anchor="ctr"/>
+          <a:lstStyle/>
+          <a:p>
+            <a:pPr algn="ctr"/>
+            <a:r>
+              <a:rPr lang="en-US" altLang="zh-CN" dirty="0">
+                <a:latin typeface="Times New Roman" panose="02020603050405020304" pitchFamily="18" charset="0"/>
+                <a:ea typeface="宋体" panose="02010600030101010101" pitchFamily="2" charset="-122"/>
+              </a:rPr>
+              <a:t>FIN-WAIT-2</a:t>
+            </a:r>
+            <a:endParaRPr lang="zh-CN" altLang="en-US" sz="2000" dirty="0">
+              <a:latin typeface="Times New Roman" panose="02020603050405020304" pitchFamily="18" charset="0"/>
+              <a:ea typeface="宋体" panose="02010600030101010101" pitchFamily="2" charset="-122"/>
+            </a:endParaRPr>
+          </a:p>
+        </p:txBody>
+      </p:sp>
+      <p:sp>
+        <p:nvSpPr>
+          <p:cNvPr id="26" name="矩形 25">
+            <a:extLst>
+              <a:ext uri="{FF2B5EF4-FFF2-40B4-BE49-F238E27FC236}">
+                <a16:creationId xmlns:a16="http://schemas.microsoft.com/office/drawing/2014/main" id="{3E510A0E-9E17-4A2F-B465-A9764769EE40}"/>
+              </a:ext>
+            </a:extLst>
+          </p:cNvPr>
+          <p:cNvSpPr/>
+          <p:nvPr/>
+        </p:nvSpPr>
+        <p:spPr>
+          <a:xfrm>
+            <a:off x="1117708" y="5736750"/>
+            <a:ext cx="1799898" cy="789408"/>
+          </a:xfrm>
+          <a:prstGeom prst="rect">
+            <a:avLst/>
+          </a:prstGeom>
+          <a:solidFill>
+            <a:schemeClr val="bg1">
+              <a:lumMod val="85000"/>
+            </a:schemeClr>
+          </a:solidFill>
+        </p:spPr>
+        <p:style>
+          <a:lnRef idx="2">
+            <a:schemeClr val="dk1"/>
+          </a:lnRef>
+          <a:fillRef idx="1">
+            <a:schemeClr val="lt1"/>
+          </a:fillRef>
+          <a:effectRef idx="0">
+            <a:schemeClr val="dk1"/>
+          </a:effectRef>
+          <a:fontRef idx="minor">
+            <a:schemeClr val="dk1"/>
+          </a:fontRef>
+        </p:style>
+        <p:txBody>
+          <a:bodyPr rtlCol="0" anchor="ctr"/>
+          <a:lstStyle/>
+          <a:p>
+            <a:pPr algn="ctr"/>
+            <a:r>
+              <a:rPr lang="en-US" altLang="zh-CN" dirty="0">
+                <a:latin typeface="Times New Roman" panose="02020603050405020304" pitchFamily="18" charset="0"/>
+                <a:ea typeface="宋体" panose="02010600030101010101" pitchFamily="2" charset="-122"/>
+              </a:rPr>
+              <a:t>CLOSED</a:t>
+            </a:r>
+            <a:endParaRPr lang="zh-CN" altLang="en-US" dirty="0">
+              <a:latin typeface="Times New Roman" panose="02020603050405020304" pitchFamily="18" charset="0"/>
+              <a:ea typeface="宋体" panose="02010600030101010101" pitchFamily="2" charset="-122"/>
+            </a:endParaRPr>
+          </a:p>
+        </p:txBody>
+      </p:sp>
+      <p:sp>
+        <p:nvSpPr>
+          <p:cNvPr id="39" name="左大括号 38">
+            <a:extLst>
+              <a:ext uri="{FF2B5EF4-FFF2-40B4-BE49-F238E27FC236}">
+                <a16:creationId xmlns:a16="http://schemas.microsoft.com/office/drawing/2014/main" id="{CBA81683-6171-46F5-A0BC-AA7229F8790B}"/>
+              </a:ext>
+            </a:extLst>
+          </p:cNvPr>
+          <p:cNvSpPr/>
+          <p:nvPr/>
+        </p:nvSpPr>
+        <p:spPr>
+          <a:xfrm>
+            <a:off x="844835" y="4354415"/>
+            <a:ext cx="93148" cy="1198660"/>
+          </a:xfrm>
+          <a:prstGeom prst="leftBrace">
+            <a:avLst>
+              <a:gd name="adj1" fmla="val 0"/>
+              <a:gd name="adj2" fmla="val 50795"/>
+            </a:avLst>
+          </a:prstGeom>
+          <a:ln w="12700">
+            <a:solidFill>
+              <a:schemeClr val="tx1"/>
+            </a:solidFill>
+            <a:tailEnd type="none" w="lg" len="lg"/>
+          </a:ln>
+        </p:spPr>
+        <p:style>
+          <a:lnRef idx="1">
+            <a:schemeClr val="dk1"/>
+          </a:lnRef>
+          <a:fillRef idx="0">
+            <a:schemeClr val="dk1"/>
+          </a:fillRef>
+          <a:effectRef idx="0">
+            <a:schemeClr val="dk1"/>
+          </a:effectRef>
+          <a:fontRef idx="minor">
+            <a:schemeClr val="tx1"/>
+          </a:fontRef>
+        </p:style>
+        <p:txBody>
+          <a:bodyPr rtlCol="0" anchor="ctr"/>
+          <a:lstStyle/>
+          <a:p>
+            <a:pPr algn="ctr"/>
+            <a:endParaRPr lang="zh-CN" altLang="en-US"/>
+          </a:p>
+        </p:txBody>
+      </p:sp>
+      <p:sp>
+        <p:nvSpPr>
+          <p:cNvPr id="44" name="文本框 43">
+            <a:extLst>
+              <a:ext uri="{FF2B5EF4-FFF2-40B4-BE49-F238E27FC236}">
+                <a16:creationId xmlns:a16="http://schemas.microsoft.com/office/drawing/2014/main" id="{D2A1601F-C48B-4DF2-84F3-78EE43B0D7E4}"/>
+              </a:ext>
+            </a:extLst>
+          </p:cNvPr>
+          <p:cNvSpPr txBox="1"/>
+          <p:nvPr/>
+        </p:nvSpPr>
+        <p:spPr>
+          <a:xfrm>
+            <a:off x="28791" y="4784468"/>
+            <a:ext cx="760144" cy="338554"/>
+          </a:xfrm>
+          <a:prstGeom prst="rect">
+            <a:avLst/>
+          </a:prstGeom>
+          <a:noFill/>
+        </p:spPr>
+        <p:txBody>
+          <a:bodyPr wrap="none" rtlCol="0">
+            <a:spAutoFit/>
+          </a:bodyPr>
+          <a:lstStyle/>
+          <a:p>
+            <a:r>
+              <a:rPr lang="en-US" altLang="zh-CN" sz="1600" dirty="0">
+                <a:latin typeface="Times New Roman" panose="02020603050405020304" pitchFamily="18" charset="0"/>
+                <a:ea typeface="宋体" panose="02010600030101010101" pitchFamily="2" charset="-122"/>
+              </a:rPr>
+              <a:t>2 MSL</a:t>
+            </a:r>
+            <a:endParaRPr lang="zh-CN" altLang="en-US" sz="1600" dirty="0">
+              <a:latin typeface="Times New Roman" panose="02020603050405020304" pitchFamily="18" charset="0"/>
+              <a:ea typeface="宋体" panose="02010600030101010101" pitchFamily="2" charset="-122"/>
+            </a:endParaRPr>
+          </a:p>
+        </p:txBody>
+      </p:sp>
+      <p:sp>
+        <p:nvSpPr>
+          <p:cNvPr id="48" name="文本框 47">
+            <a:extLst>
+              <a:ext uri="{FF2B5EF4-FFF2-40B4-BE49-F238E27FC236}">
+                <a16:creationId xmlns:a16="http://schemas.microsoft.com/office/drawing/2014/main" id="{E1115057-FB2B-48AB-88DB-CB8B4D95A60C}"/>
+              </a:ext>
+            </a:extLst>
+          </p:cNvPr>
+          <p:cNvSpPr txBox="1"/>
+          <p:nvPr/>
+        </p:nvSpPr>
+        <p:spPr>
+          <a:xfrm rot="21060000">
+            <a:off x="3997771" y="3442359"/>
+            <a:ext cx="2380267" cy="369332"/>
+          </a:xfrm>
+          <a:prstGeom prst="rect">
+            <a:avLst/>
+          </a:prstGeom>
+          <a:noFill/>
+        </p:spPr>
+        <p:txBody>
+          <a:bodyPr wrap="none" rtlCol="0">
+            <a:spAutoFit/>
+          </a:bodyPr>
+          <a:lstStyle/>
+          <a:p>
+            <a:r>
+              <a:rPr lang="en-US" altLang="zh-CN" dirty="0">
+                <a:latin typeface="Times New Roman" panose="02020603050405020304" pitchFamily="18" charset="0"/>
+                <a:ea typeface="宋体" panose="02010600030101010101" pitchFamily="2" charset="-122"/>
+              </a:rPr>
+              <a:t>Seq=w, FIN, ACK=u+1</a:t>
+            </a:r>
+            <a:endParaRPr lang="zh-CN" altLang="en-US" dirty="0">
+              <a:latin typeface="Times New Roman" panose="02020603050405020304" pitchFamily="18" charset="0"/>
+              <a:ea typeface="宋体" panose="02010600030101010101" pitchFamily="2" charset="-122"/>
+            </a:endParaRPr>
+          </a:p>
+        </p:txBody>
+      </p:sp>
+      <p:sp>
+        <p:nvSpPr>
+          <p:cNvPr id="52" name="文本框 51">
+            <a:extLst>
+              <a:ext uri="{FF2B5EF4-FFF2-40B4-BE49-F238E27FC236}">
+                <a16:creationId xmlns:a16="http://schemas.microsoft.com/office/drawing/2014/main" id="{4864450E-D497-45BD-970C-0BA4C7D0E19B}"/>
+              </a:ext>
+            </a:extLst>
+          </p:cNvPr>
+          <p:cNvSpPr txBox="1"/>
+          <p:nvPr/>
+        </p:nvSpPr>
+        <p:spPr>
+          <a:xfrm rot="546195">
+            <a:off x="4237745" y="4319142"/>
+            <a:ext cx="2153218" cy="369332"/>
+          </a:xfrm>
+          <a:prstGeom prst="rect">
+            <a:avLst/>
+          </a:prstGeom>
+          <a:noFill/>
+        </p:spPr>
+        <p:txBody>
+          <a:bodyPr wrap="none" rtlCol="0">
+            <a:spAutoFit/>
+          </a:bodyPr>
+          <a:lstStyle/>
+          <a:p>
+            <a:r>
+              <a:rPr lang="en-US" altLang="zh-CN" dirty="0">
+                <a:latin typeface="Times New Roman" panose="02020603050405020304" pitchFamily="18" charset="0"/>
+                <a:ea typeface="宋体" panose="02010600030101010101" pitchFamily="2" charset="-122"/>
+              </a:rPr>
+              <a:t>Seq=u+1, ACK=w+1</a:t>
+            </a:r>
+            <a:endParaRPr lang="zh-CN" altLang="en-US" dirty="0">
+              <a:latin typeface="Times New Roman" panose="02020603050405020304" pitchFamily="18" charset="0"/>
+              <a:ea typeface="宋体" panose="02010600030101010101" pitchFamily="2" charset="-122"/>
+            </a:endParaRPr>
+          </a:p>
+        </p:txBody>
+      </p:sp>
+      <p:cxnSp>
+        <p:nvCxnSpPr>
+          <p:cNvPr id="53" name="直接箭头连接符 52">
+            <a:extLst>
+              <a:ext uri="{FF2B5EF4-FFF2-40B4-BE49-F238E27FC236}">
+                <a16:creationId xmlns:a16="http://schemas.microsoft.com/office/drawing/2014/main" id="{6D0BB349-DE2C-4D3F-B06D-D728F6ED95B9}"/>
+              </a:ext>
+            </a:extLst>
+          </p:cNvPr>
+          <p:cNvCxnSpPr/>
+          <p:nvPr/>
+        </p:nvCxnSpPr>
+        <p:spPr>
+          <a:xfrm>
+            <a:off x="3623023" y="1268600"/>
+            <a:ext cx="3029146" cy="0"/>
+          </a:xfrm>
+          <a:prstGeom prst="straightConnector1">
+            <a:avLst/>
+          </a:prstGeom>
+          <a:ln w="31750">
+            <a:headEnd type="triangle" w="lg" len="lg"/>
+            <a:tailEnd type="triangle" w="lg" len="lg"/>
+          </a:ln>
+        </p:spPr>
+        <p:style>
+          <a:lnRef idx="1">
+            <a:schemeClr val="dk1"/>
+          </a:lnRef>
+          <a:fillRef idx="0">
+            <a:schemeClr val="dk1"/>
+          </a:fillRef>
+          <a:effectRef idx="0">
+            <a:schemeClr val="dk1"/>
+          </a:effectRef>
+          <a:fontRef idx="minor">
+            <a:schemeClr val="tx1"/>
+          </a:fontRef>
+        </p:style>
+      </p:cxnSp>
+      <p:sp>
+        <p:nvSpPr>
+          <p:cNvPr id="55" name="文本框 54">
+            <a:extLst>
+              <a:ext uri="{FF2B5EF4-FFF2-40B4-BE49-F238E27FC236}">
+                <a16:creationId xmlns:a16="http://schemas.microsoft.com/office/drawing/2014/main" id="{CC7203EB-92BB-4729-8464-39008FE6D4FE}"/>
+              </a:ext>
+            </a:extLst>
+          </p:cNvPr>
+          <p:cNvSpPr txBox="1"/>
+          <p:nvPr/>
+        </p:nvSpPr>
+        <p:spPr>
+          <a:xfrm>
+            <a:off x="4532303" y="796637"/>
+            <a:ext cx="1210588" cy="400110"/>
+          </a:xfrm>
+          <a:prstGeom prst="rect">
+            <a:avLst/>
+          </a:prstGeom>
+          <a:noFill/>
+        </p:spPr>
+        <p:txBody>
+          <a:bodyPr wrap="none" rtlCol="0">
+            <a:spAutoFit/>
+          </a:bodyPr>
+          <a:lstStyle/>
+          <a:p>
+            <a:pPr algn="ctr"/>
+            <a:r>
+              <a:rPr lang="zh-CN" altLang="en-US" sz="2000" dirty="0">
+                <a:latin typeface="Times New Roman" panose="02020603050405020304" pitchFamily="18" charset="0"/>
+                <a:ea typeface="宋体" panose="02010600030101010101" pitchFamily="2" charset="-122"/>
+              </a:rPr>
+              <a:t>数据传输</a:t>
+            </a:r>
+          </a:p>
+        </p:txBody>
+      </p:sp>
     </p:spTree>
     <p:extLst>
       <p:ext uri="{BB962C8B-B14F-4D97-AF65-F5344CB8AC3E}">
@@ -8976,6 +9866,36 @@
     </a:fmtScheme>
   </a:themeElements>
   <a:objectDefaults>
+    <a:spDef>
+      <a:spPr>
+        <a:ln w="15875">
+          <a:solidFill>
+            <a:schemeClr val="tx1"/>
+          </a:solidFill>
+          <a:tailEnd type="none" w="lg" len="lg"/>
+        </a:ln>
+      </a:spPr>
+      <a:bodyPr rtlCol="0" anchor="ctr"/>
+      <a:lstStyle>
+        <a:defPPr algn="ctr">
+          <a:defRPr/>
+        </a:defPPr>
+      </a:lstStyle>
+      <a:style>
+        <a:lnRef idx="1">
+          <a:schemeClr val="dk1"/>
+        </a:lnRef>
+        <a:fillRef idx="0">
+          <a:schemeClr val="dk1"/>
+        </a:fillRef>
+        <a:effectRef idx="0">
+          <a:schemeClr val="dk1"/>
+        </a:effectRef>
+        <a:fontRef idx="minor">
+          <a:schemeClr val="tx1"/>
+        </a:fontRef>
+      </a:style>
+    </a:spDef>
     <a:lnDef>
       <a:spPr>
         <a:ln w="25400">

</xml_diff>

<commit_message>
+ Update tcp problem
</commit_message>
<xml_diff>
--- a/后台开发面经_示意图.pptx
+++ b/后台开发面经_示意图.pptx
@@ -199,7 +199,7 @@
           <a:p>
             <a:fld id="{BBE84FB9-738E-406C-B12B-1B1469D7165C}" type="datetimeFigureOut">
               <a:rPr lang="zh-CN" altLang="en-US" smtClean="0"/>
-              <a:t>2021/2/8</a:t>
+              <a:t>2021/2/9</a:t>
             </a:fld>
             <a:endParaRPr lang="zh-CN" altLang="en-US"/>
           </a:p>
@@ -868,7 +868,7 @@
           <a:p>
             <a:fld id="{D997B5FA-0921-464F-AAE1-844C04324D75}" type="datetimeFigureOut">
               <a:rPr lang="zh-CN" altLang="en-US" smtClean="0"/>
-              <a:t>2021/2/8</a:t>
+              <a:t>2021/2/9</a:t>
             </a:fld>
             <a:endParaRPr lang="zh-CN" altLang="en-US"/>
           </a:p>
@@ -1036,7 +1036,7 @@
           <a:p>
             <a:fld id="{D997B5FA-0921-464F-AAE1-844C04324D75}" type="datetimeFigureOut">
               <a:rPr lang="zh-CN" altLang="en-US" smtClean="0"/>
-              <a:t>2021/2/8</a:t>
+              <a:t>2021/2/9</a:t>
             </a:fld>
             <a:endParaRPr lang="zh-CN" altLang="en-US"/>
           </a:p>
@@ -1214,7 +1214,7 @@
           <a:p>
             <a:fld id="{D997B5FA-0921-464F-AAE1-844C04324D75}" type="datetimeFigureOut">
               <a:rPr lang="zh-CN" altLang="en-US" smtClean="0"/>
-              <a:t>2021/2/8</a:t>
+              <a:t>2021/2/9</a:t>
             </a:fld>
             <a:endParaRPr lang="zh-CN" altLang="en-US"/>
           </a:p>
@@ -1382,7 +1382,7 @@
           <a:p>
             <a:fld id="{D997B5FA-0921-464F-AAE1-844C04324D75}" type="datetimeFigureOut">
               <a:rPr lang="zh-CN" altLang="en-US" smtClean="0"/>
-              <a:t>2021/2/8</a:t>
+              <a:t>2021/2/9</a:t>
             </a:fld>
             <a:endParaRPr lang="zh-CN" altLang="en-US"/>
           </a:p>
@@ -1627,7 +1627,7 @@
           <a:p>
             <a:fld id="{D997B5FA-0921-464F-AAE1-844C04324D75}" type="datetimeFigureOut">
               <a:rPr lang="zh-CN" altLang="en-US" smtClean="0"/>
-              <a:t>2021/2/8</a:t>
+              <a:t>2021/2/9</a:t>
             </a:fld>
             <a:endParaRPr lang="zh-CN" altLang="en-US"/>
           </a:p>
@@ -1856,7 +1856,7 @@
           <a:p>
             <a:fld id="{D997B5FA-0921-464F-AAE1-844C04324D75}" type="datetimeFigureOut">
               <a:rPr lang="zh-CN" altLang="en-US" smtClean="0"/>
-              <a:t>2021/2/8</a:t>
+              <a:t>2021/2/9</a:t>
             </a:fld>
             <a:endParaRPr lang="zh-CN" altLang="en-US"/>
           </a:p>
@@ -2220,7 +2220,7 @@
           <a:p>
             <a:fld id="{D997B5FA-0921-464F-AAE1-844C04324D75}" type="datetimeFigureOut">
               <a:rPr lang="zh-CN" altLang="en-US" smtClean="0"/>
-              <a:t>2021/2/8</a:t>
+              <a:t>2021/2/9</a:t>
             </a:fld>
             <a:endParaRPr lang="zh-CN" altLang="en-US"/>
           </a:p>
@@ -2337,7 +2337,7 @@
           <a:p>
             <a:fld id="{D997B5FA-0921-464F-AAE1-844C04324D75}" type="datetimeFigureOut">
               <a:rPr lang="zh-CN" altLang="en-US" smtClean="0"/>
-              <a:t>2021/2/8</a:t>
+              <a:t>2021/2/9</a:t>
             </a:fld>
             <a:endParaRPr lang="zh-CN" altLang="en-US"/>
           </a:p>
@@ -2432,7 +2432,7 @@
           <a:p>
             <a:fld id="{D997B5FA-0921-464F-AAE1-844C04324D75}" type="datetimeFigureOut">
               <a:rPr lang="zh-CN" altLang="en-US" smtClean="0"/>
-              <a:t>2021/2/8</a:t>
+              <a:t>2021/2/9</a:t>
             </a:fld>
             <a:endParaRPr lang="zh-CN" altLang="en-US"/>
           </a:p>
@@ -2707,7 +2707,7 @@
           <a:p>
             <a:fld id="{D997B5FA-0921-464F-AAE1-844C04324D75}" type="datetimeFigureOut">
               <a:rPr lang="zh-CN" altLang="en-US" smtClean="0"/>
-              <a:t>2021/2/8</a:t>
+              <a:t>2021/2/9</a:t>
             </a:fld>
             <a:endParaRPr lang="zh-CN" altLang="en-US"/>
           </a:p>
@@ -2959,7 +2959,7 @@
           <a:p>
             <a:fld id="{D997B5FA-0921-464F-AAE1-844C04324D75}" type="datetimeFigureOut">
               <a:rPr lang="zh-CN" altLang="en-US" smtClean="0"/>
-              <a:t>2021/2/8</a:t>
+              <a:t>2021/2/9</a:t>
             </a:fld>
             <a:endParaRPr lang="zh-CN" altLang="en-US"/>
           </a:p>
@@ -3170,7 +3170,7 @@
           <a:p>
             <a:fld id="{D997B5FA-0921-464F-AAE1-844C04324D75}" type="datetimeFigureOut">
               <a:rPr lang="zh-CN" altLang="en-US" smtClean="0"/>
-              <a:t>2021/2/8</a:t>
+              <a:t>2021/2/9</a:t>
             </a:fld>
             <a:endParaRPr lang="zh-CN" altLang="en-US"/>
           </a:p>
@@ -7968,7 +7968,10 @@
           <a:p>
             <a:pPr algn="ctr"/>
             <a:r>
-              <a:rPr lang="zh-CN" altLang="en-US" sz="2000" dirty="0">
+              <a:rPr lang="zh-CN" altLang="en-US" sz="2000" b="1" dirty="0">
+                <a:solidFill>
+                  <a:srgbClr val="00B0F0"/>
+                </a:solidFill>
                 <a:latin typeface="Times New Roman" panose="02020603050405020304" pitchFamily="18" charset="0"/>
                 <a:ea typeface="宋体" panose="02010600030101010101" pitchFamily="2" charset="-122"/>
               </a:rPr>
@@ -8007,7 +8010,10 @@
           <a:p>
             <a:pPr algn="ctr"/>
             <a:r>
-              <a:rPr lang="zh-CN" altLang="en-US" sz="2000" dirty="0">
+              <a:rPr lang="zh-CN" altLang="en-US" sz="2000" b="1" dirty="0">
+                <a:solidFill>
+                  <a:srgbClr val="00B050"/>
+                </a:solidFill>
                 <a:latin typeface="Times New Roman" panose="02020603050405020304" pitchFamily="18" charset="0"/>
                 <a:ea typeface="宋体" panose="02010600030101010101" pitchFamily="2" charset="-122"/>
               </a:rPr>
@@ -9410,8 +9416,8 @@
         </p:nvSpPr>
         <p:spPr>
           <a:xfrm>
-            <a:off x="28791" y="4784468"/>
-            <a:ext cx="760144" cy="338554"/>
+            <a:off x="9541" y="4784468"/>
+            <a:ext cx="832279" cy="369332"/>
           </a:xfrm>
           <a:prstGeom prst="rect">
             <a:avLst/>
@@ -9425,13 +9431,13 @@
           <a:lstStyle/>
           <a:p>
             <a:r>
-              <a:rPr lang="en-US" altLang="zh-CN" sz="1600" dirty="0">
+              <a:rPr lang="en-US" altLang="zh-CN" dirty="0">
                 <a:latin typeface="Times New Roman" panose="02020603050405020304" pitchFamily="18" charset="0"/>
                 <a:ea typeface="宋体" panose="02010600030101010101" pitchFamily="2" charset="-122"/>
               </a:rPr>
               <a:t>2 MSL</a:t>
             </a:r>
-            <a:endParaRPr lang="zh-CN" altLang="en-US" sz="1600" dirty="0">
+            <a:endParaRPr lang="zh-CN" altLang="en-US" dirty="0">
               <a:latin typeface="Times New Roman" panose="02020603050405020304" pitchFamily="18" charset="0"/>
               <a:ea typeface="宋体" panose="02010600030101010101" pitchFamily="2" charset="-122"/>
             </a:endParaRPr>

</xml_diff>

<commit_message>
+ Add cpp problems
</commit_message>
<xml_diff>
--- a/后台开发面经_示意图.pptx
+++ b/后台开发面经_示意图.pptx
@@ -5,12 +5,14 @@
     <p:sldMasterId id="2147483648" r:id="rId1"/>
   </p:sldMasterIdLst>
   <p:notesMasterIdLst>
-    <p:notesMasterId r:id="rId5"/>
+    <p:notesMasterId r:id="rId7"/>
   </p:notesMasterIdLst>
   <p:sldIdLst>
     <p:sldId id="257" r:id="rId2"/>
     <p:sldId id="258" r:id="rId3"/>
     <p:sldId id="259" r:id="rId4"/>
+    <p:sldId id="260" r:id="rId5"/>
+    <p:sldId id="261" r:id="rId6"/>
   </p:sldIdLst>
   <p:sldSz cx="12192000" cy="6858000"/>
   <p:notesSz cx="6858000" cy="9144000"/>
@@ -199,7 +201,7 @@
           <a:p>
             <a:fld id="{BBE84FB9-738E-406C-B12B-1B1469D7165C}" type="datetimeFigureOut">
               <a:rPr lang="zh-CN" altLang="en-US" smtClean="0"/>
-              <a:t>2021/2/9</a:t>
+              <a:t>2021/3/6</a:t>
             </a:fld>
             <a:endParaRPr lang="zh-CN" altLang="en-US"/>
           </a:p>
@@ -739,6 +741,180 @@
 </p:notes>
 </file>
 
+<file path=ppt/notesSlides/notesSlide4.xml><?xml version="1.0" encoding="utf-8"?>
+<p:notes xmlns:a="http://schemas.openxmlformats.org/drawingml/2006/main" xmlns:r="http://schemas.openxmlformats.org/officeDocument/2006/relationships" xmlns:p="http://schemas.openxmlformats.org/presentationml/2006/main">
+  <p:cSld>
+    <p:spTree>
+      <p:nvGrpSpPr>
+        <p:cNvPr id="1" name=""/>
+        <p:cNvGrpSpPr/>
+        <p:nvPr/>
+      </p:nvGrpSpPr>
+      <p:grpSpPr>
+        <a:xfrm>
+          <a:off x="0" y="0"/>
+          <a:ext cx="0" cy="0"/>
+          <a:chOff x="0" y="0"/>
+          <a:chExt cx="0" cy="0"/>
+        </a:xfrm>
+      </p:grpSpPr>
+      <p:sp>
+        <p:nvSpPr>
+          <p:cNvPr id="2" name="幻灯片图像占位符 1"/>
+          <p:cNvSpPr>
+            <a:spLocks noGrp="1" noRot="1" noChangeAspect="1"/>
+          </p:cNvSpPr>
+          <p:nvPr>
+            <p:ph type="sldImg"/>
+          </p:nvPr>
+        </p:nvSpPr>
+        <p:spPr/>
+      </p:sp>
+      <p:sp>
+        <p:nvSpPr>
+          <p:cNvPr id="3" name="备注占位符 2"/>
+          <p:cNvSpPr>
+            <a:spLocks noGrp="1"/>
+          </p:cNvSpPr>
+          <p:nvPr>
+            <p:ph type="body" idx="1"/>
+          </p:nvPr>
+        </p:nvSpPr>
+        <p:spPr/>
+        <p:txBody>
+          <a:bodyPr/>
+          <a:lstStyle/>
+          <a:p>
+            <a:r>
+              <a:rPr lang="zh-CN" altLang="en-US" dirty="0"/>
+              <a:t>红黑树 左旋</a:t>
+            </a:r>
+          </a:p>
+        </p:txBody>
+      </p:sp>
+      <p:sp>
+        <p:nvSpPr>
+          <p:cNvPr id="4" name="灯片编号占位符 3"/>
+          <p:cNvSpPr>
+            <a:spLocks noGrp="1"/>
+          </p:cNvSpPr>
+          <p:nvPr>
+            <p:ph type="sldNum" sz="quarter" idx="5"/>
+          </p:nvPr>
+        </p:nvSpPr>
+        <p:spPr/>
+        <p:txBody>
+          <a:bodyPr/>
+          <a:lstStyle/>
+          <a:p>
+            <a:fld id="{3A352CEF-0789-4229-9EE3-2FF61603D4BF}" type="slidenum">
+              <a:rPr lang="zh-CN" altLang="en-US" smtClean="0"/>
+              <a:t>4</a:t>
+            </a:fld>
+            <a:endParaRPr lang="zh-CN" altLang="en-US"/>
+          </a:p>
+        </p:txBody>
+      </p:sp>
+    </p:spTree>
+    <p:extLst>
+      <p:ext uri="{BB962C8B-B14F-4D97-AF65-F5344CB8AC3E}">
+        <p14:creationId xmlns:p14="http://schemas.microsoft.com/office/powerpoint/2010/main" val="701616515"/>
+      </p:ext>
+    </p:extLst>
+  </p:cSld>
+  <p:clrMapOvr>
+    <a:masterClrMapping/>
+  </p:clrMapOvr>
+</p:notes>
+</file>
+
+<file path=ppt/notesSlides/notesSlide5.xml><?xml version="1.0" encoding="utf-8"?>
+<p:notes xmlns:a="http://schemas.openxmlformats.org/drawingml/2006/main" xmlns:r="http://schemas.openxmlformats.org/officeDocument/2006/relationships" xmlns:p="http://schemas.openxmlformats.org/presentationml/2006/main">
+  <p:cSld>
+    <p:spTree>
+      <p:nvGrpSpPr>
+        <p:cNvPr id="1" name=""/>
+        <p:cNvGrpSpPr/>
+        <p:nvPr/>
+      </p:nvGrpSpPr>
+      <p:grpSpPr>
+        <a:xfrm>
+          <a:off x="0" y="0"/>
+          <a:ext cx="0" cy="0"/>
+          <a:chOff x="0" y="0"/>
+          <a:chExt cx="0" cy="0"/>
+        </a:xfrm>
+      </p:grpSpPr>
+      <p:sp>
+        <p:nvSpPr>
+          <p:cNvPr id="2" name="幻灯片图像占位符 1"/>
+          <p:cNvSpPr>
+            <a:spLocks noGrp="1" noRot="1" noChangeAspect="1"/>
+          </p:cNvSpPr>
+          <p:nvPr>
+            <p:ph type="sldImg"/>
+          </p:nvPr>
+        </p:nvSpPr>
+        <p:spPr/>
+      </p:sp>
+      <p:sp>
+        <p:nvSpPr>
+          <p:cNvPr id="3" name="备注占位符 2"/>
+          <p:cNvSpPr>
+            <a:spLocks noGrp="1"/>
+          </p:cNvSpPr>
+          <p:nvPr>
+            <p:ph type="body" idx="1"/>
+          </p:nvPr>
+        </p:nvSpPr>
+        <p:spPr/>
+        <p:txBody>
+          <a:bodyPr/>
+          <a:lstStyle/>
+          <a:p>
+            <a:r>
+              <a:rPr lang="zh-CN" altLang="en-US" dirty="0"/>
+              <a:t>红黑树 右旋</a:t>
+            </a:r>
+          </a:p>
+        </p:txBody>
+      </p:sp>
+      <p:sp>
+        <p:nvSpPr>
+          <p:cNvPr id="4" name="灯片编号占位符 3"/>
+          <p:cNvSpPr>
+            <a:spLocks noGrp="1"/>
+          </p:cNvSpPr>
+          <p:nvPr>
+            <p:ph type="sldNum" sz="quarter" idx="5"/>
+          </p:nvPr>
+        </p:nvSpPr>
+        <p:spPr/>
+        <p:txBody>
+          <a:bodyPr/>
+          <a:lstStyle/>
+          <a:p>
+            <a:fld id="{3A352CEF-0789-4229-9EE3-2FF61603D4BF}" type="slidenum">
+              <a:rPr lang="zh-CN" altLang="en-US" smtClean="0"/>
+              <a:t>5</a:t>
+            </a:fld>
+            <a:endParaRPr lang="zh-CN" altLang="en-US"/>
+          </a:p>
+        </p:txBody>
+      </p:sp>
+    </p:spTree>
+    <p:extLst>
+      <p:ext uri="{BB962C8B-B14F-4D97-AF65-F5344CB8AC3E}">
+        <p14:creationId xmlns:p14="http://schemas.microsoft.com/office/powerpoint/2010/main" val="921620957"/>
+      </p:ext>
+    </p:extLst>
+  </p:cSld>
+  <p:clrMapOvr>
+    <a:masterClrMapping/>
+  </p:clrMapOvr>
+</p:notes>
+</file>
+
 <file path=ppt/slideLayouts/slideLayout1.xml><?xml version="1.0" encoding="utf-8"?>
 <p:sldLayout xmlns:a="http://schemas.openxmlformats.org/drawingml/2006/main" xmlns:r="http://schemas.openxmlformats.org/officeDocument/2006/relationships" xmlns:p="http://schemas.openxmlformats.org/presentationml/2006/main" type="title" preserve="1">
   <p:cSld name="标题幻灯片">
@@ -868,7 +1044,7 @@
           <a:p>
             <a:fld id="{D997B5FA-0921-464F-AAE1-844C04324D75}" type="datetimeFigureOut">
               <a:rPr lang="zh-CN" altLang="en-US" smtClean="0"/>
-              <a:t>2021/2/9</a:t>
+              <a:t>2021/3/6</a:t>
             </a:fld>
             <a:endParaRPr lang="zh-CN" altLang="en-US"/>
           </a:p>
@@ -1036,7 +1212,7 @@
           <a:p>
             <a:fld id="{D997B5FA-0921-464F-AAE1-844C04324D75}" type="datetimeFigureOut">
               <a:rPr lang="zh-CN" altLang="en-US" smtClean="0"/>
-              <a:t>2021/2/9</a:t>
+              <a:t>2021/3/6</a:t>
             </a:fld>
             <a:endParaRPr lang="zh-CN" altLang="en-US"/>
           </a:p>
@@ -1214,7 +1390,7 @@
           <a:p>
             <a:fld id="{D997B5FA-0921-464F-AAE1-844C04324D75}" type="datetimeFigureOut">
               <a:rPr lang="zh-CN" altLang="en-US" smtClean="0"/>
-              <a:t>2021/2/9</a:t>
+              <a:t>2021/3/6</a:t>
             </a:fld>
             <a:endParaRPr lang="zh-CN" altLang="en-US"/>
           </a:p>
@@ -1382,7 +1558,7 @@
           <a:p>
             <a:fld id="{D997B5FA-0921-464F-AAE1-844C04324D75}" type="datetimeFigureOut">
               <a:rPr lang="zh-CN" altLang="en-US" smtClean="0"/>
-              <a:t>2021/2/9</a:t>
+              <a:t>2021/3/6</a:t>
             </a:fld>
             <a:endParaRPr lang="zh-CN" altLang="en-US"/>
           </a:p>
@@ -1627,7 +1803,7 @@
           <a:p>
             <a:fld id="{D997B5FA-0921-464F-AAE1-844C04324D75}" type="datetimeFigureOut">
               <a:rPr lang="zh-CN" altLang="en-US" smtClean="0"/>
-              <a:t>2021/2/9</a:t>
+              <a:t>2021/3/6</a:t>
             </a:fld>
             <a:endParaRPr lang="zh-CN" altLang="en-US"/>
           </a:p>
@@ -1856,7 +2032,7 @@
           <a:p>
             <a:fld id="{D997B5FA-0921-464F-AAE1-844C04324D75}" type="datetimeFigureOut">
               <a:rPr lang="zh-CN" altLang="en-US" smtClean="0"/>
-              <a:t>2021/2/9</a:t>
+              <a:t>2021/3/6</a:t>
             </a:fld>
             <a:endParaRPr lang="zh-CN" altLang="en-US"/>
           </a:p>
@@ -2220,7 +2396,7 @@
           <a:p>
             <a:fld id="{D997B5FA-0921-464F-AAE1-844C04324D75}" type="datetimeFigureOut">
               <a:rPr lang="zh-CN" altLang="en-US" smtClean="0"/>
-              <a:t>2021/2/9</a:t>
+              <a:t>2021/3/6</a:t>
             </a:fld>
             <a:endParaRPr lang="zh-CN" altLang="en-US"/>
           </a:p>
@@ -2337,7 +2513,7 @@
           <a:p>
             <a:fld id="{D997B5FA-0921-464F-AAE1-844C04324D75}" type="datetimeFigureOut">
               <a:rPr lang="zh-CN" altLang="en-US" smtClean="0"/>
-              <a:t>2021/2/9</a:t>
+              <a:t>2021/3/6</a:t>
             </a:fld>
             <a:endParaRPr lang="zh-CN" altLang="en-US"/>
           </a:p>
@@ -2432,7 +2608,7 @@
           <a:p>
             <a:fld id="{D997B5FA-0921-464F-AAE1-844C04324D75}" type="datetimeFigureOut">
               <a:rPr lang="zh-CN" altLang="en-US" smtClean="0"/>
-              <a:t>2021/2/9</a:t>
+              <a:t>2021/3/6</a:t>
             </a:fld>
             <a:endParaRPr lang="zh-CN" altLang="en-US"/>
           </a:p>
@@ -2707,7 +2883,7 @@
           <a:p>
             <a:fld id="{D997B5FA-0921-464F-AAE1-844C04324D75}" type="datetimeFigureOut">
               <a:rPr lang="zh-CN" altLang="en-US" smtClean="0"/>
-              <a:t>2021/2/9</a:t>
+              <a:t>2021/3/6</a:t>
             </a:fld>
             <a:endParaRPr lang="zh-CN" altLang="en-US"/>
           </a:p>
@@ -2959,7 +3135,7 @@
           <a:p>
             <a:fld id="{D997B5FA-0921-464F-AAE1-844C04324D75}" type="datetimeFigureOut">
               <a:rPr lang="zh-CN" altLang="en-US" smtClean="0"/>
-              <a:t>2021/2/9</a:t>
+              <a:t>2021/3/6</a:t>
             </a:fld>
             <a:endParaRPr lang="zh-CN" altLang="en-US"/>
           </a:p>
@@ -3170,7 +3346,7 @@
           <a:p>
             <a:fld id="{D997B5FA-0921-464F-AAE1-844C04324D75}" type="datetimeFigureOut">
               <a:rPr lang="zh-CN" altLang="en-US" smtClean="0"/>
-              <a:t>2021/2/9</a:t>
+              <a:t>2021/3/6</a:t>
             </a:fld>
             <a:endParaRPr lang="zh-CN" altLang="en-US"/>
           </a:p>
@@ -9620,6 +9796,2900 @@
 </p:sld>
 </file>
 
+<file path=ppt/slides/slide4.xml><?xml version="1.0" encoding="utf-8"?>
+<p:sld xmlns:a="http://schemas.openxmlformats.org/drawingml/2006/main" xmlns:r="http://schemas.openxmlformats.org/officeDocument/2006/relationships" xmlns:p="http://schemas.openxmlformats.org/presentationml/2006/main">
+  <p:cSld>
+    <p:spTree>
+      <p:nvGrpSpPr>
+        <p:cNvPr id="1" name=""/>
+        <p:cNvGrpSpPr/>
+        <p:nvPr/>
+      </p:nvGrpSpPr>
+      <p:grpSpPr>
+        <a:xfrm>
+          <a:off x="0" y="0"/>
+          <a:ext cx="0" cy="0"/>
+          <a:chOff x="0" y="0"/>
+          <a:chExt cx="0" cy="0"/>
+        </a:xfrm>
+      </p:grpSpPr>
+      <p:sp>
+        <p:nvSpPr>
+          <p:cNvPr id="14" name="椭圆 13">
+            <a:extLst>
+              <a:ext uri="{FF2B5EF4-FFF2-40B4-BE49-F238E27FC236}">
+                <a16:creationId xmlns:a16="http://schemas.microsoft.com/office/drawing/2014/main" id="{1F918712-E2DD-4D8F-B324-DFED645440BF}"/>
+              </a:ext>
+            </a:extLst>
+          </p:cNvPr>
+          <p:cNvSpPr/>
+          <p:nvPr/>
+        </p:nvSpPr>
+        <p:spPr>
+          <a:xfrm>
+            <a:off x="1556658" y="2999328"/>
+            <a:ext cx="657546" cy="657546"/>
+          </a:xfrm>
+          <a:prstGeom prst="ellipse">
+            <a:avLst/>
+          </a:prstGeom>
+          <a:noFill/>
+        </p:spPr>
+        <p:style>
+          <a:lnRef idx="2">
+            <a:schemeClr val="dk1"/>
+          </a:lnRef>
+          <a:fillRef idx="1">
+            <a:schemeClr val="lt1"/>
+          </a:fillRef>
+          <a:effectRef idx="0">
+            <a:schemeClr val="dk1"/>
+          </a:effectRef>
+          <a:fontRef idx="minor">
+            <a:schemeClr val="dk1"/>
+          </a:fontRef>
+        </p:style>
+        <p:txBody>
+          <a:bodyPr rtlCol="0" anchor="ctr"/>
+          <a:lstStyle/>
+          <a:p>
+            <a:pPr algn="ctr"/>
+            <a:r>
+              <a:rPr lang="en-US" altLang="zh-CN" dirty="0">
+                <a:latin typeface="Times New Roman" panose="02020603050405020304" pitchFamily="18" charset="0"/>
+                <a:cs typeface="Times New Roman" panose="02020603050405020304" pitchFamily="18" charset="0"/>
+              </a:rPr>
+              <a:t>B</a:t>
+            </a:r>
+            <a:endParaRPr lang="zh-CN" altLang="en-US" dirty="0">
+              <a:latin typeface="Times New Roman" panose="02020603050405020304" pitchFamily="18" charset="0"/>
+              <a:cs typeface="Times New Roman" panose="02020603050405020304" pitchFamily="18" charset="0"/>
+            </a:endParaRPr>
+          </a:p>
+        </p:txBody>
+      </p:sp>
+      <p:sp>
+        <p:nvSpPr>
+          <p:cNvPr id="15" name="椭圆 14">
+            <a:extLst>
+              <a:ext uri="{FF2B5EF4-FFF2-40B4-BE49-F238E27FC236}">
+                <a16:creationId xmlns:a16="http://schemas.microsoft.com/office/drawing/2014/main" id="{38F398B1-749B-46AB-BA55-48713B285A3A}"/>
+              </a:ext>
+            </a:extLst>
+          </p:cNvPr>
+          <p:cNvSpPr/>
+          <p:nvPr/>
+        </p:nvSpPr>
+        <p:spPr>
+          <a:xfrm>
+            <a:off x="3348585" y="3011424"/>
+            <a:ext cx="657546" cy="657546"/>
+          </a:xfrm>
+          <a:prstGeom prst="ellipse">
+            <a:avLst/>
+          </a:prstGeom>
+          <a:solidFill>
+            <a:srgbClr val="FFC000"/>
+          </a:solidFill>
+        </p:spPr>
+        <p:style>
+          <a:lnRef idx="2">
+            <a:schemeClr val="dk1"/>
+          </a:lnRef>
+          <a:fillRef idx="1">
+            <a:schemeClr val="lt1"/>
+          </a:fillRef>
+          <a:effectRef idx="0">
+            <a:schemeClr val="dk1"/>
+          </a:effectRef>
+          <a:fontRef idx="minor">
+            <a:schemeClr val="dk1"/>
+          </a:fontRef>
+        </p:style>
+        <p:txBody>
+          <a:bodyPr rtlCol="0" anchor="ctr"/>
+          <a:lstStyle/>
+          <a:p>
+            <a:pPr algn="ctr"/>
+            <a:r>
+              <a:rPr lang="en-US" altLang="zh-CN" dirty="0">
+                <a:latin typeface="Times New Roman" panose="02020603050405020304" pitchFamily="18" charset="0"/>
+                <a:cs typeface="Times New Roman" panose="02020603050405020304" pitchFamily="18" charset="0"/>
+              </a:rPr>
+              <a:t>C</a:t>
+            </a:r>
+            <a:endParaRPr lang="zh-CN" altLang="en-US" dirty="0">
+              <a:latin typeface="Times New Roman" panose="02020603050405020304" pitchFamily="18" charset="0"/>
+              <a:cs typeface="Times New Roman" panose="02020603050405020304" pitchFamily="18" charset="0"/>
+            </a:endParaRPr>
+          </a:p>
+        </p:txBody>
+      </p:sp>
+      <p:sp>
+        <p:nvSpPr>
+          <p:cNvPr id="16" name="椭圆 15">
+            <a:extLst>
+              <a:ext uri="{FF2B5EF4-FFF2-40B4-BE49-F238E27FC236}">
+                <a16:creationId xmlns:a16="http://schemas.microsoft.com/office/drawing/2014/main" id="{34C772CF-FB41-4F35-80F4-107AA1C6B18C}"/>
+              </a:ext>
+            </a:extLst>
+          </p:cNvPr>
+          <p:cNvSpPr/>
+          <p:nvPr/>
+        </p:nvSpPr>
+        <p:spPr>
+          <a:xfrm>
+            <a:off x="2421490" y="2025863"/>
+            <a:ext cx="657546" cy="657546"/>
+          </a:xfrm>
+          <a:prstGeom prst="ellipse">
+            <a:avLst/>
+          </a:prstGeom>
+          <a:solidFill>
+            <a:srgbClr val="00B0F0"/>
+          </a:solidFill>
+          <a:ln w="38100"/>
+        </p:spPr>
+        <p:style>
+          <a:lnRef idx="2">
+            <a:schemeClr val="dk1"/>
+          </a:lnRef>
+          <a:fillRef idx="1">
+            <a:schemeClr val="lt1"/>
+          </a:fillRef>
+          <a:effectRef idx="0">
+            <a:schemeClr val="dk1"/>
+          </a:effectRef>
+          <a:fontRef idx="minor">
+            <a:schemeClr val="dk1"/>
+          </a:fontRef>
+        </p:style>
+        <p:txBody>
+          <a:bodyPr rtlCol="0" anchor="ctr"/>
+          <a:lstStyle/>
+          <a:p>
+            <a:pPr algn="ctr"/>
+            <a:r>
+              <a:rPr lang="en-US" altLang="zh-CN" dirty="0">
+                <a:latin typeface="Times New Roman" panose="02020603050405020304" pitchFamily="18" charset="0"/>
+                <a:cs typeface="Times New Roman" panose="02020603050405020304" pitchFamily="18" charset="0"/>
+              </a:rPr>
+              <a:t>A</a:t>
+            </a:r>
+            <a:endParaRPr lang="zh-CN" altLang="en-US" dirty="0">
+              <a:latin typeface="Times New Roman" panose="02020603050405020304" pitchFamily="18" charset="0"/>
+              <a:cs typeface="Times New Roman" panose="02020603050405020304" pitchFamily="18" charset="0"/>
+            </a:endParaRPr>
+          </a:p>
+        </p:txBody>
+      </p:sp>
+      <p:sp>
+        <p:nvSpPr>
+          <p:cNvPr id="17" name="椭圆 16">
+            <a:extLst>
+              <a:ext uri="{FF2B5EF4-FFF2-40B4-BE49-F238E27FC236}">
+                <a16:creationId xmlns:a16="http://schemas.microsoft.com/office/drawing/2014/main" id="{1D451306-090A-4D9D-B80A-4453A148A63A}"/>
+              </a:ext>
+            </a:extLst>
+          </p:cNvPr>
+          <p:cNvSpPr/>
+          <p:nvPr/>
+        </p:nvSpPr>
+        <p:spPr>
+          <a:xfrm>
+            <a:off x="2556264" y="4050287"/>
+            <a:ext cx="657546" cy="657546"/>
+          </a:xfrm>
+          <a:prstGeom prst="ellipse">
+            <a:avLst/>
+          </a:prstGeom>
+          <a:solidFill>
+            <a:schemeClr val="accent6">
+              <a:lumMod val="40000"/>
+              <a:lumOff val="60000"/>
+            </a:schemeClr>
+          </a:solidFill>
+        </p:spPr>
+        <p:style>
+          <a:lnRef idx="2">
+            <a:schemeClr val="dk1"/>
+          </a:lnRef>
+          <a:fillRef idx="1">
+            <a:schemeClr val="lt1"/>
+          </a:fillRef>
+          <a:effectRef idx="0">
+            <a:schemeClr val="dk1"/>
+          </a:effectRef>
+          <a:fontRef idx="minor">
+            <a:schemeClr val="dk1"/>
+          </a:fontRef>
+        </p:style>
+        <p:txBody>
+          <a:bodyPr rtlCol="0" anchor="ctr"/>
+          <a:lstStyle/>
+          <a:p>
+            <a:pPr algn="ctr"/>
+            <a:r>
+              <a:rPr lang="en-US" altLang="zh-CN" dirty="0">
+                <a:latin typeface="Times New Roman" panose="02020603050405020304" pitchFamily="18" charset="0"/>
+                <a:cs typeface="Times New Roman" panose="02020603050405020304" pitchFamily="18" charset="0"/>
+              </a:rPr>
+              <a:t>D</a:t>
+            </a:r>
+            <a:endParaRPr lang="zh-CN" altLang="en-US" dirty="0">
+              <a:latin typeface="Times New Roman" panose="02020603050405020304" pitchFamily="18" charset="0"/>
+              <a:cs typeface="Times New Roman" panose="02020603050405020304" pitchFamily="18" charset="0"/>
+            </a:endParaRPr>
+          </a:p>
+        </p:txBody>
+      </p:sp>
+      <p:cxnSp>
+        <p:nvCxnSpPr>
+          <p:cNvPr id="18" name="直接连接符 17">
+            <a:extLst>
+              <a:ext uri="{FF2B5EF4-FFF2-40B4-BE49-F238E27FC236}">
+                <a16:creationId xmlns:a16="http://schemas.microsoft.com/office/drawing/2014/main" id="{5613F276-D737-4B72-97F8-5D12338DE56A}"/>
+              </a:ext>
+            </a:extLst>
+          </p:cNvPr>
+          <p:cNvCxnSpPr>
+            <a:cxnSpLocks/>
+            <a:stCxn id="16" idx="3"/>
+            <a:endCxn id="14" idx="7"/>
+          </p:cNvCxnSpPr>
+          <p:nvPr/>
+        </p:nvCxnSpPr>
+        <p:spPr>
+          <a:xfrm flipH="1">
+            <a:off x="2117909" y="2587114"/>
+            <a:ext cx="399876" cy="508509"/>
+          </a:xfrm>
+          <a:prstGeom prst="line">
+            <a:avLst/>
+          </a:prstGeom>
+          <a:ln w="19050">
+            <a:tailEnd type="none"/>
+          </a:ln>
+        </p:spPr>
+        <p:style>
+          <a:lnRef idx="1">
+            <a:schemeClr val="dk1"/>
+          </a:lnRef>
+          <a:fillRef idx="0">
+            <a:schemeClr val="dk1"/>
+          </a:fillRef>
+          <a:effectRef idx="0">
+            <a:schemeClr val="dk1"/>
+          </a:effectRef>
+          <a:fontRef idx="minor">
+            <a:schemeClr val="tx1"/>
+          </a:fontRef>
+        </p:style>
+      </p:cxnSp>
+      <p:cxnSp>
+        <p:nvCxnSpPr>
+          <p:cNvPr id="19" name="直接连接符 18">
+            <a:extLst>
+              <a:ext uri="{FF2B5EF4-FFF2-40B4-BE49-F238E27FC236}">
+                <a16:creationId xmlns:a16="http://schemas.microsoft.com/office/drawing/2014/main" id="{345C6729-EEA6-48D8-B6D0-79DFA9BB99FA}"/>
+              </a:ext>
+            </a:extLst>
+          </p:cNvPr>
+          <p:cNvCxnSpPr>
+            <a:cxnSpLocks/>
+            <a:stCxn id="16" idx="5"/>
+            <a:endCxn id="15" idx="1"/>
+          </p:cNvCxnSpPr>
+          <p:nvPr/>
+        </p:nvCxnSpPr>
+        <p:spPr>
+          <a:xfrm>
+            <a:off x="2982741" y="2587114"/>
+            <a:ext cx="462139" cy="520605"/>
+          </a:xfrm>
+          <a:prstGeom prst="line">
+            <a:avLst/>
+          </a:prstGeom>
+          <a:ln w="19050">
+            <a:solidFill>
+              <a:srgbClr val="00B0F0"/>
+            </a:solidFill>
+            <a:prstDash val="dash"/>
+            <a:tailEnd type="none"/>
+          </a:ln>
+        </p:spPr>
+        <p:style>
+          <a:lnRef idx="1">
+            <a:schemeClr val="dk1"/>
+          </a:lnRef>
+          <a:fillRef idx="0">
+            <a:schemeClr val="dk1"/>
+          </a:fillRef>
+          <a:effectRef idx="0">
+            <a:schemeClr val="dk1"/>
+          </a:effectRef>
+          <a:fontRef idx="minor">
+            <a:schemeClr val="tx1"/>
+          </a:fontRef>
+        </p:style>
+      </p:cxnSp>
+      <p:cxnSp>
+        <p:nvCxnSpPr>
+          <p:cNvPr id="20" name="直接连接符 19">
+            <a:extLst>
+              <a:ext uri="{FF2B5EF4-FFF2-40B4-BE49-F238E27FC236}">
+                <a16:creationId xmlns:a16="http://schemas.microsoft.com/office/drawing/2014/main" id="{BC3C15AF-20DF-4B4A-A5A5-8CEB8D44208C}"/>
+              </a:ext>
+            </a:extLst>
+          </p:cNvPr>
+          <p:cNvCxnSpPr>
+            <a:cxnSpLocks/>
+            <a:stCxn id="15" idx="3"/>
+            <a:endCxn id="17" idx="7"/>
+          </p:cNvCxnSpPr>
+          <p:nvPr/>
+        </p:nvCxnSpPr>
+        <p:spPr>
+          <a:xfrm flipH="1">
+            <a:off x="3117515" y="3572675"/>
+            <a:ext cx="327365" cy="573907"/>
+          </a:xfrm>
+          <a:prstGeom prst="line">
+            <a:avLst/>
+          </a:prstGeom>
+          <a:ln w="19050">
+            <a:solidFill>
+              <a:schemeClr val="accent4"/>
+            </a:solidFill>
+            <a:prstDash val="dash"/>
+            <a:tailEnd type="none"/>
+          </a:ln>
+        </p:spPr>
+        <p:style>
+          <a:lnRef idx="1">
+            <a:schemeClr val="dk1"/>
+          </a:lnRef>
+          <a:fillRef idx="0">
+            <a:schemeClr val="dk1"/>
+          </a:fillRef>
+          <a:effectRef idx="0">
+            <a:schemeClr val="dk1"/>
+          </a:effectRef>
+          <a:fontRef idx="minor">
+            <a:schemeClr val="tx1"/>
+          </a:fontRef>
+        </p:style>
+      </p:cxnSp>
+      <p:sp>
+        <p:nvSpPr>
+          <p:cNvPr id="21" name="椭圆 20">
+            <a:extLst>
+              <a:ext uri="{FF2B5EF4-FFF2-40B4-BE49-F238E27FC236}">
+                <a16:creationId xmlns:a16="http://schemas.microsoft.com/office/drawing/2014/main" id="{84794A7B-F250-41A0-B4F2-13DFA5CB3AF2}"/>
+              </a:ext>
+            </a:extLst>
+          </p:cNvPr>
+          <p:cNvSpPr/>
+          <p:nvPr/>
+        </p:nvSpPr>
+        <p:spPr>
+          <a:xfrm>
+            <a:off x="3348585" y="1052398"/>
+            <a:ext cx="657546" cy="657546"/>
+          </a:xfrm>
+          <a:prstGeom prst="ellipse">
+            <a:avLst/>
+          </a:prstGeom>
+          <a:noFill/>
+        </p:spPr>
+        <p:style>
+          <a:lnRef idx="2">
+            <a:schemeClr val="dk1"/>
+          </a:lnRef>
+          <a:fillRef idx="1">
+            <a:schemeClr val="lt1"/>
+          </a:fillRef>
+          <a:effectRef idx="0">
+            <a:schemeClr val="dk1"/>
+          </a:effectRef>
+          <a:fontRef idx="minor">
+            <a:schemeClr val="dk1"/>
+          </a:fontRef>
+        </p:style>
+        <p:txBody>
+          <a:bodyPr rtlCol="0" anchor="ctr"/>
+          <a:lstStyle/>
+          <a:p>
+            <a:pPr algn="ctr"/>
+            <a:endParaRPr lang="zh-CN" altLang="en-US" dirty="0">
+              <a:latin typeface="Times New Roman" panose="02020603050405020304" pitchFamily="18" charset="0"/>
+              <a:cs typeface="Times New Roman" panose="02020603050405020304" pitchFamily="18" charset="0"/>
+            </a:endParaRPr>
+          </a:p>
+        </p:txBody>
+      </p:sp>
+      <p:cxnSp>
+        <p:nvCxnSpPr>
+          <p:cNvPr id="22" name="直接连接符 21">
+            <a:extLst>
+              <a:ext uri="{FF2B5EF4-FFF2-40B4-BE49-F238E27FC236}">
+                <a16:creationId xmlns:a16="http://schemas.microsoft.com/office/drawing/2014/main" id="{DA6A89A5-3970-4F75-816D-137AAA762AD1}"/>
+              </a:ext>
+            </a:extLst>
+          </p:cNvPr>
+          <p:cNvCxnSpPr>
+            <a:cxnSpLocks/>
+            <a:stCxn id="21" idx="3"/>
+            <a:endCxn id="16" idx="7"/>
+          </p:cNvCxnSpPr>
+          <p:nvPr/>
+        </p:nvCxnSpPr>
+        <p:spPr>
+          <a:xfrm flipH="1">
+            <a:off x="2982741" y="1613649"/>
+            <a:ext cx="462139" cy="508509"/>
+          </a:xfrm>
+          <a:prstGeom prst="line">
+            <a:avLst/>
+          </a:prstGeom>
+          <a:ln w="19050">
+            <a:prstDash val="dash"/>
+            <a:tailEnd type="none"/>
+          </a:ln>
+        </p:spPr>
+        <p:style>
+          <a:lnRef idx="1">
+            <a:schemeClr val="dk1"/>
+          </a:lnRef>
+          <a:fillRef idx="0">
+            <a:schemeClr val="dk1"/>
+          </a:fillRef>
+          <a:effectRef idx="0">
+            <a:schemeClr val="dk1"/>
+          </a:effectRef>
+          <a:fontRef idx="minor">
+            <a:schemeClr val="tx1"/>
+          </a:fontRef>
+        </p:style>
+      </p:cxnSp>
+      <p:sp>
+        <p:nvSpPr>
+          <p:cNvPr id="23" name="椭圆 22">
+            <a:extLst>
+              <a:ext uri="{FF2B5EF4-FFF2-40B4-BE49-F238E27FC236}">
+                <a16:creationId xmlns:a16="http://schemas.microsoft.com/office/drawing/2014/main" id="{BBADFA87-5242-426B-B4D5-15B2B8A1B891}"/>
+              </a:ext>
+            </a:extLst>
+          </p:cNvPr>
+          <p:cNvSpPr/>
+          <p:nvPr/>
+        </p:nvSpPr>
+        <p:spPr>
+          <a:xfrm>
+            <a:off x="4348191" y="4050287"/>
+            <a:ext cx="657546" cy="657546"/>
+          </a:xfrm>
+          <a:prstGeom prst="ellipse">
+            <a:avLst/>
+          </a:prstGeom>
+          <a:noFill/>
+        </p:spPr>
+        <p:style>
+          <a:lnRef idx="2">
+            <a:schemeClr val="dk1"/>
+          </a:lnRef>
+          <a:fillRef idx="1">
+            <a:schemeClr val="lt1"/>
+          </a:fillRef>
+          <a:effectRef idx="0">
+            <a:schemeClr val="dk1"/>
+          </a:effectRef>
+          <a:fontRef idx="minor">
+            <a:schemeClr val="dk1"/>
+          </a:fontRef>
+        </p:style>
+        <p:txBody>
+          <a:bodyPr rtlCol="0" anchor="ctr"/>
+          <a:lstStyle/>
+          <a:p>
+            <a:pPr algn="ctr"/>
+            <a:r>
+              <a:rPr lang="en-US" altLang="zh-CN" dirty="0">
+                <a:latin typeface="Times New Roman" panose="02020603050405020304" pitchFamily="18" charset="0"/>
+                <a:cs typeface="Times New Roman" panose="02020603050405020304" pitchFamily="18" charset="0"/>
+              </a:rPr>
+              <a:t>E</a:t>
+            </a:r>
+            <a:endParaRPr lang="zh-CN" altLang="en-US" dirty="0">
+              <a:latin typeface="Times New Roman" panose="02020603050405020304" pitchFamily="18" charset="0"/>
+              <a:cs typeface="Times New Roman" panose="02020603050405020304" pitchFamily="18" charset="0"/>
+            </a:endParaRPr>
+          </a:p>
+        </p:txBody>
+      </p:sp>
+      <p:cxnSp>
+        <p:nvCxnSpPr>
+          <p:cNvPr id="24" name="直接连接符 23">
+            <a:extLst>
+              <a:ext uri="{FF2B5EF4-FFF2-40B4-BE49-F238E27FC236}">
+                <a16:creationId xmlns:a16="http://schemas.microsoft.com/office/drawing/2014/main" id="{899FC6D9-17BA-44BB-9956-F943CCC10C92}"/>
+              </a:ext>
+            </a:extLst>
+          </p:cNvPr>
+          <p:cNvCxnSpPr>
+            <a:cxnSpLocks/>
+            <a:stCxn id="15" idx="5"/>
+            <a:endCxn id="23" idx="1"/>
+          </p:cNvCxnSpPr>
+          <p:nvPr/>
+        </p:nvCxnSpPr>
+        <p:spPr>
+          <a:xfrm>
+            <a:off x="3909836" y="3572675"/>
+            <a:ext cx="534650" cy="573907"/>
+          </a:xfrm>
+          <a:prstGeom prst="line">
+            <a:avLst/>
+          </a:prstGeom>
+          <a:ln w="19050">
+            <a:tailEnd type="none"/>
+          </a:ln>
+        </p:spPr>
+        <p:style>
+          <a:lnRef idx="1">
+            <a:schemeClr val="dk1"/>
+          </a:lnRef>
+          <a:fillRef idx="0">
+            <a:schemeClr val="dk1"/>
+          </a:fillRef>
+          <a:effectRef idx="0">
+            <a:schemeClr val="dk1"/>
+          </a:effectRef>
+          <a:fontRef idx="minor">
+            <a:schemeClr val="tx1"/>
+          </a:fontRef>
+        </p:style>
+      </p:cxnSp>
+      <p:sp>
+        <p:nvSpPr>
+          <p:cNvPr id="29" name="椭圆 28">
+            <a:extLst>
+              <a:ext uri="{FF2B5EF4-FFF2-40B4-BE49-F238E27FC236}">
+                <a16:creationId xmlns:a16="http://schemas.microsoft.com/office/drawing/2014/main" id="{63C9A7FE-504F-4756-82AE-F128FD4A937F}"/>
+              </a:ext>
+            </a:extLst>
+          </p:cNvPr>
+          <p:cNvSpPr/>
+          <p:nvPr/>
+        </p:nvSpPr>
+        <p:spPr>
+          <a:xfrm>
+            <a:off x="7375072" y="2999328"/>
+            <a:ext cx="657546" cy="657546"/>
+          </a:xfrm>
+          <a:prstGeom prst="ellipse">
+            <a:avLst/>
+          </a:prstGeom>
+          <a:solidFill>
+            <a:srgbClr val="00B0F0"/>
+          </a:solidFill>
+          <a:ln w="38100"/>
+        </p:spPr>
+        <p:style>
+          <a:lnRef idx="2">
+            <a:schemeClr val="dk1"/>
+          </a:lnRef>
+          <a:fillRef idx="1">
+            <a:schemeClr val="lt1"/>
+          </a:fillRef>
+          <a:effectRef idx="0">
+            <a:schemeClr val="dk1"/>
+          </a:effectRef>
+          <a:fontRef idx="minor">
+            <a:schemeClr val="dk1"/>
+          </a:fontRef>
+        </p:style>
+        <p:txBody>
+          <a:bodyPr rtlCol="0" anchor="ctr"/>
+          <a:lstStyle/>
+          <a:p>
+            <a:pPr algn="ctr"/>
+            <a:r>
+              <a:rPr lang="en-US" altLang="zh-CN" dirty="0">
+                <a:latin typeface="Times New Roman" panose="02020603050405020304" pitchFamily="18" charset="0"/>
+                <a:cs typeface="Times New Roman" panose="02020603050405020304" pitchFamily="18" charset="0"/>
+              </a:rPr>
+              <a:t>A</a:t>
+            </a:r>
+            <a:endParaRPr lang="zh-CN" altLang="en-US" dirty="0">
+              <a:latin typeface="Times New Roman" panose="02020603050405020304" pitchFamily="18" charset="0"/>
+              <a:cs typeface="Times New Roman" panose="02020603050405020304" pitchFamily="18" charset="0"/>
+            </a:endParaRPr>
+          </a:p>
+        </p:txBody>
+      </p:sp>
+      <p:sp>
+        <p:nvSpPr>
+          <p:cNvPr id="30" name="椭圆 29">
+            <a:extLst>
+              <a:ext uri="{FF2B5EF4-FFF2-40B4-BE49-F238E27FC236}">
+                <a16:creationId xmlns:a16="http://schemas.microsoft.com/office/drawing/2014/main" id="{63B288F0-A5E2-42C9-BB50-CB2AEDEA8942}"/>
+              </a:ext>
+            </a:extLst>
+          </p:cNvPr>
+          <p:cNvSpPr/>
+          <p:nvPr/>
+        </p:nvSpPr>
+        <p:spPr>
+          <a:xfrm>
+            <a:off x="9166999" y="3011424"/>
+            <a:ext cx="657546" cy="657546"/>
+          </a:xfrm>
+          <a:prstGeom prst="ellipse">
+            <a:avLst/>
+          </a:prstGeom>
+          <a:noFill/>
+        </p:spPr>
+        <p:style>
+          <a:lnRef idx="2">
+            <a:schemeClr val="dk1"/>
+          </a:lnRef>
+          <a:fillRef idx="1">
+            <a:schemeClr val="lt1"/>
+          </a:fillRef>
+          <a:effectRef idx="0">
+            <a:schemeClr val="dk1"/>
+          </a:effectRef>
+          <a:fontRef idx="minor">
+            <a:schemeClr val="dk1"/>
+          </a:fontRef>
+        </p:style>
+        <p:txBody>
+          <a:bodyPr rtlCol="0" anchor="ctr"/>
+          <a:lstStyle/>
+          <a:p>
+            <a:pPr algn="ctr"/>
+            <a:r>
+              <a:rPr lang="en-US" altLang="zh-CN" dirty="0">
+                <a:latin typeface="Times New Roman" panose="02020603050405020304" pitchFamily="18" charset="0"/>
+                <a:cs typeface="Times New Roman" panose="02020603050405020304" pitchFamily="18" charset="0"/>
+              </a:rPr>
+              <a:t>E</a:t>
+            </a:r>
+            <a:endParaRPr lang="zh-CN" altLang="en-US" dirty="0">
+              <a:latin typeface="Times New Roman" panose="02020603050405020304" pitchFamily="18" charset="0"/>
+              <a:cs typeface="Times New Roman" panose="02020603050405020304" pitchFamily="18" charset="0"/>
+            </a:endParaRPr>
+          </a:p>
+        </p:txBody>
+      </p:sp>
+      <p:sp>
+        <p:nvSpPr>
+          <p:cNvPr id="31" name="椭圆 30">
+            <a:extLst>
+              <a:ext uri="{FF2B5EF4-FFF2-40B4-BE49-F238E27FC236}">
+                <a16:creationId xmlns:a16="http://schemas.microsoft.com/office/drawing/2014/main" id="{9440195D-6A9A-4628-A2D9-D675E5BCAA55}"/>
+              </a:ext>
+            </a:extLst>
+          </p:cNvPr>
+          <p:cNvSpPr/>
+          <p:nvPr/>
+        </p:nvSpPr>
+        <p:spPr>
+          <a:xfrm>
+            <a:off x="8239904" y="2025863"/>
+            <a:ext cx="657546" cy="657546"/>
+          </a:xfrm>
+          <a:prstGeom prst="ellipse">
+            <a:avLst/>
+          </a:prstGeom>
+          <a:solidFill>
+            <a:srgbClr val="FFC000"/>
+          </a:solidFill>
+        </p:spPr>
+        <p:style>
+          <a:lnRef idx="2">
+            <a:schemeClr val="dk1"/>
+          </a:lnRef>
+          <a:fillRef idx="1">
+            <a:schemeClr val="lt1"/>
+          </a:fillRef>
+          <a:effectRef idx="0">
+            <a:schemeClr val="dk1"/>
+          </a:effectRef>
+          <a:fontRef idx="minor">
+            <a:schemeClr val="dk1"/>
+          </a:fontRef>
+        </p:style>
+        <p:txBody>
+          <a:bodyPr rtlCol="0" anchor="ctr"/>
+          <a:lstStyle/>
+          <a:p>
+            <a:pPr algn="ctr"/>
+            <a:r>
+              <a:rPr lang="en-US" altLang="zh-CN" dirty="0">
+                <a:latin typeface="Times New Roman" panose="02020603050405020304" pitchFamily="18" charset="0"/>
+                <a:cs typeface="Times New Roman" panose="02020603050405020304" pitchFamily="18" charset="0"/>
+              </a:rPr>
+              <a:t>C</a:t>
+            </a:r>
+            <a:endParaRPr lang="zh-CN" altLang="en-US" dirty="0">
+              <a:latin typeface="Times New Roman" panose="02020603050405020304" pitchFamily="18" charset="0"/>
+              <a:cs typeface="Times New Roman" panose="02020603050405020304" pitchFamily="18" charset="0"/>
+            </a:endParaRPr>
+          </a:p>
+        </p:txBody>
+      </p:sp>
+      <p:sp>
+        <p:nvSpPr>
+          <p:cNvPr id="32" name="椭圆 31">
+            <a:extLst>
+              <a:ext uri="{FF2B5EF4-FFF2-40B4-BE49-F238E27FC236}">
+                <a16:creationId xmlns:a16="http://schemas.microsoft.com/office/drawing/2014/main" id="{E5A30CD8-F6B0-4AEC-A78D-886315500336}"/>
+              </a:ext>
+            </a:extLst>
+          </p:cNvPr>
+          <p:cNvSpPr/>
+          <p:nvPr/>
+        </p:nvSpPr>
+        <p:spPr>
+          <a:xfrm>
+            <a:off x="8336199" y="4050287"/>
+            <a:ext cx="657546" cy="657546"/>
+          </a:xfrm>
+          <a:prstGeom prst="ellipse">
+            <a:avLst/>
+          </a:prstGeom>
+          <a:solidFill>
+            <a:schemeClr val="accent6">
+              <a:lumMod val="40000"/>
+              <a:lumOff val="60000"/>
+            </a:schemeClr>
+          </a:solidFill>
+        </p:spPr>
+        <p:style>
+          <a:lnRef idx="2">
+            <a:schemeClr val="dk1"/>
+          </a:lnRef>
+          <a:fillRef idx="1">
+            <a:schemeClr val="lt1"/>
+          </a:fillRef>
+          <a:effectRef idx="0">
+            <a:schemeClr val="dk1"/>
+          </a:effectRef>
+          <a:fontRef idx="minor">
+            <a:schemeClr val="dk1"/>
+          </a:fontRef>
+        </p:style>
+        <p:txBody>
+          <a:bodyPr rtlCol="0" anchor="ctr"/>
+          <a:lstStyle/>
+          <a:p>
+            <a:pPr algn="ctr"/>
+            <a:r>
+              <a:rPr lang="en-US" altLang="zh-CN" dirty="0">
+                <a:latin typeface="Times New Roman" panose="02020603050405020304" pitchFamily="18" charset="0"/>
+                <a:cs typeface="Times New Roman" panose="02020603050405020304" pitchFamily="18" charset="0"/>
+              </a:rPr>
+              <a:t>D</a:t>
+            </a:r>
+            <a:endParaRPr lang="zh-CN" altLang="en-US" dirty="0">
+              <a:latin typeface="Times New Roman" panose="02020603050405020304" pitchFamily="18" charset="0"/>
+              <a:cs typeface="Times New Roman" panose="02020603050405020304" pitchFamily="18" charset="0"/>
+            </a:endParaRPr>
+          </a:p>
+        </p:txBody>
+      </p:sp>
+      <p:cxnSp>
+        <p:nvCxnSpPr>
+          <p:cNvPr id="33" name="直接连接符 32">
+            <a:extLst>
+              <a:ext uri="{FF2B5EF4-FFF2-40B4-BE49-F238E27FC236}">
+                <a16:creationId xmlns:a16="http://schemas.microsoft.com/office/drawing/2014/main" id="{435695B5-5777-4DD3-85E2-FBF7810102ED}"/>
+              </a:ext>
+            </a:extLst>
+          </p:cNvPr>
+          <p:cNvCxnSpPr>
+            <a:cxnSpLocks/>
+            <a:stCxn id="31" idx="3"/>
+            <a:endCxn id="29" idx="7"/>
+          </p:cNvCxnSpPr>
+          <p:nvPr/>
+        </p:nvCxnSpPr>
+        <p:spPr>
+          <a:xfrm flipH="1">
+            <a:off x="7936323" y="2587114"/>
+            <a:ext cx="399876" cy="508509"/>
+          </a:xfrm>
+          <a:prstGeom prst="line">
+            <a:avLst/>
+          </a:prstGeom>
+          <a:ln w="19050">
+            <a:solidFill>
+              <a:schemeClr val="accent4"/>
+            </a:solidFill>
+            <a:tailEnd type="none"/>
+          </a:ln>
+        </p:spPr>
+        <p:style>
+          <a:lnRef idx="1">
+            <a:schemeClr val="dk1"/>
+          </a:lnRef>
+          <a:fillRef idx="0">
+            <a:schemeClr val="dk1"/>
+          </a:fillRef>
+          <a:effectRef idx="0">
+            <a:schemeClr val="dk1"/>
+          </a:effectRef>
+          <a:fontRef idx="minor">
+            <a:schemeClr val="tx1"/>
+          </a:fontRef>
+        </p:style>
+      </p:cxnSp>
+      <p:cxnSp>
+        <p:nvCxnSpPr>
+          <p:cNvPr id="34" name="直接连接符 33">
+            <a:extLst>
+              <a:ext uri="{FF2B5EF4-FFF2-40B4-BE49-F238E27FC236}">
+                <a16:creationId xmlns:a16="http://schemas.microsoft.com/office/drawing/2014/main" id="{73E81616-0855-4636-A57C-2B51BEE94447}"/>
+              </a:ext>
+            </a:extLst>
+          </p:cNvPr>
+          <p:cNvCxnSpPr>
+            <a:cxnSpLocks/>
+            <a:stCxn id="31" idx="5"/>
+            <a:endCxn id="30" idx="1"/>
+          </p:cNvCxnSpPr>
+          <p:nvPr/>
+        </p:nvCxnSpPr>
+        <p:spPr>
+          <a:xfrm>
+            <a:off x="8801155" y="2587114"/>
+            <a:ext cx="462139" cy="520605"/>
+          </a:xfrm>
+          <a:prstGeom prst="line">
+            <a:avLst/>
+          </a:prstGeom>
+          <a:ln w="19050">
+            <a:tailEnd type="none"/>
+          </a:ln>
+        </p:spPr>
+        <p:style>
+          <a:lnRef idx="1">
+            <a:schemeClr val="dk1"/>
+          </a:lnRef>
+          <a:fillRef idx="0">
+            <a:schemeClr val="dk1"/>
+          </a:fillRef>
+          <a:effectRef idx="0">
+            <a:schemeClr val="dk1"/>
+          </a:effectRef>
+          <a:fontRef idx="minor">
+            <a:schemeClr val="tx1"/>
+          </a:fontRef>
+        </p:style>
+      </p:cxnSp>
+      <p:cxnSp>
+        <p:nvCxnSpPr>
+          <p:cNvPr id="35" name="直接连接符 34">
+            <a:extLst>
+              <a:ext uri="{FF2B5EF4-FFF2-40B4-BE49-F238E27FC236}">
+                <a16:creationId xmlns:a16="http://schemas.microsoft.com/office/drawing/2014/main" id="{2B84E4D1-B502-4306-A465-8D701677BB8F}"/>
+              </a:ext>
+            </a:extLst>
+          </p:cNvPr>
+          <p:cNvCxnSpPr>
+            <a:cxnSpLocks/>
+            <a:stCxn id="29" idx="5"/>
+            <a:endCxn id="32" idx="1"/>
+          </p:cNvCxnSpPr>
+          <p:nvPr/>
+        </p:nvCxnSpPr>
+        <p:spPr>
+          <a:xfrm>
+            <a:off x="7936323" y="3560579"/>
+            <a:ext cx="496171" cy="586003"/>
+          </a:xfrm>
+          <a:prstGeom prst="line">
+            <a:avLst/>
+          </a:prstGeom>
+          <a:ln w="19050">
+            <a:solidFill>
+              <a:srgbClr val="00B0F0"/>
+            </a:solidFill>
+            <a:tailEnd type="none"/>
+          </a:ln>
+        </p:spPr>
+        <p:style>
+          <a:lnRef idx="1">
+            <a:schemeClr val="dk1"/>
+          </a:lnRef>
+          <a:fillRef idx="0">
+            <a:schemeClr val="dk1"/>
+          </a:fillRef>
+          <a:effectRef idx="0">
+            <a:schemeClr val="dk1"/>
+          </a:effectRef>
+          <a:fontRef idx="minor">
+            <a:schemeClr val="tx1"/>
+          </a:fontRef>
+        </p:style>
+      </p:cxnSp>
+      <p:sp>
+        <p:nvSpPr>
+          <p:cNvPr id="36" name="椭圆 35">
+            <a:extLst>
+              <a:ext uri="{FF2B5EF4-FFF2-40B4-BE49-F238E27FC236}">
+                <a16:creationId xmlns:a16="http://schemas.microsoft.com/office/drawing/2014/main" id="{1A34AB2E-B6DC-4A58-833B-1040FE710109}"/>
+              </a:ext>
+            </a:extLst>
+          </p:cNvPr>
+          <p:cNvSpPr/>
+          <p:nvPr/>
+        </p:nvSpPr>
+        <p:spPr>
+          <a:xfrm>
+            <a:off x="9166999" y="1052398"/>
+            <a:ext cx="657546" cy="657546"/>
+          </a:xfrm>
+          <a:prstGeom prst="ellipse">
+            <a:avLst/>
+          </a:prstGeom>
+          <a:noFill/>
+        </p:spPr>
+        <p:style>
+          <a:lnRef idx="2">
+            <a:schemeClr val="dk1"/>
+          </a:lnRef>
+          <a:fillRef idx="1">
+            <a:schemeClr val="lt1"/>
+          </a:fillRef>
+          <a:effectRef idx="0">
+            <a:schemeClr val="dk1"/>
+          </a:effectRef>
+          <a:fontRef idx="minor">
+            <a:schemeClr val="dk1"/>
+          </a:fontRef>
+        </p:style>
+        <p:txBody>
+          <a:bodyPr rtlCol="0" anchor="ctr"/>
+          <a:lstStyle/>
+          <a:p>
+            <a:pPr algn="ctr"/>
+            <a:endParaRPr lang="zh-CN" altLang="en-US" dirty="0">
+              <a:latin typeface="Times New Roman" panose="02020603050405020304" pitchFamily="18" charset="0"/>
+              <a:cs typeface="Times New Roman" panose="02020603050405020304" pitchFamily="18" charset="0"/>
+            </a:endParaRPr>
+          </a:p>
+        </p:txBody>
+      </p:sp>
+      <p:cxnSp>
+        <p:nvCxnSpPr>
+          <p:cNvPr id="37" name="直接连接符 36">
+            <a:extLst>
+              <a:ext uri="{FF2B5EF4-FFF2-40B4-BE49-F238E27FC236}">
+                <a16:creationId xmlns:a16="http://schemas.microsoft.com/office/drawing/2014/main" id="{EE8A6B7B-12C9-4E92-BB12-F02819380874}"/>
+              </a:ext>
+            </a:extLst>
+          </p:cNvPr>
+          <p:cNvCxnSpPr>
+            <a:cxnSpLocks/>
+            <a:stCxn id="36" idx="3"/>
+            <a:endCxn id="31" idx="7"/>
+          </p:cNvCxnSpPr>
+          <p:nvPr/>
+        </p:nvCxnSpPr>
+        <p:spPr>
+          <a:xfrm flipH="1">
+            <a:off x="8801155" y="1613649"/>
+            <a:ext cx="462139" cy="508509"/>
+          </a:xfrm>
+          <a:prstGeom prst="line">
+            <a:avLst/>
+          </a:prstGeom>
+          <a:ln w="19050">
+            <a:tailEnd type="none"/>
+          </a:ln>
+        </p:spPr>
+        <p:style>
+          <a:lnRef idx="1">
+            <a:schemeClr val="dk1"/>
+          </a:lnRef>
+          <a:fillRef idx="0">
+            <a:schemeClr val="dk1"/>
+          </a:fillRef>
+          <a:effectRef idx="0">
+            <a:schemeClr val="dk1"/>
+          </a:effectRef>
+          <a:fontRef idx="minor">
+            <a:schemeClr val="tx1"/>
+          </a:fontRef>
+        </p:style>
+      </p:cxnSp>
+      <p:sp>
+        <p:nvSpPr>
+          <p:cNvPr id="44" name="椭圆 43">
+            <a:extLst>
+              <a:ext uri="{FF2B5EF4-FFF2-40B4-BE49-F238E27FC236}">
+                <a16:creationId xmlns:a16="http://schemas.microsoft.com/office/drawing/2014/main" id="{A92729C8-ADCB-4A0E-A108-C280631360A0}"/>
+              </a:ext>
+            </a:extLst>
+          </p:cNvPr>
+          <p:cNvSpPr/>
+          <p:nvPr/>
+        </p:nvSpPr>
+        <p:spPr>
+          <a:xfrm>
+            <a:off x="6446569" y="4050287"/>
+            <a:ext cx="657546" cy="657546"/>
+          </a:xfrm>
+          <a:prstGeom prst="ellipse">
+            <a:avLst/>
+          </a:prstGeom>
+          <a:noFill/>
+        </p:spPr>
+        <p:style>
+          <a:lnRef idx="2">
+            <a:schemeClr val="dk1"/>
+          </a:lnRef>
+          <a:fillRef idx="1">
+            <a:schemeClr val="lt1"/>
+          </a:fillRef>
+          <a:effectRef idx="0">
+            <a:schemeClr val="dk1"/>
+          </a:effectRef>
+          <a:fontRef idx="minor">
+            <a:schemeClr val="dk1"/>
+          </a:fontRef>
+        </p:style>
+        <p:txBody>
+          <a:bodyPr rtlCol="0" anchor="ctr"/>
+          <a:lstStyle/>
+          <a:p>
+            <a:pPr algn="ctr"/>
+            <a:r>
+              <a:rPr lang="en-US" altLang="zh-CN" dirty="0">
+                <a:latin typeface="Times New Roman" panose="02020603050405020304" pitchFamily="18" charset="0"/>
+                <a:cs typeface="Times New Roman" panose="02020603050405020304" pitchFamily="18" charset="0"/>
+              </a:rPr>
+              <a:t>B</a:t>
+            </a:r>
+            <a:endParaRPr lang="zh-CN" altLang="en-US" dirty="0">
+              <a:latin typeface="Times New Roman" panose="02020603050405020304" pitchFamily="18" charset="0"/>
+              <a:cs typeface="Times New Roman" panose="02020603050405020304" pitchFamily="18" charset="0"/>
+            </a:endParaRPr>
+          </a:p>
+        </p:txBody>
+      </p:sp>
+      <p:cxnSp>
+        <p:nvCxnSpPr>
+          <p:cNvPr id="45" name="直接连接符 44">
+            <a:extLst>
+              <a:ext uri="{FF2B5EF4-FFF2-40B4-BE49-F238E27FC236}">
+                <a16:creationId xmlns:a16="http://schemas.microsoft.com/office/drawing/2014/main" id="{453A9B07-A1D2-4151-98E6-7ABDA667D688}"/>
+              </a:ext>
+            </a:extLst>
+          </p:cNvPr>
+          <p:cNvCxnSpPr>
+            <a:cxnSpLocks/>
+            <a:stCxn id="29" idx="3"/>
+            <a:endCxn id="44" idx="7"/>
+          </p:cNvCxnSpPr>
+          <p:nvPr/>
+        </p:nvCxnSpPr>
+        <p:spPr>
+          <a:xfrm flipH="1">
+            <a:off x="7007820" y="3560579"/>
+            <a:ext cx="463547" cy="586003"/>
+          </a:xfrm>
+          <a:prstGeom prst="line">
+            <a:avLst/>
+          </a:prstGeom>
+          <a:ln w="19050">
+            <a:tailEnd type="none"/>
+          </a:ln>
+        </p:spPr>
+        <p:style>
+          <a:lnRef idx="1">
+            <a:schemeClr val="dk1"/>
+          </a:lnRef>
+          <a:fillRef idx="0">
+            <a:schemeClr val="dk1"/>
+          </a:fillRef>
+          <a:effectRef idx="0">
+            <a:schemeClr val="dk1"/>
+          </a:effectRef>
+          <a:fontRef idx="minor">
+            <a:schemeClr val="tx1"/>
+          </a:fontRef>
+        </p:style>
+      </p:cxnSp>
+      <p:cxnSp>
+        <p:nvCxnSpPr>
+          <p:cNvPr id="50" name="连接符: 曲线 49">
+            <a:extLst>
+              <a:ext uri="{FF2B5EF4-FFF2-40B4-BE49-F238E27FC236}">
+                <a16:creationId xmlns:a16="http://schemas.microsoft.com/office/drawing/2014/main" id="{59D50A3B-8582-495F-9DB9-BB08BC23931E}"/>
+              </a:ext>
+            </a:extLst>
+          </p:cNvPr>
+          <p:cNvCxnSpPr>
+            <a:cxnSpLocks/>
+            <a:stCxn id="15" idx="0"/>
+          </p:cNvCxnSpPr>
+          <p:nvPr/>
+        </p:nvCxnSpPr>
+        <p:spPr>
+          <a:xfrm rot="16200000" flipV="1">
+            <a:off x="2894323" y="2228389"/>
+            <a:ext cx="898774" cy="667296"/>
+          </a:xfrm>
+          <a:prstGeom prst="curvedConnector3">
+            <a:avLst>
+              <a:gd name="adj1" fmla="val 93603"/>
+            </a:avLst>
+          </a:prstGeom>
+          <a:ln w="31750">
+            <a:solidFill>
+              <a:schemeClr val="accent4"/>
+            </a:solidFill>
+            <a:prstDash val="solid"/>
+            <a:tailEnd type="triangle" w="lg" len="lg"/>
+          </a:ln>
+        </p:spPr>
+        <p:style>
+          <a:lnRef idx="1">
+            <a:schemeClr val="dk1"/>
+          </a:lnRef>
+          <a:fillRef idx="0">
+            <a:schemeClr val="dk1"/>
+          </a:fillRef>
+          <a:effectRef idx="0">
+            <a:schemeClr val="dk1"/>
+          </a:effectRef>
+          <a:fontRef idx="minor">
+            <a:schemeClr val="tx1"/>
+          </a:fontRef>
+        </p:style>
+      </p:cxnSp>
+      <p:cxnSp>
+        <p:nvCxnSpPr>
+          <p:cNvPr id="53" name="连接符: 曲线 52">
+            <a:extLst>
+              <a:ext uri="{FF2B5EF4-FFF2-40B4-BE49-F238E27FC236}">
+                <a16:creationId xmlns:a16="http://schemas.microsoft.com/office/drawing/2014/main" id="{0EC36064-413F-439F-AB9D-9FC488506C5C}"/>
+              </a:ext>
+            </a:extLst>
+          </p:cNvPr>
+          <p:cNvCxnSpPr>
+            <a:cxnSpLocks/>
+            <a:stCxn id="17" idx="1"/>
+            <a:endCxn id="16" idx="5"/>
+          </p:cNvCxnSpPr>
+          <p:nvPr/>
+        </p:nvCxnSpPr>
+        <p:spPr>
+          <a:xfrm rot="5400000" flipH="1" flipV="1">
+            <a:off x="2037916" y="3201757"/>
+            <a:ext cx="1559468" cy="330182"/>
+          </a:xfrm>
+          <a:prstGeom prst="curvedConnector3">
+            <a:avLst>
+              <a:gd name="adj1" fmla="val 40227"/>
+            </a:avLst>
+          </a:prstGeom>
+          <a:ln w="31750">
+            <a:solidFill>
+              <a:srgbClr val="00B0F0"/>
+            </a:solidFill>
+            <a:prstDash val="solid"/>
+            <a:headEnd type="triangle" w="lg" len="lg"/>
+            <a:tailEnd type="none" w="lg" len="lg"/>
+          </a:ln>
+        </p:spPr>
+        <p:style>
+          <a:lnRef idx="1">
+            <a:schemeClr val="dk1"/>
+          </a:lnRef>
+          <a:fillRef idx="0">
+            <a:schemeClr val="dk1"/>
+          </a:fillRef>
+          <a:effectRef idx="0">
+            <a:schemeClr val="dk1"/>
+          </a:effectRef>
+          <a:fontRef idx="minor">
+            <a:schemeClr val="tx1"/>
+          </a:fontRef>
+        </p:style>
+      </p:cxnSp>
+      <p:sp>
+        <p:nvSpPr>
+          <p:cNvPr id="68" name="箭头: 右 67">
+            <a:extLst>
+              <a:ext uri="{FF2B5EF4-FFF2-40B4-BE49-F238E27FC236}">
+                <a16:creationId xmlns:a16="http://schemas.microsoft.com/office/drawing/2014/main" id="{25D916FD-E764-4208-969C-32642F6B6EFC}"/>
+              </a:ext>
+            </a:extLst>
+          </p:cNvPr>
+          <p:cNvSpPr/>
+          <p:nvPr/>
+        </p:nvSpPr>
+        <p:spPr>
+          <a:xfrm>
+            <a:off x="5318493" y="2720575"/>
+            <a:ext cx="827314" cy="328773"/>
+          </a:xfrm>
+          <a:prstGeom prst="rightArrow">
+            <a:avLst/>
+          </a:prstGeom>
+          <a:ln w="22225">
+            <a:solidFill>
+              <a:schemeClr val="tx1"/>
+            </a:solidFill>
+            <a:tailEnd type="none" w="lg" len="lg"/>
+          </a:ln>
+        </p:spPr>
+        <p:style>
+          <a:lnRef idx="1">
+            <a:schemeClr val="dk1"/>
+          </a:lnRef>
+          <a:fillRef idx="0">
+            <a:schemeClr val="dk1"/>
+          </a:fillRef>
+          <a:effectRef idx="0">
+            <a:schemeClr val="dk1"/>
+          </a:effectRef>
+          <a:fontRef idx="minor">
+            <a:schemeClr val="tx1"/>
+          </a:fontRef>
+        </p:style>
+        <p:txBody>
+          <a:bodyPr rtlCol="0" anchor="ctr"/>
+          <a:lstStyle/>
+          <a:p>
+            <a:pPr algn="ctr"/>
+            <a:endParaRPr lang="zh-CN" altLang="en-US"/>
+          </a:p>
+        </p:txBody>
+      </p:sp>
+      <p:sp>
+        <p:nvSpPr>
+          <p:cNvPr id="78" name="箭头: 上弧形 77">
+            <a:extLst>
+              <a:ext uri="{FF2B5EF4-FFF2-40B4-BE49-F238E27FC236}">
+                <a16:creationId xmlns:a16="http://schemas.microsoft.com/office/drawing/2014/main" id="{56B6E1DF-E903-4D62-ABC5-A63DDFFB8275}"/>
+              </a:ext>
+            </a:extLst>
+          </p:cNvPr>
+          <p:cNvSpPr/>
+          <p:nvPr/>
+        </p:nvSpPr>
+        <p:spPr>
+          <a:xfrm flipH="1">
+            <a:off x="1317170" y="1892252"/>
+            <a:ext cx="2866941" cy="1157096"/>
+          </a:xfrm>
+          <a:prstGeom prst="curvedDownArrow">
+            <a:avLst>
+              <a:gd name="adj1" fmla="val 12501"/>
+              <a:gd name="adj2" fmla="val 28055"/>
+              <a:gd name="adj3" fmla="val 22142"/>
+            </a:avLst>
+          </a:prstGeom>
+          <a:gradFill>
+            <a:gsLst>
+              <a:gs pos="0">
+                <a:schemeClr val="accent4"/>
+              </a:gs>
+              <a:gs pos="74000">
+                <a:schemeClr val="accent1">
+                  <a:lumMod val="45000"/>
+                  <a:lumOff val="55000"/>
+                </a:schemeClr>
+              </a:gs>
+              <a:gs pos="100000">
+                <a:srgbClr val="00B0F0"/>
+              </a:gs>
+            </a:gsLst>
+            <a:lin ang="0" scaled="0"/>
+          </a:gradFill>
+          <a:ln w="15875">
+            <a:solidFill>
+              <a:schemeClr val="dk1"/>
+            </a:solidFill>
+            <a:tailEnd type="none" w="lg" len="lg"/>
+          </a:ln>
+        </p:spPr>
+        <p:style>
+          <a:lnRef idx="1">
+            <a:schemeClr val="dk1"/>
+          </a:lnRef>
+          <a:fillRef idx="0">
+            <a:schemeClr val="dk1"/>
+          </a:fillRef>
+          <a:effectRef idx="0">
+            <a:schemeClr val="dk1"/>
+          </a:effectRef>
+          <a:fontRef idx="minor">
+            <a:schemeClr val="tx1"/>
+          </a:fontRef>
+        </p:style>
+        <p:txBody>
+          <a:bodyPr rtlCol="0" anchor="ctr"/>
+          <a:lstStyle/>
+          <a:p>
+            <a:pPr algn="ctr"/>
+            <a:endParaRPr lang="zh-CN" altLang="en-US">
+              <a:solidFill>
+                <a:schemeClr val="tx1"/>
+              </a:solidFill>
+            </a:endParaRPr>
+          </a:p>
+        </p:txBody>
+      </p:sp>
+      <p:sp>
+        <p:nvSpPr>
+          <p:cNvPr id="79" name="箭头: 上弧形 78">
+            <a:extLst>
+              <a:ext uri="{FF2B5EF4-FFF2-40B4-BE49-F238E27FC236}">
+                <a16:creationId xmlns:a16="http://schemas.microsoft.com/office/drawing/2014/main" id="{081D1DD8-39E6-4E82-A2FD-FD5ABA6EFD45}"/>
+              </a:ext>
+            </a:extLst>
+          </p:cNvPr>
+          <p:cNvSpPr/>
+          <p:nvPr/>
+        </p:nvSpPr>
+        <p:spPr>
+          <a:xfrm rot="21377905" flipH="1">
+            <a:off x="6803569" y="2683409"/>
+            <a:ext cx="1628923" cy="745591"/>
+          </a:xfrm>
+          <a:prstGeom prst="curvedDownArrow">
+            <a:avLst>
+              <a:gd name="adj1" fmla="val 12501"/>
+              <a:gd name="adj2" fmla="val 28055"/>
+              <a:gd name="adj3" fmla="val 22142"/>
+            </a:avLst>
+          </a:prstGeom>
+          <a:gradFill>
+            <a:gsLst>
+              <a:gs pos="0">
+                <a:schemeClr val="accent4"/>
+              </a:gs>
+              <a:gs pos="74000">
+                <a:schemeClr val="accent1">
+                  <a:lumMod val="45000"/>
+                  <a:lumOff val="55000"/>
+                </a:schemeClr>
+              </a:gs>
+              <a:gs pos="100000">
+                <a:srgbClr val="00B0F0"/>
+              </a:gs>
+            </a:gsLst>
+            <a:lin ang="0" scaled="0"/>
+          </a:gradFill>
+          <a:ln w="15875">
+            <a:solidFill>
+              <a:schemeClr val="dk1"/>
+            </a:solidFill>
+            <a:tailEnd type="none" w="lg" len="lg"/>
+          </a:ln>
+        </p:spPr>
+        <p:style>
+          <a:lnRef idx="1">
+            <a:schemeClr val="dk1"/>
+          </a:lnRef>
+          <a:fillRef idx="0">
+            <a:schemeClr val="dk1"/>
+          </a:fillRef>
+          <a:effectRef idx="0">
+            <a:schemeClr val="dk1"/>
+          </a:effectRef>
+          <a:fontRef idx="minor">
+            <a:schemeClr val="tx1"/>
+          </a:fontRef>
+        </p:style>
+        <p:txBody>
+          <a:bodyPr rtlCol="0" anchor="ctr"/>
+          <a:lstStyle/>
+          <a:p>
+            <a:pPr algn="ctr"/>
+            <a:endParaRPr lang="zh-CN" altLang="en-US">
+              <a:solidFill>
+                <a:schemeClr val="tx1"/>
+              </a:solidFill>
+            </a:endParaRPr>
+          </a:p>
+        </p:txBody>
+      </p:sp>
+    </p:spTree>
+    <p:extLst>
+      <p:ext uri="{BB962C8B-B14F-4D97-AF65-F5344CB8AC3E}">
+        <p14:creationId xmlns:p14="http://schemas.microsoft.com/office/powerpoint/2010/main" val="319995699"/>
+      </p:ext>
+    </p:extLst>
+  </p:cSld>
+  <p:clrMapOvr>
+    <a:masterClrMapping/>
+  </p:clrMapOvr>
+</p:sld>
+</file>
+
+<file path=ppt/slides/slide5.xml><?xml version="1.0" encoding="utf-8"?>
+<p:sld xmlns:a="http://schemas.openxmlformats.org/drawingml/2006/main" xmlns:r="http://schemas.openxmlformats.org/officeDocument/2006/relationships" xmlns:p="http://schemas.openxmlformats.org/presentationml/2006/main">
+  <p:cSld>
+    <p:spTree>
+      <p:nvGrpSpPr>
+        <p:cNvPr id="1" name=""/>
+        <p:cNvGrpSpPr/>
+        <p:nvPr/>
+      </p:nvGrpSpPr>
+      <p:grpSpPr>
+        <a:xfrm>
+          <a:off x="0" y="0"/>
+          <a:ext cx="0" cy="0"/>
+          <a:chOff x="0" y="0"/>
+          <a:chExt cx="0" cy="0"/>
+        </a:xfrm>
+      </p:grpSpPr>
+      <p:sp>
+        <p:nvSpPr>
+          <p:cNvPr id="14" name="椭圆 13">
+            <a:extLst>
+              <a:ext uri="{FF2B5EF4-FFF2-40B4-BE49-F238E27FC236}">
+                <a16:creationId xmlns:a16="http://schemas.microsoft.com/office/drawing/2014/main" id="{1F918712-E2DD-4D8F-B324-DFED645440BF}"/>
+              </a:ext>
+            </a:extLst>
+          </p:cNvPr>
+          <p:cNvSpPr/>
+          <p:nvPr/>
+        </p:nvSpPr>
+        <p:spPr>
+          <a:xfrm>
+            <a:off x="2514602" y="2999328"/>
+            <a:ext cx="657546" cy="657546"/>
+          </a:xfrm>
+          <a:prstGeom prst="ellipse">
+            <a:avLst/>
+          </a:prstGeom>
+          <a:solidFill>
+            <a:srgbClr val="FF99FF"/>
+          </a:solidFill>
+        </p:spPr>
+        <p:style>
+          <a:lnRef idx="2">
+            <a:schemeClr val="dk1"/>
+          </a:lnRef>
+          <a:fillRef idx="1">
+            <a:schemeClr val="lt1"/>
+          </a:fillRef>
+          <a:effectRef idx="0">
+            <a:schemeClr val="dk1"/>
+          </a:effectRef>
+          <a:fontRef idx="minor">
+            <a:schemeClr val="dk1"/>
+          </a:fontRef>
+        </p:style>
+        <p:txBody>
+          <a:bodyPr rtlCol="0" anchor="ctr"/>
+          <a:lstStyle/>
+          <a:p>
+            <a:pPr algn="ctr"/>
+            <a:r>
+              <a:rPr lang="en-US" altLang="zh-CN" dirty="0">
+                <a:latin typeface="Times New Roman" panose="02020603050405020304" pitchFamily="18" charset="0"/>
+                <a:cs typeface="Times New Roman" panose="02020603050405020304" pitchFamily="18" charset="0"/>
+              </a:rPr>
+              <a:t>B</a:t>
+            </a:r>
+            <a:endParaRPr lang="zh-CN" altLang="en-US" dirty="0">
+              <a:latin typeface="Times New Roman" panose="02020603050405020304" pitchFamily="18" charset="0"/>
+              <a:cs typeface="Times New Roman" panose="02020603050405020304" pitchFamily="18" charset="0"/>
+            </a:endParaRPr>
+          </a:p>
+        </p:txBody>
+      </p:sp>
+      <p:sp>
+        <p:nvSpPr>
+          <p:cNvPr id="15" name="椭圆 14">
+            <a:extLst>
+              <a:ext uri="{FF2B5EF4-FFF2-40B4-BE49-F238E27FC236}">
+                <a16:creationId xmlns:a16="http://schemas.microsoft.com/office/drawing/2014/main" id="{38F398B1-749B-46AB-BA55-48713B285A3A}"/>
+              </a:ext>
+            </a:extLst>
+          </p:cNvPr>
+          <p:cNvSpPr/>
+          <p:nvPr/>
+        </p:nvSpPr>
+        <p:spPr>
+          <a:xfrm>
+            <a:off x="4306529" y="3011424"/>
+            <a:ext cx="657546" cy="657546"/>
+          </a:xfrm>
+          <a:prstGeom prst="ellipse">
+            <a:avLst/>
+          </a:prstGeom>
+          <a:noFill/>
+        </p:spPr>
+        <p:style>
+          <a:lnRef idx="2">
+            <a:schemeClr val="dk1"/>
+          </a:lnRef>
+          <a:fillRef idx="1">
+            <a:schemeClr val="lt1"/>
+          </a:fillRef>
+          <a:effectRef idx="0">
+            <a:schemeClr val="dk1"/>
+          </a:effectRef>
+          <a:fontRef idx="minor">
+            <a:schemeClr val="dk1"/>
+          </a:fontRef>
+        </p:style>
+        <p:txBody>
+          <a:bodyPr rtlCol="0" anchor="ctr"/>
+          <a:lstStyle/>
+          <a:p>
+            <a:pPr algn="ctr"/>
+            <a:r>
+              <a:rPr lang="en-US" altLang="zh-CN" dirty="0">
+                <a:latin typeface="Times New Roman" panose="02020603050405020304" pitchFamily="18" charset="0"/>
+                <a:cs typeface="Times New Roman" panose="02020603050405020304" pitchFamily="18" charset="0"/>
+              </a:rPr>
+              <a:t>C</a:t>
+            </a:r>
+            <a:endParaRPr lang="zh-CN" altLang="en-US" dirty="0">
+              <a:latin typeface="Times New Roman" panose="02020603050405020304" pitchFamily="18" charset="0"/>
+              <a:cs typeface="Times New Roman" panose="02020603050405020304" pitchFamily="18" charset="0"/>
+            </a:endParaRPr>
+          </a:p>
+        </p:txBody>
+      </p:sp>
+      <p:sp>
+        <p:nvSpPr>
+          <p:cNvPr id="16" name="椭圆 15">
+            <a:extLst>
+              <a:ext uri="{FF2B5EF4-FFF2-40B4-BE49-F238E27FC236}">
+                <a16:creationId xmlns:a16="http://schemas.microsoft.com/office/drawing/2014/main" id="{34C772CF-FB41-4F35-80F4-107AA1C6B18C}"/>
+              </a:ext>
+            </a:extLst>
+          </p:cNvPr>
+          <p:cNvSpPr/>
+          <p:nvPr/>
+        </p:nvSpPr>
+        <p:spPr>
+          <a:xfrm>
+            <a:off x="3379434" y="2025863"/>
+            <a:ext cx="657546" cy="657546"/>
+          </a:xfrm>
+          <a:prstGeom prst="ellipse">
+            <a:avLst/>
+          </a:prstGeom>
+          <a:solidFill>
+            <a:srgbClr val="00B0F0"/>
+          </a:solidFill>
+          <a:ln w="38100"/>
+        </p:spPr>
+        <p:style>
+          <a:lnRef idx="2">
+            <a:schemeClr val="dk1"/>
+          </a:lnRef>
+          <a:fillRef idx="1">
+            <a:schemeClr val="lt1"/>
+          </a:fillRef>
+          <a:effectRef idx="0">
+            <a:schemeClr val="dk1"/>
+          </a:effectRef>
+          <a:fontRef idx="minor">
+            <a:schemeClr val="dk1"/>
+          </a:fontRef>
+        </p:style>
+        <p:txBody>
+          <a:bodyPr rtlCol="0" anchor="ctr"/>
+          <a:lstStyle/>
+          <a:p>
+            <a:pPr algn="ctr"/>
+            <a:r>
+              <a:rPr lang="en-US" altLang="zh-CN" dirty="0">
+                <a:latin typeface="Times New Roman" panose="02020603050405020304" pitchFamily="18" charset="0"/>
+                <a:cs typeface="Times New Roman" panose="02020603050405020304" pitchFamily="18" charset="0"/>
+              </a:rPr>
+              <a:t>A</a:t>
+            </a:r>
+            <a:endParaRPr lang="zh-CN" altLang="en-US" dirty="0">
+              <a:latin typeface="Times New Roman" panose="02020603050405020304" pitchFamily="18" charset="0"/>
+              <a:cs typeface="Times New Roman" panose="02020603050405020304" pitchFamily="18" charset="0"/>
+            </a:endParaRPr>
+          </a:p>
+        </p:txBody>
+      </p:sp>
+      <p:cxnSp>
+        <p:nvCxnSpPr>
+          <p:cNvPr id="18" name="直接连接符 17">
+            <a:extLst>
+              <a:ext uri="{FF2B5EF4-FFF2-40B4-BE49-F238E27FC236}">
+                <a16:creationId xmlns:a16="http://schemas.microsoft.com/office/drawing/2014/main" id="{5613F276-D737-4B72-97F8-5D12338DE56A}"/>
+              </a:ext>
+            </a:extLst>
+          </p:cNvPr>
+          <p:cNvCxnSpPr>
+            <a:cxnSpLocks/>
+            <a:stCxn id="16" idx="3"/>
+            <a:endCxn id="14" idx="7"/>
+          </p:cNvCxnSpPr>
+          <p:nvPr/>
+        </p:nvCxnSpPr>
+        <p:spPr>
+          <a:xfrm flipH="1">
+            <a:off x="3075853" y="2587114"/>
+            <a:ext cx="399876" cy="508509"/>
+          </a:xfrm>
+          <a:prstGeom prst="line">
+            <a:avLst/>
+          </a:prstGeom>
+          <a:ln w="19050">
+            <a:solidFill>
+              <a:srgbClr val="00B0F0"/>
+            </a:solidFill>
+            <a:prstDash val="dash"/>
+            <a:tailEnd type="none"/>
+          </a:ln>
+        </p:spPr>
+        <p:style>
+          <a:lnRef idx="1">
+            <a:schemeClr val="dk1"/>
+          </a:lnRef>
+          <a:fillRef idx="0">
+            <a:schemeClr val="dk1"/>
+          </a:fillRef>
+          <a:effectRef idx="0">
+            <a:schemeClr val="dk1"/>
+          </a:effectRef>
+          <a:fontRef idx="minor">
+            <a:schemeClr val="tx1"/>
+          </a:fontRef>
+        </p:style>
+      </p:cxnSp>
+      <p:cxnSp>
+        <p:nvCxnSpPr>
+          <p:cNvPr id="19" name="直接连接符 18">
+            <a:extLst>
+              <a:ext uri="{FF2B5EF4-FFF2-40B4-BE49-F238E27FC236}">
+                <a16:creationId xmlns:a16="http://schemas.microsoft.com/office/drawing/2014/main" id="{345C6729-EEA6-48D8-B6D0-79DFA9BB99FA}"/>
+              </a:ext>
+            </a:extLst>
+          </p:cNvPr>
+          <p:cNvCxnSpPr>
+            <a:cxnSpLocks/>
+            <a:stCxn id="16" idx="5"/>
+            <a:endCxn id="15" idx="1"/>
+          </p:cNvCxnSpPr>
+          <p:nvPr/>
+        </p:nvCxnSpPr>
+        <p:spPr>
+          <a:xfrm>
+            <a:off x="3940685" y="2587114"/>
+            <a:ext cx="462139" cy="520605"/>
+          </a:xfrm>
+          <a:prstGeom prst="line">
+            <a:avLst/>
+          </a:prstGeom>
+          <a:ln w="19050">
+            <a:solidFill>
+              <a:schemeClr val="tx1"/>
+            </a:solidFill>
+            <a:prstDash val="solid"/>
+            <a:tailEnd type="none"/>
+          </a:ln>
+        </p:spPr>
+        <p:style>
+          <a:lnRef idx="1">
+            <a:schemeClr val="dk1"/>
+          </a:lnRef>
+          <a:fillRef idx="0">
+            <a:schemeClr val="dk1"/>
+          </a:fillRef>
+          <a:effectRef idx="0">
+            <a:schemeClr val="dk1"/>
+          </a:effectRef>
+          <a:fontRef idx="minor">
+            <a:schemeClr val="tx1"/>
+          </a:fontRef>
+        </p:style>
+      </p:cxnSp>
+      <p:sp>
+        <p:nvSpPr>
+          <p:cNvPr id="21" name="椭圆 20">
+            <a:extLst>
+              <a:ext uri="{FF2B5EF4-FFF2-40B4-BE49-F238E27FC236}">
+                <a16:creationId xmlns:a16="http://schemas.microsoft.com/office/drawing/2014/main" id="{84794A7B-F250-41A0-B4F2-13DFA5CB3AF2}"/>
+              </a:ext>
+            </a:extLst>
+          </p:cNvPr>
+          <p:cNvSpPr/>
+          <p:nvPr/>
+        </p:nvSpPr>
+        <p:spPr>
+          <a:xfrm>
+            <a:off x="4306529" y="1052398"/>
+            <a:ext cx="657546" cy="657546"/>
+          </a:xfrm>
+          <a:prstGeom prst="ellipse">
+            <a:avLst/>
+          </a:prstGeom>
+          <a:noFill/>
+        </p:spPr>
+        <p:style>
+          <a:lnRef idx="2">
+            <a:schemeClr val="dk1"/>
+          </a:lnRef>
+          <a:fillRef idx="1">
+            <a:schemeClr val="lt1"/>
+          </a:fillRef>
+          <a:effectRef idx="0">
+            <a:schemeClr val="dk1"/>
+          </a:effectRef>
+          <a:fontRef idx="minor">
+            <a:schemeClr val="dk1"/>
+          </a:fontRef>
+        </p:style>
+        <p:txBody>
+          <a:bodyPr rtlCol="0" anchor="ctr"/>
+          <a:lstStyle/>
+          <a:p>
+            <a:pPr algn="ctr"/>
+            <a:endParaRPr lang="zh-CN" altLang="en-US" dirty="0">
+              <a:latin typeface="Times New Roman" panose="02020603050405020304" pitchFamily="18" charset="0"/>
+              <a:cs typeface="Times New Roman" panose="02020603050405020304" pitchFamily="18" charset="0"/>
+            </a:endParaRPr>
+          </a:p>
+        </p:txBody>
+      </p:sp>
+      <p:cxnSp>
+        <p:nvCxnSpPr>
+          <p:cNvPr id="22" name="直接连接符 21">
+            <a:extLst>
+              <a:ext uri="{FF2B5EF4-FFF2-40B4-BE49-F238E27FC236}">
+                <a16:creationId xmlns:a16="http://schemas.microsoft.com/office/drawing/2014/main" id="{DA6A89A5-3970-4F75-816D-137AAA762AD1}"/>
+              </a:ext>
+            </a:extLst>
+          </p:cNvPr>
+          <p:cNvCxnSpPr>
+            <a:cxnSpLocks/>
+            <a:stCxn id="21" idx="3"/>
+            <a:endCxn id="16" idx="7"/>
+          </p:cNvCxnSpPr>
+          <p:nvPr/>
+        </p:nvCxnSpPr>
+        <p:spPr>
+          <a:xfrm flipH="1">
+            <a:off x="3940685" y="1613649"/>
+            <a:ext cx="462139" cy="508509"/>
+          </a:xfrm>
+          <a:prstGeom prst="line">
+            <a:avLst/>
+          </a:prstGeom>
+          <a:ln w="19050">
+            <a:prstDash val="dash"/>
+            <a:tailEnd type="none"/>
+          </a:ln>
+        </p:spPr>
+        <p:style>
+          <a:lnRef idx="1">
+            <a:schemeClr val="dk1"/>
+          </a:lnRef>
+          <a:fillRef idx="0">
+            <a:schemeClr val="dk1"/>
+          </a:fillRef>
+          <a:effectRef idx="0">
+            <a:schemeClr val="dk1"/>
+          </a:effectRef>
+          <a:fontRef idx="minor">
+            <a:schemeClr val="tx1"/>
+          </a:fontRef>
+        </p:style>
+      </p:cxnSp>
+      <p:sp>
+        <p:nvSpPr>
+          <p:cNvPr id="28" name="箭头: 上弧形 27">
+            <a:extLst>
+              <a:ext uri="{FF2B5EF4-FFF2-40B4-BE49-F238E27FC236}">
+                <a16:creationId xmlns:a16="http://schemas.microsoft.com/office/drawing/2014/main" id="{31881908-D61C-4859-8D2E-A0A62CF12A5E}"/>
+              </a:ext>
+            </a:extLst>
+          </p:cNvPr>
+          <p:cNvSpPr/>
+          <p:nvPr/>
+        </p:nvSpPr>
+        <p:spPr>
+          <a:xfrm>
+            <a:off x="2315159" y="1812284"/>
+            <a:ext cx="2903943" cy="1259015"/>
+          </a:xfrm>
+          <a:prstGeom prst="curvedDownArrow">
+            <a:avLst>
+              <a:gd name="adj1" fmla="val 12501"/>
+              <a:gd name="adj2" fmla="val 28055"/>
+              <a:gd name="adj3" fmla="val 22142"/>
+            </a:avLst>
+          </a:prstGeom>
+          <a:gradFill>
+            <a:gsLst>
+              <a:gs pos="0">
+                <a:srgbClr val="FF99FF"/>
+              </a:gs>
+              <a:gs pos="74000">
+                <a:schemeClr val="accent1">
+                  <a:lumMod val="45000"/>
+                  <a:lumOff val="55000"/>
+                </a:schemeClr>
+              </a:gs>
+              <a:gs pos="100000">
+                <a:srgbClr val="00B0F0"/>
+              </a:gs>
+            </a:gsLst>
+            <a:lin ang="0" scaled="0"/>
+          </a:gradFill>
+          <a:ln w="15875">
+            <a:solidFill>
+              <a:schemeClr val="dk1"/>
+            </a:solidFill>
+            <a:tailEnd type="none" w="lg" len="lg"/>
+          </a:ln>
+        </p:spPr>
+        <p:style>
+          <a:lnRef idx="1">
+            <a:schemeClr val="dk1"/>
+          </a:lnRef>
+          <a:fillRef idx="0">
+            <a:schemeClr val="dk1"/>
+          </a:fillRef>
+          <a:effectRef idx="0">
+            <a:schemeClr val="dk1"/>
+          </a:effectRef>
+          <a:fontRef idx="minor">
+            <a:schemeClr val="tx1"/>
+          </a:fontRef>
+        </p:style>
+        <p:txBody>
+          <a:bodyPr rtlCol="0" anchor="ctr"/>
+          <a:lstStyle/>
+          <a:p>
+            <a:pPr algn="ctr"/>
+            <a:endParaRPr lang="zh-CN" altLang="en-US">
+              <a:solidFill>
+                <a:schemeClr val="tx1"/>
+              </a:solidFill>
+            </a:endParaRPr>
+          </a:p>
+        </p:txBody>
+      </p:sp>
+      <p:sp>
+        <p:nvSpPr>
+          <p:cNvPr id="29" name="椭圆 28">
+            <a:extLst>
+              <a:ext uri="{FF2B5EF4-FFF2-40B4-BE49-F238E27FC236}">
+                <a16:creationId xmlns:a16="http://schemas.microsoft.com/office/drawing/2014/main" id="{63C9A7FE-504F-4756-82AE-F128FD4A937F}"/>
+              </a:ext>
+            </a:extLst>
+          </p:cNvPr>
+          <p:cNvSpPr/>
+          <p:nvPr/>
+        </p:nvSpPr>
+        <p:spPr>
+          <a:xfrm>
+            <a:off x="9047531" y="3038075"/>
+            <a:ext cx="657546" cy="657546"/>
+          </a:xfrm>
+          <a:prstGeom prst="ellipse">
+            <a:avLst/>
+          </a:prstGeom>
+          <a:solidFill>
+            <a:srgbClr val="00B0F0"/>
+          </a:solidFill>
+          <a:ln w="38100"/>
+        </p:spPr>
+        <p:style>
+          <a:lnRef idx="2">
+            <a:schemeClr val="dk1"/>
+          </a:lnRef>
+          <a:fillRef idx="1">
+            <a:schemeClr val="lt1"/>
+          </a:fillRef>
+          <a:effectRef idx="0">
+            <a:schemeClr val="dk1"/>
+          </a:effectRef>
+          <a:fontRef idx="minor">
+            <a:schemeClr val="dk1"/>
+          </a:fontRef>
+        </p:style>
+        <p:txBody>
+          <a:bodyPr rtlCol="0" anchor="ctr"/>
+          <a:lstStyle/>
+          <a:p>
+            <a:pPr algn="ctr"/>
+            <a:r>
+              <a:rPr lang="en-US" altLang="zh-CN" dirty="0">
+                <a:latin typeface="Times New Roman" panose="02020603050405020304" pitchFamily="18" charset="0"/>
+                <a:cs typeface="Times New Roman" panose="02020603050405020304" pitchFamily="18" charset="0"/>
+              </a:rPr>
+              <a:t>A</a:t>
+            </a:r>
+            <a:endParaRPr lang="zh-CN" altLang="en-US" dirty="0">
+              <a:latin typeface="Times New Roman" panose="02020603050405020304" pitchFamily="18" charset="0"/>
+              <a:cs typeface="Times New Roman" panose="02020603050405020304" pitchFamily="18" charset="0"/>
+            </a:endParaRPr>
+          </a:p>
+        </p:txBody>
+      </p:sp>
+      <p:sp>
+        <p:nvSpPr>
+          <p:cNvPr id="30" name="椭圆 29">
+            <a:extLst>
+              <a:ext uri="{FF2B5EF4-FFF2-40B4-BE49-F238E27FC236}">
+                <a16:creationId xmlns:a16="http://schemas.microsoft.com/office/drawing/2014/main" id="{63B288F0-A5E2-42C9-BB50-CB2AEDEA8942}"/>
+              </a:ext>
+            </a:extLst>
+          </p:cNvPr>
+          <p:cNvSpPr/>
+          <p:nvPr/>
+        </p:nvSpPr>
+        <p:spPr>
+          <a:xfrm>
+            <a:off x="7196487" y="3028537"/>
+            <a:ext cx="657546" cy="657546"/>
+          </a:xfrm>
+          <a:prstGeom prst="ellipse">
+            <a:avLst/>
+          </a:prstGeom>
+          <a:noFill/>
+        </p:spPr>
+        <p:style>
+          <a:lnRef idx="2">
+            <a:schemeClr val="dk1"/>
+          </a:lnRef>
+          <a:fillRef idx="1">
+            <a:schemeClr val="lt1"/>
+          </a:fillRef>
+          <a:effectRef idx="0">
+            <a:schemeClr val="dk1"/>
+          </a:effectRef>
+          <a:fontRef idx="minor">
+            <a:schemeClr val="dk1"/>
+          </a:fontRef>
+        </p:style>
+        <p:txBody>
+          <a:bodyPr rtlCol="0" anchor="ctr"/>
+          <a:lstStyle/>
+          <a:p>
+            <a:pPr algn="ctr"/>
+            <a:r>
+              <a:rPr lang="en-US" altLang="zh-CN" dirty="0">
+                <a:latin typeface="Times New Roman" panose="02020603050405020304" pitchFamily="18" charset="0"/>
+                <a:cs typeface="Times New Roman" panose="02020603050405020304" pitchFamily="18" charset="0"/>
+              </a:rPr>
+              <a:t>D</a:t>
+            </a:r>
+            <a:endParaRPr lang="zh-CN" altLang="en-US" dirty="0">
+              <a:latin typeface="Times New Roman" panose="02020603050405020304" pitchFamily="18" charset="0"/>
+              <a:cs typeface="Times New Roman" panose="02020603050405020304" pitchFamily="18" charset="0"/>
+            </a:endParaRPr>
+          </a:p>
+        </p:txBody>
+      </p:sp>
+      <p:sp>
+        <p:nvSpPr>
+          <p:cNvPr id="31" name="椭圆 30">
+            <a:extLst>
+              <a:ext uri="{FF2B5EF4-FFF2-40B4-BE49-F238E27FC236}">
+                <a16:creationId xmlns:a16="http://schemas.microsoft.com/office/drawing/2014/main" id="{9440195D-6A9A-4628-A2D9-D675E5BCAA55}"/>
+              </a:ext>
+            </a:extLst>
+          </p:cNvPr>
+          <p:cNvSpPr/>
+          <p:nvPr/>
+        </p:nvSpPr>
+        <p:spPr>
+          <a:xfrm>
+            <a:off x="8098390" y="2025863"/>
+            <a:ext cx="657546" cy="657546"/>
+          </a:xfrm>
+          <a:prstGeom prst="ellipse">
+            <a:avLst/>
+          </a:prstGeom>
+          <a:solidFill>
+            <a:srgbClr val="FF99FF"/>
+          </a:solidFill>
+        </p:spPr>
+        <p:style>
+          <a:lnRef idx="2">
+            <a:schemeClr val="dk1"/>
+          </a:lnRef>
+          <a:fillRef idx="1">
+            <a:schemeClr val="lt1"/>
+          </a:fillRef>
+          <a:effectRef idx="0">
+            <a:schemeClr val="dk1"/>
+          </a:effectRef>
+          <a:fontRef idx="minor">
+            <a:schemeClr val="dk1"/>
+          </a:fontRef>
+        </p:style>
+        <p:txBody>
+          <a:bodyPr rtlCol="0" anchor="ctr"/>
+          <a:lstStyle/>
+          <a:p>
+            <a:pPr algn="ctr"/>
+            <a:r>
+              <a:rPr lang="en-US" altLang="zh-CN" dirty="0">
+                <a:latin typeface="Times New Roman" panose="02020603050405020304" pitchFamily="18" charset="0"/>
+                <a:cs typeface="Times New Roman" panose="02020603050405020304" pitchFamily="18" charset="0"/>
+              </a:rPr>
+              <a:t>B</a:t>
+            </a:r>
+            <a:endParaRPr lang="zh-CN" altLang="en-US" dirty="0">
+              <a:latin typeface="Times New Roman" panose="02020603050405020304" pitchFamily="18" charset="0"/>
+              <a:cs typeface="Times New Roman" panose="02020603050405020304" pitchFamily="18" charset="0"/>
+            </a:endParaRPr>
+          </a:p>
+        </p:txBody>
+      </p:sp>
+      <p:sp>
+        <p:nvSpPr>
+          <p:cNvPr id="32" name="椭圆 31">
+            <a:extLst>
+              <a:ext uri="{FF2B5EF4-FFF2-40B4-BE49-F238E27FC236}">
+                <a16:creationId xmlns:a16="http://schemas.microsoft.com/office/drawing/2014/main" id="{E5A30CD8-F6B0-4AEC-A78D-886315500336}"/>
+              </a:ext>
+            </a:extLst>
+          </p:cNvPr>
+          <p:cNvSpPr/>
+          <p:nvPr/>
+        </p:nvSpPr>
+        <p:spPr>
+          <a:xfrm>
+            <a:off x="9988133" y="4125146"/>
+            <a:ext cx="657546" cy="657546"/>
+          </a:xfrm>
+          <a:prstGeom prst="ellipse">
+            <a:avLst/>
+          </a:prstGeom>
+          <a:noFill/>
+        </p:spPr>
+        <p:style>
+          <a:lnRef idx="2">
+            <a:schemeClr val="dk1"/>
+          </a:lnRef>
+          <a:fillRef idx="1">
+            <a:schemeClr val="lt1"/>
+          </a:fillRef>
+          <a:effectRef idx="0">
+            <a:schemeClr val="dk1"/>
+          </a:effectRef>
+          <a:fontRef idx="minor">
+            <a:schemeClr val="dk1"/>
+          </a:fontRef>
+        </p:style>
+        <p:txBody>
+          <a:bodyPr rtlCol="0" anchor="ctr"/>
+          <a:lstStyle/>
+          <a:p>
+            <a:pPr algn="ctr"/>
+            <a:r>
+              <a:rPr lang="en-US" altLang="zh-CN" dirty="0">
+                <a:latin typeface="Times New Roman" panose="02020603050405020304" pitchFamily="18" charset="0"/>
+                <a:cs typeface="Times New Roman" panose="02020603050405020304" pitchFamily="18" charset="0"/>
+              </a:rPr>
+              <a:t>C</a:t>
+            </a:r>
+            <a:endParaRPr lang="zh-CN" altLang="en-US" dirty="0">
+              <a:latin typeface="Times New Roman" panose="02020603050405020304" pitchFamily="18" charset="0"/>
+              <a:cs typeface="Times New Roman" panose="02020603050405020304" pitchFamily="18" charset="0"/>
+            </a:endParaRPr>
+          </a:p>
+        </p:txBody>
+      </p:sp>
+      <p:cxnSp>
+        <p:nvCxnSpPr>
+          <p:cNvPr id="33" name="直接连接符 32">
+            <a:extLst>
+              <a:ext uri="{FF2B5EF4-FFF2-40B4-BE49-F238E27FC236}">
+                <a16:creationId xmlns:a16="http://schemas.microsoft.com/office/drawing/2014/main" id="{435695B5-5777-4DD3-85E2-FBF7810102ED}"/>
+              </a:ext>
+            </a:extLst>
+          </p:cNvPr>
+          <p:cNvCxnSpPr>
+            <a:cxnSpLocks/>
+            <a:stCxn id="31" idx="5"/>
+            <a:endCxn id="29" idx="1"/>
+          </p:cNvCxnSpPr>
+          <p:nvPr/>
+        </p:nvCxnSpPr>
+        <p:spPr>
+          <a:xfrm>
+            <a:off x="8659641" y="2587114"/>
+            <a:ext cx="484185" cy="547256"/>
+          </a:xfrm>
+          <a:prstGeom prst="line">
+            <a:avLst/>
+          </a:prstGeom>
+          <a:ln w="19050">
+            <a:solidFill>
+              <a:srgbClr val="FF99FF"/>
+            </a:solidFill>
+            <a:tailEnd type="none"/>
+          </a:ln>
+        </p:spPr>
+        <p:style>
+          <a:lnRef idx="1">
+            <a:schemeClr val="dk1"/>
+          </a:lnRef>
+          <a:fillRef idx="0">
+            <a:schemeClr val="dk1"/>
+          </a:fillRef>
+          <a:effectRef idx="0">
+            <a:schemeClr val="dk1"/>
+          </a:effectRef>
+          <a:fontRef idx="minor">
+            <a:schemeClr val="tx1"/>
+          </a:fontRef>
+        </p:style>
+      </p:cxnSp>
+      <p:cxnSp>
+        <p:nvCxnSpPr>
+          <p:cNvPr id="34" name="直接连接符 33">
+            <a:extLst>
+              <a:ext uri="{FF2B5EF4-FFF2-40B4-BE49-F238E27FC236}">
+                <a16:creationId xmlns:a16="http://schemas.microsoft.com/office/drawing/2014/main" id="{73E81616-0855-4636-A57C-2B51BEE94447}"/>
+              </a:ext>
+            </a:extLst>
+          </p:cNvPr>
+          <p:cNvCxnSpPr>
+            <a:cxnSpLocks/>
+            <a:stCxn id="31" idx="3"/>
+            <a:endCxn id="30" idx="7"/>
+          </p:cNvCxnSpPr>
+          <p:nvPr/>
+        </p:nvCxnSpPr>
+        <p:spPr>
+          <a:xfrm flipH="1">
+            <a:off x="7757738" y="2587114"/>
+            <a:ext cx="436947" cy="537718"/>
+          </a:xfrm>
+          <a:prstGeom prst="line">
+            <a:avLst/>
+          </a:prstGeom>
+          <a:ln w="19050">
+            <a:tailEnd type="none"/>
+          </a:ln>
+        </p:spPr>
+        <p:style>
+          <a:lnRef idx="1">
+            <a:schemeClr val="dk1"/>
+          </a:lnRef>
+          <a:fillRef idx="0">
+            <a:schemeClr val="dk1"/>
+          </a:fillRef>
+          <a:effectRef idx="0">
+            <a:schemeClr val="dk1"/>
+          </a:effectRef>
+          <a:fontRef idx="minor">
+            <a:schemeClr val="tx1"/>
+          </a:fontRef>
+        </p:style>
+      </p:cxnSp>
+      <p:cxnSp>
+        <p:nvCxnSpPr>
+          <p:cNvPr id="35" name="直接连接符 34">
+            <a:extLst>
+              <a:ext uri="{FF2B5EF4-FFF2-40B4-BE49-F238E27FC236}">
+                <a16:creationId xmlns:a16="http://schemas.microsoft.com/office/drawing/2014/main" id="{2B84E4D1-B502-4306-A465-8D701677BB8F}"/>
+              </a:ext>
+            </a:extLst>
+          </p:cNvPr>
+          <p:cNvCxnSpPr>
+            <a:cxnSpLocks/>
+            <a:stCxn id="29" idx="5"/>
+            <a:endCxn id="32" idx="1"/>
+          </p:cNvCxnSpPr>
+          <p:nvPr/>
+        </p:nvCxnSpPr>
+        <p:spPr>
+          <a:xfrm>
+            <a:off x="9608782" y="3599326"/>
+            <a:ext cx="475646" cy="622115"/>
+          </a:xfrm>
+          <a:prstGeom prst="line">
+            <a:avLst/>
+          </a:prstGeom>
+          <a:ln w="19050">
+            <a:solidFill>
+              <a:schemeClr val="tx1"/>
+            </a:solidFill>
+            <a:tailEnd type="none"/>
+          </a:ln>
+        </p:spPr>
+        <p:style>
+          <a:lnRef idx="1">
+            <a:schemeClr val="dk1"/>
+          </a:lnRef>
+          <a:fillRef idx="0">
+            <a:schemeClr val="dk1"/>
+          </a:fillRef>
+          <a:effectRef idx="0">
+            <a:schemeClr val="dk1"/>
+          </a:effectRef>
+          <a:fontRef idx="minor">
+            <a:schemeClr val="tx1"/>
+          </a:fontRef>
+        </p:style>
+      </p:cxnSp>
+      <p:sp>
+        <p:nvSpPr>
+          <p:cNvPr id="36" name="椭圆 35">
+            <a:extLst>
+              <a:ext uri="{FF2B5EF4-FFF2-40B4-BE49-F238E27FC236}">
+                <a16:creationId xmlns:a16="http://schemas.microsoft.com/office/drawing/2014/main" id="{1A34AB2E-B6DC-4A58-833B-1040FE710109}"/>
+              </a:ext>
+            </a:extLst>
+          </p:cNvPr>
+          <p:cNvSpPr/>
+          <p:nvPr/>
+        </p:nvSpPr>
+        <p:spPr>
+          <a:xfrm>
+            <a:off x="9025485" y="1052398"/>
+            <a:ext cx="657546" cy="657546"/>
+          </a:xfrm>
+          <a:prstGeom prst="ellipse">
+            <a:avLst/>
+          </a:prstGeom>
+          <a:noFill/>
+        </p:spPr>
+        <p:style>
+          <a:lnRef idx="2">
+            <a:schemeClr val="dk1"/>
+          </a:lnRef>
+          <a:fillRef idx="1">
+            <a:schemeClr val="lt1"/>
+          </a:fillRef>
+          <a:effectRef idx="0">
+            <a:schemeClr val="dk1"/>
+          </a:effectRef>
+          <a:fontRef idx="minor">
+            <a:schemeClr val="dk1"/>
+          </a:fontRef>
+        </p:style>
+        <p:txBody>
+          <a:bodyPr rtlCol="0" anchor="ctr"/>
+          <a:lstStyle/>
+          <a:p>
+            <a:pPr algn="ctr"/>
+            <a:endParaRPr lang="zh-CN" altLang="en-US" dirty="0">
+              <a:latin typeface="Times New Roman" panose="02020603050405020304" pitchFamily="18" charset="0"/>
+              <a:cs typeface="Times New Roman" panose="02020603050405020304" pitchFamily="18" charset="0"/>
+            </a:endParaRPr>
+          </a:p>
+        </p:txBody>
+      </p:sp>
+      <p:cxnSp>
+        <p:nvCxnSpPr>
+          <p:cNvPr id="37" name="直接连接符 36">
+            <a:extLst>
+              <a:ext uri="{FF2B5EF4-FFF2-40B4-BE49-F238E27FC236}">
+                <a16:creationId xmlns:a16="http://schemas.microsoft.com/office/drawing/2014/main" id="{EE8A6B7B-12C9-4E92-BB12-F02819380874}"/>
+              </a:ext>
+            </a:extLst>
+          </p:cNvPr>
+          <p:cNvCxnSpPr>
+            <a:cxnSpLocks/>
+            <a:stCxn id="36" idx="3"/>
+            <a:endCxn id="31" idx="7"/>
+          </p:cNvCxnSpPr>
+          <p:nvPr/>
+        </p:nvCxnSpPr>
+        <p:spPr>
+          <a:xfrm flipH="1">
+            <a:off x="8659641" y="1613649"/>
+            <a:ext cx="462139" cy="508509"/>
+          </a:xfrm>
+          <a:prstGeom prst="line">
+            <a:avLst/>
+          </a:prstGeom>
+          <a:ln w="19050">
+            <a:tailEnd type="none"/>
+          </a:ln>
+        </p:spPr>
+        <p:style>
+          <a:lnRef idx="1">
+            <a:schemeClr val="dk1"/>
+          </a:lnRef>
+          <a:fillRef idx="0">
+            <a:schemeClr val="dk1"/>
+          </a:fillRef>
+          <a:effectRef idx="0">
+            <a:schemeClr val="dk1"/>
+          </a:effectRef>
+          <a:fontRef idx="minor">
+            <a:schemeClr val="tx1"/>
+          </a:fontRef>
+        </p:style>
+      </p:cxnSp>
+      <p:sp>
+        <p:nvSpPr>
+          <p:cNvPr id="44" name="椭圆 43">
+            <a:extLst>
+              <a:ext uri="{FF2B5EF4-FFF2-40B4-BE49-F238E27FC236}">
+                <a16:creationId xmlns:a16="http://schemas.microsoft.com/office/drawing/2014/main" id="{A92729C8-ADCB-4A0E-A108-C280631360A0}"/>
+              </a:ext>
+            </a:extLst>
+          </p:cNvPr>
+          <p:cNvSpPr/>
+          <p:nvPr/>
+        </p:nvSpPr>
+        <p:spPr>
+          <a:xfrm>
+            <a:off x="8118737" y="4125146"/>
+            <a:ext cx="657546" cy="657546"/>
+          </a:xfrm>
+          <a:prstGeom prst="ellipse">
+            <a:avLst/>
+          </a:prstGeom>
+          <a:solidFill>
+            <a:srgbClr val="92D050"/>
+          </a:solidFill>
+        </p:spPr>
+        <p:style>
+          <a:lnRef idx="2">
+            <a:schemeClr val="dk1"/>
+          </a:lnRef>
+          <a:fillRef idx="1">
+            <a:schemeClr val="lt1"/>
+          </a:fillRef>
+          <a:effectRef idx="0">
+            <a:schemeClr val="dk1"/>
+          </a:effectRef>
+          <a:fontRef idx="minor">
+            <a:schemeClr val="dk1"/>
+          </a:fontRef>
+        </p:style>
+        <p:txBody>
+          <a:bodyPr rtlCol="0" anchor="ctr"/>
+          <a:lstStyle/>
+          <a:p>
+            <a:pPr algn="ctr"/>
+            <a:r>
+              <a:rPr lang="en-US" altLang="zh-CN" dirty="0">
+                <a:latin typeface="Times New Roman" panose="02020603050405020304" pitchFamily="18" charset="0"/>
+                <a:cs typeface="Times New Roman" panose="02020603050405020304" pitchFamily="18" charset="0"/>
+              </a:rPr>
+              <a:t>E</a:t>
+            </a:r>
+            <a:endParaRPr lang="zh-CN" altLang="en-US" dirty="0">
+              <a:latin typeface="Times New Roman" panose="02020603050405020304" pitchFamily="18" charset="0"/>
+              <a:cs typeface="Times New Roman" panose="02020603050405020304" pitchFamily="18" charset="0"/>
+            </a:endParaRPr>
+          </a:p>
+        </p:txBody>
+      </p:sp>
+      <p:cxnSp>
+        <p:nvCxnSpPr>
+          <p:cNvPr id="45" name="直接连接符 44">
+            <a:extLst>
+              <a:ext uri="{FF2B5EF4-FFF2-40B4-BE49-F238E27FC236}">
+                <a16:creationId xmlns:a16="http://schemas.microsoft.com/office/drawing/2014/main" id="{453A9B07-A1D2-4151-98E6-7ABDA667D688}"/>
+              </a:ext>
+            </a:extLst>
+          </p:cNvPr>
+          <p:cNvCxnSpPr>
+            <a:cxnSpLocks/>
+            <a:stCxn id="29" idx="3"/>
+            <a:endCxn id="44" idx="7"/>
+          </p:cNvCxnSpPr>
+          <p:nvPr/>
+        </p:nvCxnSpPr>
+        <p:spPr>
+          <a:xfrm flipH="1">
+            <a:off x="8679988" y="3599326"/>
+            <a:ext cx="463838" cy="622115"/>
+          </a:xfrm>
+          <a:prstGeom prst="line">
+            <a:avLst/>
+          </a:prstGeom>
+          <a:ln w="19050">
+            <a:solidFill>
+              <a:srgbClr val="00B0F0"/>
+            </a:solidFill>
+            <a:tailEnd type="none"/>
+          </a:ln>
+        </p:spPr>
+        <p:style>
+          <a:lnRef idx="1">
+            <a:schemeClr val="dk1"/>
+          </a:lnRef>
+          <a:fillRef idx="0">
+            <a:schemeClr val="dk1"/>
+          </a:fillRef>
+          <a:effectRef idx="0">
+            <a:schemeClr val="dk1"/>
+          </a:effectRef>
+          <a:fontRef idx="minor">
+            <a:schemeClr val="tx1"/>
+          </a:fontRef>
+        </p:style>
+      </p:cxnSp>
+      <p:cxnSp>
+        <p:nvCxnSpPr>
+          <p:cNvPr id="50" name="连接符: 曲线 49">
+            <a:extLst>
+              <a:ext uri="{FF2B5EF4-FFF2-40B4-BE49-F238E27FC236}">
+                <a16:creationId xmlns:a16="http://schemas.microsoft.com/office/drawing/2014/main" id="{59D50A3B-8582-495F-9DB9-BB08BC23931E}"/>
+              </a:ext>
+            </a:extLst>
+          </p:cNvPr>
+          <p:cNvCxnSpPr>
+            <a:cxnSpLocks/>
+            <a:stCxn id="14" idx="0"/>
+            <a:endCxn id="16" idx="1"/>
+          </p:cNvCxnSpPr>
+          <p:nvPr/>
+        </p:nvCxnSpPr>
+        <p:spPr>
+          <a:xfrm rot="5400000" flipH="1" flipV="1">
+            <a:off x="2720967" y="2244566"/>
+            <a:ext cx="877170" cy="632354"/>
+          </a:xfrm>
+          <a:prstGeom prst="curvedConnector3">
+            <a:avLst>
+              <a:gd name="adj1" fmla="val 92363"/>
+            </a:avLst>
+          </a:prstGeom>
+          <a:ln w="31750">
+            <a:solidFill>
+              <a:srgbClr val="FF99FF"/>
+            </a:solidFill>
+            <a:prstDash val="solid"/>
+            <a:tailEnd type="triangle" w="lg" len="lg"/>
+          </a:ln>
+        </p:spPr>
+        <p:style>
+          <a:lnRef idx="1">
+            <a:schemeClr val="dk1"/>
+          </a:lnRef>
+          <a:fillRef idx="0">
+            <a:schemeClr val="dk1"/>
+          </a:fillRef>
+          <a:effectRef idx="0">
+            <a:schemeClr val="dk1"/>
+          </a:effectRef>
+          <a:fontRef idx="minor">
+            <a:schemeClr val="tx1"/>
+          </a:fontRef>
+        </p:style>
+      </p:cxnSp>
+      <p:sp>
+        <p:nvSpPr>
+          <p:cNvPr id="68" name="箭头: 右 67">
+            <a:extLst>
+              <a:ext uri="{FF2B5EF4-FFF2-40B4-BE49-F238E27FC236}">
+                <a16:creationId xmlns:a16="http://schemas.microsoft.com/office/drawing/2014/main" id="{25D916FD-E764-4208-969C-32642F6B6EFC}"/>
+              </a:ext>
+            </a:extLst>
+          </p:cNvPr>
+          <p:cNvSpPr/>
+          <p:nvPr/>
+        </p:nvSpPr>
+        <p:spPr>
+          <a:xfrm>
+            <a:off x="5743037" y="2720575"/>
+            <a:ext cx="827314" cy="328773"/>
+          </a:xfrm>
+          <a:prstGeom prst="rightArrow">
+            <a:avLst/>
+          </a:prstGeom>
+          <a:ln w="22225">
+            <a:solidFill>
+              <a:schemeClr val="tx1"/>
+            </a:solidFill>
+            <a:tailEnd type="none" w="lg" len="lg"/>
+          </a:ln>
+        </p:spPr>
+        <p:style>
+          <a:lnRef idx="1">
+            <a:schemeClr val="dk1"/>
+          </a:lnRef>
+          <a:fillRef idx="0">
+            <a:schemeClr val="dk1"/>
+          </a:fillRef>
+          <a:effectRef idx="0">
+            <a:schemeClr val="dk1"/>
+          </a:effectRef>
+          <a:fontRef idx="minor">
+            <a:schemeClr val="tx1"/>
+          </a:fontRef>
+        </p:style>
+        <p:txBody>
+          <a:bodyPr rtlCol="0" anchor="ctr"/>
+          <a:lstStyle/>
+          <a:p>
+            <a:pPr algn="ctr"/>
+            <a:endParaRPr lang="zh-CN" altLang="en-US"/>
+          </a:p>
+        </p:txBody>
+      </p:sp>
+      <p:sp>
+        <p:nvSpPr>
+          <p:cNvPr id="46" name="椭圆 45">
+            <a:extLst>
+              <a:ext uri="{FF2B5EF4-FFF2-40B4-BE49-F238E27FC236}">
+                <a16:creationId xmlns:a16="http://schemas.microsoft.com/office/drawing/2014/main" id="{C494FE5E-83D6-4650-98C0-1A1111E66515}"/>
+              </a:ext>
+            </a:extLst>
+          </p:cNvPr>
+          <p:cNvSpPr/>
+          <p:nvPr/>
+        </p:nvSpPr>
+        <p:spPr>
+          <a:xfrm>
+            <a:off x="1607248" y="4044765"/>
+            <a:ext cx="657546" cy="657546"/>
+          </a:xfrm>
+          <a:prstGeom prst="ellipse">
+            <a:avLst/>
+          </a:prstGeom>
+          <a:noFill/>
+        </p:spPr>
+        <p:style>
+          <a:lnRef idx="2">
+            <a:schemeClr val="dk1"/>
+          </a:lnRef>
+          <a:fillRef idx="1">
+            <a:schemeClr val="lt1"/>
+          </a:fillRef>
+          <a:effectRef idx="0">
+            <a:schemeClr val="dk1"/>
+          </a:effectRef>
+          <a:fontRef idx="minor">
+            <a:schemeClr val="dk1"/>
+          </a:fontRef>
+        </p:style>
+        <p:txBody>
+          <a:bodyPr rtlCol="0" anchor="ctr"/>
+          <a:lstStyle/>
+          <a:p>
+            <a:pPr algn="ctr"/>
+            <a:r>
+              <a:rPr lang="en-US" altLang="zh-CN" dirty="0">
+                <a:solidFill>
+                  <a:schemeClr val="tx1"/>
+                </a:solidFill>
+                <a:latin typeface="Times New Roman" panose="02020603050405020304" pitchFamily="18" charset="0"/>
+                <a:cs typeface="Times New Roman" panose="02020603050405020304" pitchFamily="18" charset="0"/>
+              </a:rPr>
+              <a:t>D</a:t>
+            </a:r>
+            <a:endParaRPr lang="zh-CN" altLang="en-US" dirty="0">
+              <a:solidFill>
+                <a:schemeClr val="tx1"/>
+              </a:solidFill>
+              <a:latin typeface="Times New Roman" panose="02020603050405020304" pitchFamily="18" charset="0"/>
+              <a:cs typeface="Times New Roman" panose="02020603050405020304" pitchFamily="18" charset="0"/>
+            </a:endParaRPr>
+          </a:p>
+        </p:txBody>
+      </p:sp>
+      <p:cxnSp>
+        <p:nvCxnSpPr>
+          <p:cNvPr id="47" name="直接连接符 46">
+            <a:extLst>
+              <a:ext uri="{FF2B5EF4-FFF2-40B4-BE49-F238E27FC236}">
+                <a16:creationId xmlns:a16="http://schemas.microsoft.com/office/drawing/2014/main" id="{1831767C-363A-4BC1-AFDC-80FD5C9CA43C}"/>
+              </a:ext>
+            </a:extLst>
+          </p:cNvPr>
+          <p:cNvCxnSpPr>
+            <a:cxnSpLocks/>
+            <a:stCxn id="14" idx="3"/>
+            <a:endCxn id="46" idx="7"/>
+          </p:cNvCxnSpPr>
+          <p:nvPr/>
+        </p:nvCxnSpPr>
+        <p:spPr>
+          <a:xfrm flipH="1">
+            <a:off x="2168499" y="3560579"/>
+            <a:ext cx="442398" cy="580481"/>
+          </a:xfrm>
+          <a:prstGeom prst="line">
+            <a:avLst/>
+          </a:prstGeom>
+          <a:ln w="19050">
+            <a:solidFill>
+              <a:schemeClr val="tx1"/>
+            </a:solidFill>
+            <a:prstDash val="solid"/>
+            <a:tailEnd type="none"/>
+          </a:ln>
+        </p:spPr>
+        <p:style>
+          <a:lnRef idx="1">
+            <a:schemeClr val="dk1"/>
+          </a:lnRef>
+          <a:fillRef idx="0">
+            <a:schemeClr val="dk1"/>
+          </a:fillRef>
+          <a:effectRef idx="0">
+            <a:schemeClr val="dk1"/>
+          </a:effectRef>
+          <a:fontRef idx="minor">
+            <a:schemeClr val="tx1"/>
+          </a:fontRef>
+        </p:style>
+      </p:cxnSp>
+      <p:sp>
+        <p:nvSpPr>
+          <p:cNvPr id="48" name="椭圆 47">
+            <a:extLst>
+              <a:ext uri="{FF2B5EF4-FFF2-40B4-BE49-F238E27FC236}">
+                <a16:creationId xmlns:a16="http://schemas.microsoft.com/office/drawing/2014/main" id="{EB945E0B-01D8-49C5-8875-FA4DFE8632DB}"/>
+              </a:ext>
+            </a:extLst>
+          </p:cNvPr>
+          <p:cNvSpPr/>
+          <p:nvPr/>
+        </p:nvSpPr>
+        <p:spPr>
+          <a:xfrm>
+            <a:off x="3354677" y="4044765"/>
+            <a:ext cx="657546" cy="657546"/>
+          </a:xfrm>
+          <a:prstGeom prst="ellipse">
+            <a:avLst/>
+          </a:prstGeom>
+          <a:solidFill>
+            <a:srgbClr val="92D050"/>
+          </a:solidFill>
+          <a:ln>
+            <a:solidFill>
+              <a:schemeClr val="tx1"/>
+            </a:solidFill>
+          </a:ln>
+        </p:spPr>
+        <p:style>
+          <a:lnRef idx="2">
+            <a:schemeClr val="dk1"/>
+          </a:lnRef>
+          <a:fillRef idx="1">
+            <a:schemeClr val="lt1"/>
+          </a:fillRef>
+          <a:effectRef idx="0">
+            <a:schemeClr val="dk1"/>
+          </a:effectRef>
+          <a:fontRef idx="minor">
+            <a:schemeClr val="dk1"/>
+          </a:fontRef>
+        </p:style>
+        <p:txBody>
+          <a:bodyPr rtlCol="0" anchor="ctr"/>
+          <a:lstStyle/>
+          <a:p>
+            <a:pPr algn="ctr"/>
+            <a:r>
+              <a:rPr lang="en-US" altLang="zh-CN" dirty="0">
+                <a:latin typeface="Times New Roman" panose="02020603050405020304" pitchFamily="18" charset="0"/>
+                <a:cs typeface="Times New Roman" panose="02020603050405020304" pitchFamily="18" charset="0"/>
+              </a:rPr>
+              <a:t>E</a:t>
+            </a:r>
+            <a:endParaRPr lang="zh-CN" altLang="en-US" dirty="0">
+              <a:latin typeface="Times New Roman" panose="02020603050405020304" pitchFamily="18" charset="0"/>
+              <a:cs typeface="Times New Roman" panose="02020603050405020304" pitchFamily="18" charset="0"/>
+            </a:endParaRPr>
+          </a:p>
+        </p:txBody>
+      </p:sp>
+      <p:cxnSp>
+        <p:nvCxnSpPr>
+          <p:cNvPr id="49" name="直接连接符 48">
+            <a:extLst>
+              <a:ext uri="{FF2B5EF4-FFF2-40B4-BE49-F238E27FC236}">
+                <a16:creationId xmlns:a16="http://schemas.microsoft.com/office/drawing/2014/main" id="{51301789-F90D-4612-8F68-15627E0AD627}"/>
+              </a:ext>
+            </a:extLst>
+          </p:cNvPr>
+          <p:cNvCxnSpPr>
+            <a:cxnSpLocks/>
+            <a:stCxn id="14" idx="5"/>
+            <a:endCxn id="48" idx="1"/>
+          </p:cNvCxnSpPr>
+          <p:nvPr/>
+        </p:nvCxnSpPr>
+        <p:spPr>
+          <a:xfrm>
+            <a:off x="3075853" y="3560579"/>
+            <a:ext cx="375119" cy="580481"/>
+          </a:xfrm>
+          <a:prstGeom prst="line">
+            <a:avLst/>
+          </a:prstGeom>
+          <a:ln w="19050">
+            <a:solidFill>
+              <a:srgbClr val="FF99FF"/>
+            </a:solidFill>
+            <a:prstDash val="dash"/>
+            <a:tailEnd type="none"/>
+          </a:ln>
+        </p:spPr>
+        <p:style>
+          <a:lnRef idx="1">
+            <a:schemeClr val="dk1"/>
+          </a:lnRef>
+          <a:fillRef idx="0">
+            <a:schemeClr val="dk1"/>
+          </a:fillRef>
+          <a:effectRef idx="0">
+            <a:schemeClr val="dk1"/>
+          </a:effectRef>
+          <a:fontRef idx="minor">
+            <a:schemeClr val="tx1"/>
+          </a:fontRef>
+        </p:style>
+      </p:cxnSp>
+      <p:cxnSp>
+        <p:nvCxnSpPr>
+          <p:cNvPr id="55" name="连接符: 曲线 54">
+            <a:extLst>
+              <a:ext uri="{FF2B5EF4-FFF2-40B4-BE49-F238E27FC236}">
+                <a16:creationId xmlns:a16="http://schemas.microsoft.com/office/drawing/2014/main" id="{FA46F0E9-DDD1-497D-85B4-C215BD6E04DB}"/>
+              </a:ext>
+            </a:extLst>
+          </p:cNvPr>
+          <p:cNvCxnSpPr>
+            <a:cxnSpLocks/>
+            <a:stCxn id="16" idx="3"/>
+            <a:endCxn id="48" idx="7"/>
+          </p:cNvCxnSpPr>
+          <p:nvPr/>
+        </p:nvCxnSpPr>
+        <p:spPr>
+          <a:xfrm rot="16200000" flipH="1">
+            <a:off x="2918855" y="3143987"/>
+            <a:ext cx="1553946" cy="440199"/>
+          </a:xfrm>
+          <a:prstGeom prst="curvedConnector3">
+            <a:avLst>
+              <a:gd name="adj1" fmla="val 50000"/>
+            </a:avLst>
+          </a:prstGeom>
+          <a:ln w="31750">
+            <a:solidFill>
+              <a:srgbClr val="00B0F0"/>
+            </a:solidFill>
+            <a:prstDash val="solid"/>
+            <a:tailEnd type="triangle" w="lg" len="lg"/>
+          </a:ln>
+        </p:spPr>
+        <p:style>
+          <a:lnRef idx="1">
+            <a:schemeClr val="dk1"/>
+          </a:lnRef>
+          <a:fillRef idx="0">
+            <a:schemeClr val="dk1"/>
+          </a:fillRef>
+          <a:effectRef idx="0">
+            <a:schemeClr val="dk1"/>
+          </a:effectRef>
+          <a:fontRef idx="minor">
+            <a:schemeClr val="tx1"/>
+          </a:fontRef>
+        </p:style>
+      </p:cxnSp>
+      <p:sp>
+        <p:nvSpPr>
+          <p:cNvPr id="60" name="箭头: 上弧形 59">
+            <a:extLst>
+              <a:ext uri="{FF2B5EF4-FFF2-40B4-BE49-F238E27FC236}">
+                <a16:creationId xmlns:a16="http://schemas.microsoft.com/office/drawing/2014/main" id="{4729DA27-CEC2-468E-A09B-D394EE2B0CB3}"/>
+              </a:ext>
+            </a:extLst>
+          </p:cNvPr>
+          <p:cNvSpPr/>
+          <p:nvPr/>
+        </p:nvSpPr>
+        <p:spPr>
+          <a:xfrm>
+            <a:off x="8599416" y="2738650"/>
+            <a:ext cx="1629595" cy="711639"/>
+          </a:xfrm>
+          <a:prstGeom prst="curvedDownArrow">
+            <a:avLst>
+              <a:gd name="adj1" fmla="val 12501"/>
+              <a:gd name="adj2" fmla="val 28055"/>
+              <a:gd name="adj3" fmla="val 22142"/>
+            </a:avLst>
+          </a:prstGeom>
+          <a:gradFill>
+            <a:gsLst>
+              <a:gs pos="0">
+                <a:srgbClr val="FF99FF"/>
+              </a:gs>
+              <a:gs pos="74000">
+                <a:schemeClr val="accent1">
+                  <a:lumMod val="45000"/>
+                  <a:lumOff val="55000"/>
+                </a:schemeClr>
+              </a:gs>
+              <a:gs pos="100000">
+                <a:srgbClr val="00B0F0"/>
+              </a:gs>
+            </a:gsLst>
+            <a:lin ang="0" scaled="0"/>
+          </a:gradFill>
+          <a:ln w="15875">
+            <a:solidFill>
+              <a:schemeClr val="dk1"/>
+            </a:solidFill>
+            <a:tailEnd type="none" w="lg" len="lg"/>
+          </a:ln>
+        </p:spPr>
+        <p:style>
+          <a:lnRef idx="1">
+            <a:schemeClr val="dk1"/>
+          </a:lnRef>
+          <a:fillRef idx="0">
+            <a:schemeClr val="dk1"/>
+          </a:fillRef>
+          <a:effectRef idx="0">
+            <a:schemeClr val="dk1"/>
+          </a:effectRef>
+          <a:fontRef idx="minor">
+            <a:schemeClr val="tx1"/>
+          </a:fontRef>
+        </p:style>
+        <p:txBody>
+          <a:bodyPr rtlCol="0" anchor="ctr"/>
+          <a:lstStyle/>
+          <a:p>
+            <a:pPr algn="ctr"/>
+            <a:endParaRPr lang="zh-CN" altLang="en-US">
+              <a:solidFill>
+                <a:schemeClr val="tx1"/>
+              </a:solidFill>
+            </a:endParaRPr>
+          </a:p>
+        </p:txBody>
+      </p:sp>
+    </p:spTree>
+    <p:extLst>
+      <p:ext uri="{BB962C8B-B14F-4D97-AF65-F5344CB8AC3E}">
+        <p14:creationId xmlns:p14="http://schemas.microsoft.com/office/powerpoint/2010/main" val="2306875219"/>
+      </p:ext>
+    </p:extLst>
+  </p:cSld>
+  <p:clrMapOvr>
+    <a:masterClrMapping/>
+  </p:clrMapOvr>
+</p:sld>
+</file>
+
 <file path=ppt/theme/theme1.xml><?xml version="1.0" encoding="utf-8"?>
 <a:theme xmlns:a="http://schemas.openxmlformats.org/drawingml/2006/main" name="Office 主题">
   <a:themeElements>

</xml_diff>

<commit_message>
+ Add some tcp problems
</commit_message>
<xml_diff>
--- a/后台开发面经_示意图.pptx
+++ b/后台开发面经_示意图.pptx
@@ -201,7 +201,7 @@
           <a:p>
             <a:fld id="{BBE84FB9-738E-406C-B12B-1B1469D7165C}" type="datetimeFigureOut">
               <a:rPr lang="zh-CN" altLang="en-US" smtClean="0"/>
-              <a:t>2021/3/6</a:t>
+              <a:t>2021/3/7</a:t>
             </a:fld>
             <a:endParaRPr lang="zh-CN" altLang="en-US"/>
           </a:p>
@@ -1044,7 +1044,7 @@
           <a:p>
             <a:fld id="{D997B5FA-0921-464F-AAE1-844C04324D75}" type="datetimeFigureOut">
               <a:rPr lang="zh-CN" altLang="en-US" smtClean="0"/>
-              <a:t>2021/3/6</a:t>
+              <a:t>2021/3/7</a:t>
             </a:fld>
             <a:endParaRPr lang="zh-CN" altLang="en-US"/>
           </a:p>
@@ -1212,7 +1212,7 @@
           <a:p>
             <a:fld id="{D997B5FA-0921-464F-AAE1-844C04324D75}" type="datetimeFigureOut">
               <a:rPr lang="zh-CN" altLang="en-US" smtClean="0"/>
-              <a:t>2021/3/6</a:t>
+              <a:t>2021/3/7</a:t>
             </a:fld>
             <a:endParaRPr lang="zh-CN" altLang="en-US"/>
           </a:p>
@@ -1390,7 +1390,7 @@
           <a:p>
             <a:fld id="{D997B5FA-0921-464F-AAE1-844C04324D75}" type="datetimeFigureOut">
               <a:rPr lang="zh-CN" altLang="en-US" smtClean="0"/>
-              <a:t>2021/3/6</a:t>
+              <a:t>2021/3/7</a:t>
             </a:fld>
             <a:endParaRPr lang="zh-CN" altLang="en-US"/>
           </a:p>
@@ -1558,7 +1558,7 @@
           <a:p>
             <a:fld id="{D997B5FA-0921-464F-AAE1-844C04324D75}" type="datetimeFigureOut">
               <a:rPr lang="zh-CN" altLang="en-US" smtClean="0"/>
-              <a:t>2021/3/6</a:t>
+              <a:t>2021/3/7</a:t>
             </a:fld>
             <a:endParaRPr lang="zh-CN" altLang="en-US"/>
           </a:p>
@@ -1803,7 +1803,7 @@
           <a:p>
             <a:fld id="{D997B5FA-0921-464F-AAE1-844C04324D75}" type="datetimeFigureOut">
               <a:rPr lang="zh-CN" altLang="en-US" smtClean="0"/>
-              <a:t>2021/3/6</a:t>
+              <a:t>2021/3/7</a:t>
             </a:fld>
             <a:endParaRPr lang="zh-CN" altLang="en-US"/>
           </a:p>
@@ -2032,7 +2032,7 @@
           <a:p>
             <a:fld id="{D997B5FA-0921-464F-AAE1-844C04324D75}" type="datetimeFigureOut">
               <a:rPr lang="zh-CN" altLang="en-US" smtClean="0"/>
-              <a:t>2021/3/6</a:t>
+              <a:t>2021/3/7</a:t>
             </a:fld>
             <a:endParaRPr lang="zh-CN" altLang="en-US"/>
           </a:p>
@@ -2396,7 +2396,7 @@
           <a:p>
             <a:fld id="{D997B5FA-0921-464F-AAE1-844C04324D75}" type="datetimeFigureOut">
               <a:rPr lang="zh-CN" altLang="en-US" smtClean="0"/>
-              <a:t>2021/3/6</a:t>
+              <a:t>2021/3/7</a:t>
             </a:fld>
             <a:endParaRPr lang="zh-CN" altLang="en-US"/>
           </a:p>
@@ -2513,7 +2513,7 @@
           <a:p>
             <a:fld id="{D997B5FA-0921-464F-AAE1-844C04324D75}" type="datetimeFigureOut">
               <a:rPr lang="zh-CN" altLang="en-US" smtClean="0"/>
-              <a:t>2021/3/6</a:t>
+              <a:t>2021/3/7</a:t>
             </a:fld>
             <a:endParaRPr lang="zh-CN" altLang="en-US"/>
           </a:p>
@@ -2608,7 +2608,7 @@
           <a:p>
             <a:fld id="{D997B5FA-0921-464F-AAE1-844C04324D75}" type="datetimeFigureOut">
               <a:rPr lang="zh-CN" altLang="en-US" smtClean="0"/>
-              <a:t>2021/3/6</a:t>
+              <a:t>2021/3/7</a:t>
             </a:fld>
             <a:endParaRPr lang="zh-CN" altLang="en-US"/>
           </a:p>
@@ -2883,7 +2883,7 @@
           <a:p>
             <a:fld id="{D997B5FA-0921-464F-AAE1-844C04324D75}" type="datetimeFigureOut">
               <a:rPr lang="zh-CN" altLang="en-US" smtClean="0"/>
-              <a:t>2021/3/6</a:t>
+              <a:t>2021/3/7</a:t>
             </a:fld>
             <a:endParaRPr lang="zh-CN" altLang="en-US"/>
           </a:p>
@@ -3135,7 +3135,7 @@
           <a:p>
             <a:fld id="{D997B5FA-0921-464F-AAE1-844C04324D75}" type="datetimeFigureOut">
               <a:rPr lang="zh-CN" altLang="en-US" smtClean="0"/>
-              <a:t>2021/3/6</a:t>
+              <a:t>2021/3/7</a:t>
             </a:fld>
             <a:endParaRPr lang="zh-CN" altLang="en-US"/>
           </a:p>
@@ -3346,7 +3346,7 @@
           <a:p>
             <a:fld id="{D997B5FA-0921-464F-AAE1-844C04324D75}" type="datetimeFigureOut">
               <a:rPr lang="zh-CN" altLang="en-US" smtClean="0"/>
-              <a:t>2021/3/6</a:t>
+              <a:t>2021/3/7</a:t>
             </a:fld>
             <a:endParaRPr lang="zh-CN" altLang="en-US"/>
           </a:p>
@@ -9592,8 +9592,8 @@
         </p:nvSpPr>
         <p:spPr>
           <a:xfrm>
-            <a:off x="9541" y="4784468"/>
-            <a:ext cx="832279" cy="369332"/>
+            <a:off x="-501316" y="4768301"/>
+            <a:ext cx="1293944" cy="369332"/>
           </a:xfrm>
           <a:prstGeom prst="rect">
             <a:avLst/>
@@ -9606,6 +9606,13 @@
           </a:bodyPr>
           <a:lstStyle/>
           <a:p>
+            <a:r>
+              <a:rPr lang="zh-CN" altLang="en-US" dirty="0">
+                <a:latin typeface="Times New Roman" panose="02020603050405020304" pitchFamily="18" charset="0"/>
+                <a:ea typeface="宋体" panose="02010600030101010101" pitchFamily="2" charset="-122"/>
+              </a:rPr>
+              <a:t>等待</a:t>
+            </a:r>
             <a:r>
               <a:rPr lang="en-US" altLang="zh-CN" dirty="0">
                 <a:latin typeface="Times New Roman" panose="02020603050405020304" pitchFamily="18" charset="0"/>
@@ -9758,8 +9765,8 @@
         </p:nvSpPr>
         <p:spPr>
           <a:xfrm>
-            <a:off x="4532303" y="796637"/>
-            <a:ext cx="1210588" cy="400110"/>
+            <a:off x="4704171" y="876317"/>
+            <a:ext cx="902811" cy="307777"/>
           </a:xfrm>
           <a:prstGeom prst="rect">
             <a:avLst/>
@@ -9774,7 +9781,88 @@
           <a:p>
             <a:pPr algn="ctr"/>
             <a:r>
-              <a:rPr lang="zh-CN" altLang="en-US" sz="2000" dirty="0">
+              <a:rPr lang="zh-CN" altLang="en-US" sz="1400" dirty="0">
+                <a:latin typeface="Times New Roman" panose="02020603050405020304" pitchFamily="18" charset="0"/>
+                <a:ea typeface="宋体" panose="02010600030101010101" pitchFamily="2" charset="-122"/>
+              </a:rPr>
+              <a:t>数据传输</a:t>
+            </a:r>
+          </a:p>
+        </p:txBody>
+      </p:sp>
+      <p:cxnSp>
+        <p:nvCxnSpPr>
+          <p:cNvPr id="28" name="直接箭头连接符 27">
+            <a:extLst>
+              <a:ext uri="{FF2B5EF4-FFF2-40B4-BE49-F238E27FC236}">
+                <a16:creationId xmlns:a16="http://schemas.microsoft.com/office/drawing/2014/main" id="{0B9E8F90-658D-42CC-A7E9-C030066B3AFD}"/>
+              </a:ext>
+            </a:extLst>
+          </p:cNvPr>
+          <p:cNvCxnSpPr>
+            <a:cxnSpLocks/>
+          </p:cNvCxnSpPr>
+          <p:nvPr/>
+        </p:nvCxnSpPr>
+        <p:spPr>
+          <a:xfrm flipV="1">
+            <a:off x="4461672" y="3192712"/>
+            <a:ext cx="1452463" cy="258297"/>
+          </a:xfrm>
+          <a:prstGeom prst="straightConnector1">
+            <a:avLst/>
+          </a:prstGeom>
+          <a:ln w="31750">
+            <a:headEnd type="triangle" w="lg" len="lg"/>
+            <a:tailEnd type="none" w="lg" len="lg"/>
+          </a:ln>
+        </p:spPr>
+        <p:style>
+          <a:lnRef idx="1">
+            <a:schemeClr val="dk1"/>
+          </a:lnRef>
+          <a:fillRef idx="0">
+            <a:schemeClr val="dk1"/>
+          </a:fillRef>
+          <a:effectRef idx="0">
+            <a:schemeClr val="dk1"/>
+          </a:effectRef>
+          <a:fontRef idx="minor">
+            <a:schemeClr val="tx1"/>
+          </a:fontRef>
+        </p:style>
+      </p:cxnSp>
+      <p:sp>
+        <p:nvSpPr>
+          <p:cNvPr id="29" name="文本框 28">
+            <a:extLst>
+              <a:ext uri="{FF2B5EF4-FFF2-40B4-BE49-F238E27FC236}">
+                <a16:creationId xmlns:a16="http://schemas.microsoft.com/office/drawing/2014/main" id="{7F1A291D-9333-46D9-9012-3B7809853000}"/>
+              </a:ext>
+            </a:extLst>
+          </p:cNvPr>
+          <p:cNvSpPr txBox="1"/>
+          <p:nvPr/>
+        </p:nvSpPr>
+        <p:spPr>
+          <a:xfrm rot="21009233">
+            <a:off x="4723838" y="3007879"/>
+            <a:ext cx="902811" cy="307777"/>
+          </a:xfrm>
+          <a:prstGeom prst="rect">
+            <a:avLst/>
+          </a:prstGeom>
+          <a:noFill/>
+        </p:spPr>
+        <p:txBody>
+          <a:bodyPr wrap="none" rtlCol="0">
+            <a:spAutoFit/>
+          </a:bodyPr>
+          <a:lstStyle/>
+          <a:p>
+            <a:pPr algn="ctr"/>
+            <a:r>
+              <a:rPr lang="zh-CN" altLang="en-US" sz="1400" dirty="0">
                 <a:latin typeface="Times New Roman" panose="02020603050405020304" pitchFamily="18" charset="0"/>
                 <a:ea typeface="宋体" panose="02010600030101010101" pitchFamily="2" charset="-122"/>
               </a:rPr>

</xml_diff>

<commit_message>
+ Add network problems
</commit_message>
<xml_diff>
--- a/后台开发面经_示意图.pptx
+++ b/后台开发面经_示意图.pptx
@@ -5,7 +5,7 @@
     <p:sldMasterId id="2147483648" r:id="rId1"/>
   </p:sldMasterIdLst>
   <p:notesMasterIdLst>
-    <p:notesMasterId r:id="rId8"/>
+    <p:notesMasterId r:id="rId9"/>
   </p:notesMasterIdLst>
   <p:sldIdLst>
     <p:sldId id="257" r:id="rId2"/>
@@ -14,6 +14,7 @@
     <p:sldId id="260" r:id="rId5"/>
     <p:sldId id="261" r:id="rId6"/>
     <p:sldId id="262" r:id="rId7"/>
+    <p:sldId id="263" r:id="rId8"/>
   </p:sldIdLst>
   <p:sldSz cx="12192000" cy="6858000"/>
   <p:notesSz cx="6858000" cy="9144000"/>
@@ -202,7 +203,7 @@
           <a:p>
             <a:fld id="{BBE84FB9-738E-406C-B12B-1B1469D7165C}" type="datetimeFigureOut">
               <a:rPr lang="zh-CN" altLang="en-US" smtClean="0"/>
-              <a:t>2021/3/18</a:t>
+              <a:t>2021/3/19</a:t>
             </a:fld>
             <a:endParaRPr lang="zh-CN" altLang="en-US"/>
           </a:p>
@@ -1004,6 +1005,105 @@
 </p:notes>
 </file>
 
+<file path=ppt/notesSlides/notesSlide7.xml><?xml version="1.0" encoding="utf-8"?>
+<p:notes xmlns:a="http://schemas.openxmlformats.org/drawingml/2006/main" xmlns:r="http://schemas.openxmlformats.org/officeDocument/2006/relationships" xmlns:p="http://schemas.openxmlformats.org/presentationml/2006/main">
+  <p:cSld>
+    <p:spTree>
+      <p:nvGrpSpPr>
+        <p:cNvPr id="1" name=""/>
+        <p:cNvGrpSpPr/>
+        <p:nvPr/>
+      </p:nvGrpSpPr>
+      <p:grpSpPr>
+        <a:xfrm>
+          <a:off x="0" y="0"/>
+          <a:ext cx="0" cy="0"/>
+          <a:chOff x="0" y="0"/>
+          <a:chExt cx="0" cy="0"/>
+        </a:xfrm>
+      </p:grpSpPr>
+      <p:sp>
+        <p:nvSpPr>
+          <p:cNvPr id="2" name="幻灯片图像占位符 1"/>
+          <p:cNvSpPr>
+            <a:spLocks noGrp="1" noRot="1" noChangeAspect="1"/>
+          </p:cNvSpPr>
+          <p:nvPr>
+            <p:ph type="sldImg"/>
+          </p:nvPr>
+        </p:nvSpPr>
+        <p:spPr/>
+      </p:sp>
+      <p:sp>
+        <p:nvSpPr>
+          <p:cNvPr id="3" name="备注占位符 2"/>
+          <p:cNvSpPr>
+            <a:spLocks noGrp="1"/>
+          </p:cNvSpPr>
+          <p:nvPr>
+            <p:ph type="body" idx="1"/>
+          </p:nvPr>
+        </p:nvSpPr>
+        <p:spPr/>
+        <p:txBody>
+          <a:bodyPr/>
+          <a:lstStyle/>
+          <a:p>
+            <a:r>
+              <a:rPr lang="en-US" altLang="zh-CN" dirty="0"/>
+              <a:t>OSI </a:t>
+            </a:r>
+            <a:r>
+              <a:rPr lang="zh-CN" altLang="en-US" dirty="0"/>
+              <a:t>七层模型 </a:t>
+            </a:r>
+            <a:r>
+              <a:rPr lang="en-US" altLang="zh-CN" dirty="0"/>
+              <a:t>vs TCP/IP </a:t>
+            </a:r>
+            <a:r>
+              <a:rPr lang="zh-CN" altLang="en-US" dirty="0"/>
+              <a:t>四层模型</a:t>
+            </a:r>
+          </a:p>
+        </p:txBody>
+      </p:sp>
+      <p:sp>
+        <p:nvSpPr>
+          <p:cNvPr id="4" name="灯片编号占位符 3"/>
+          <p:cNvSpPr>
+            <a:spLocks noGrp="1"/>
+          </p:cNvSpPr>
+          <p:nvPr>
+            <p:ph type="sldNum" sz="quarter" idx="5"/>
+          </p:nvPr>
+        </p:nvSpPr>
+        <p:spPr/>
+        <p:txBody>
+          <a:bodyPr/>
+          <a:lstStyle/>
+          <a:p>
+            <a:fld id="{3A352CEF-0789-4229-9EE3-2FF61603D4BF}" type="slidenum">
+              <a:rPr lang="zh-CN" altLang="en-US" smtClean="0"/>
+              <a:t>7</a:t>
+            </a:fld>
+            <a:endParaRPr lang="zh-CN" altLang="en-US"/>
+          </a:p>
+        </p:txBody>
+      </p:sp>
+    </p:spTree>
+    <p:extLst>
+      <p:ext uri="{BB962C8B-B14F-4D97-AF65-F5344CB8AC3E}">
+        <p14:creationId xmlns:p14="http://schemas.microsoft.com/office/powerpoint/2010/main" val="1691433293"/>
+      </p:ext>
+    </p:extLst>
+  </p:cSld>
+  <p:clrMapOvr>
+    <a:masterClrMapping/>
+  </p:clrMapOvr>
+</p:notes>
+</file>
+
 <file path=ppt/slideLayouts/slideLayout1.xml><?xml version="1.0" encoding="utf-8"?>
 <p:sldLayout xmlns:a="http://schemas.openxmlformats.org/drawingml/2006/main" xmlns:r="http://schemas.openxmlformats.org/officeDocument/2006/relationships" xmlns:p="http://schemas.openxmlformats.org/presentationml/2006/main" type="title" preserve="1">
   <p:cSld name="标题幻灯片">
@@ -1133,7 +1233,7 @@
           <a:p>
             <a:fld id="{D997B5FA-0921-464F-AAE1-844C04324D75}" type="datetimeFigureOut">
               <a:rPr lang="zh-CN" altLang="en-US" smtClean="0"/>
-              <a:t>2021/3/18</a:t>
+              <a:t>2021/3/19</a:t>
             </a:fld>
             <a:endParaRPr lang="zh-CN" altLang="en-US"/>
           </a:p>
@@ -1301,7 +1401,7 @@
           <a:p>
             <a:fld id="{D997B5FA-0921-464F-AAE1-844C04324D75}" type="datetimeFigureOut">
               <a:rPr lang="zh-CN" altLang="en-US" smtClean="0"/>
-              <a:t>2021/3/18</a:t>
+              <a:t>2021/3/19</a:t>
             </a:fld>
             <a:endParaRPr lang="zh-CN" altLang="en-US"/>
           </a:p>
@@ -1479,7 +1579,7 @@
           <a:p>
             <a:fld id="{D997B5FA-0921-464F-AAE1-844C04324D75}" type="datetimeFigureOut">
               <a:rPr lang="zh-CN" altLang="en-US" smtClean="0"/>
-              <a:t>2021/3/18</a:t>
+              <a:t>2021/3/19</a:t>
             </a:fld>
             <a:endParaRPr lang="zh-CN" altLang="en-US"/>
           </a:p>
@@ -1647,7 +1747,7 @@
           <a:p>
             <a:fld id="{D997B5FA-0921-464F-AAE1-844C04324D75}" type="datetimeFigureOut">
               <a:rPr lang="zh-CN" altLang="en-US" smtClean="0"/>
-              <a:t>2021/3/18</a:t>
+              <a:t>2021/3/19</a:t>
             </a:fld>
             <a:endParaRPr lang="zh-CN" altLang="en-US"/>
           </a:p>
@@ -1892,7 +1992,7 @@
           <a:p>
             <a:fld id="{D997B5FA-0921-464F-AAE1-844C04324D75}" type="datetimeFigureOut">
               <a:rPr lang="zh-CN" altLang="en-US" smtClean="0"/>
-              <a:t>2021/3/18</a:t>
+              <a:t>2021/3/19</a:t>
             </a:fld>
             <a:endParaRPr lang="zh-CN" altLang="en-US"/>
           </a:p>
@@ -2121,7 +2221,7 @@
           <a:p>
             <a:fld id="{D997B5FA-0921-464F-AAE1-844C04324D75}" type="datetimeFigureOut">
               <a:rPr lang="zh-CN" altLang="en-US" smtClean="0"/>
-              <a:t>2021/3/18</a:t>
+              <a:t>2021/3/19</a:t>
             </a:fld>
             <a:endParaRPr lang="zh-CN" altLang="en-US"/>
           </a:p>
@@ -2485,7 +2585,7 @@
           <a:p>
             <a:fld id="{D997B5FA-0921-464F-AAE1-844C04324D75}" type="datetimeFigureOut">
               <a:rPr lang="zh-CN" altLang="en-US" smtClean="0"/>
-              <a:t>2021/3/18</a:t>
+              <a:t>2021/3/19</a:t>
             </a:fld>
             <a:endParaRPr lang="zh-CN" altLang="en-US"/>
           </a:p>
@@ -2602,7 +2702,7 @@
           <a:p>
             <a:fld id="{D997B5FA-0921-464F-AAE1-844C04324D75}" type="datetimeFigureOut">
               <a:rPr lang="zh-CN" altLang="en-US" smtClean="0"/>
-              <a:t>2021/3/18</a:t>
+              <a:t>2021/3/19</a:t>
             </a:fld>
             <a:endParaRPr lang="zh-CN" altLang="en-US"/>
           </a:p>
@@ -2697,7 +2797,7 @@
           <a:p>
             <a:fld id="{D997B5FA-0921-464F-AAE1-844C04324D75}" type="datetimeFigureOut">
               <a:rPr lang="zh-CN" altLang="en-US" smtClean="0"/>
-              <a:t>2021/3/18</a:t>
+              <a:t>2021/3/19</a:t>
             </a:fld>
             <a:endParaRPr lang="zh-CN" altLang="en-US"/>
           </a:p>
@@ -2972,7 +3072,7 @@
           <a:p>
             <a:fld id="{D997B5FA-0921-464F-AAE1-844C04324D75}" type="datetimeFigureOut">
               <a:rPr lang="zh-CN" altLang="en-US" smtClean="0"/>
-              <a:t>2021/3/18</a:t>
+              <a:t>2021/3/19</a:t>
             </a:fld>
             <a:endParaRPr lang="zh-CN" altLang="en-US"/>
           </a:p>
@@ -3224,7 +3324,7 @@
           <a:p>
             <a:fld id="{D997B5FA-0921-464F-AAE1-844C04324D75}" type="datetimeFigureOut">
               <a:rPr lang="zh-CN" altLang="en-US" smtClean="0"/>
-              <a:t>2021/3/18</a:t>
+              <a:t>2021/3/19</a:t>
             </a:fld>
             <a:endParaRPr lang="zh-CN" altLang="en-US"/>
           </a:p>
@@ -3435,7 +3535,7 @@
           <a:p>
             <a:fld id="{D997B5FA-0921-464F-AAE1-844C04324D75}" type="datetimeFigureOut">
               <a:rPr lang="zh-CN" altLang="en-US" smtClean="0"/>
-              <a:t>2021/3/18</a:t>
+              <a:t>2021/3/19</a:t>
             </a:fld>
             <a:endParaRPr lang="zh-CN" altLang="en-US"/>
           </a:p>
@@ -14035,6 +14135,83 @@
 </p:sld>
 </file>
 
+<file path=ppt/slides/slide7.xml><?xml version="1.0" encoding="utf-8"?>
+<p:sld xmlns:a="http://schemas.openxmlformats.org/drawingml/2006/main" xmlns:r="http://schemas.openxmlformats.org/officeDocument/2006/relationships" xmlns:p="http://schemas.openxmlformats.org/presentationml/2006/main">
+  <p:cSld>
+    <p:spTree>
+      <p:nvGrpSpPr>
+        <p:cNvPr id="1" name=""/>
+        <p:cNvGrpSpPr/>
+        <p:nvPr/>
+      </p:nvGrpSpPr>
+      <p:grpSpPr>
+        <a:xfrm>
+          <a:off x="0" y="0"/>
+          <a:ext cx="0" cy="0"/>
+          <a:chOff x="0" y="0"/>
+          <a:chExt cx="0" cy="0"/>
+        </a:xfrm>
+      </p:grpSpPr>
+      <p:pic>
+        <p:nvPicPr>
+          <p:cNvPr id="1028" name="Picture 4">
+            <a:extLst>
+              <a:ext uri="{FF2B5EF4-FFF2-40B4-BE49-F238E27FC236}">
+                <a16:creationId xmlns:a16="http://schemas.microsoft.com/office/drawing/2014/main" id="{D5988180-073B-4A88-81D6-8B606BC759B7}"/>
+              </a:ext>
+            </a:extLst>
+          </p:cNvPr>
+          <p:cNvPicPr>
+            <a:picLocks noChangeAspect="1" noChangeArrowheads="1"/>
+          </p:cNvPicPr>
+          <p:nvPr/>
+        </p:nvPicPr>
+        <p:blipFill>
+          <a:blip r:embed="rId3">
+            <a:extLst>
+              <a:ext uri="{28A0092B-C50C-407E-A947-70E740481C1C}">
+                <a14:useLocalDpi xmlns:a14="http://schemas.microsoft.com/office/drawing/2010/main" val="0"/>
+              </a:ext>
+            </a:extLst>
+          </a:blip>
+          <a:srcRect/>
+          <a:stretch>
+            <a:fillRect/>
+          </a:stretch>
+        </p:blipFill>
+        <p:spPr bwMode="auto">
+          <a:xfrm>
+            <a:off x="1633491" y="812800"/>
+            <a:ext cx="7443834" cy="4364037"/>
+          </a:xfrm>
+          <a:prstGeom prst="rect">
+            <a:avLst/>
+          </a:prstGeom>
+          <a:noFill/>
+          <a:extLst>
+            <a:ext uri="{909E8E84-426E-40DD-AFC4-6F175D3DCCD1}">
+              <a14:hiddenFill xmlns:a14="http://schemas.microsoft.com/office/drawing/2010/main">
+                <a:solidFill>
+                  <a:srgbClr val="FFFFFF"/>
+                </a:solidFill>
+              </a14:hiddenFill>
+            </a:ext>
+          </a:extLst>
+        </p:spPr>
+      </p:pic>
+    </p:spTree>
+    <p:extLst>
+      <p:ext uri="{BB962C8B-B14F-4D97-AF65-F5344CB8AC3E}">
+        <p14:creationId xmlns:p14="http://schemas.microsoft.com/office/powerpoint/2010/main" val="2757034118"/>
+      </p:ext>
+    </p:extLst>
+  </p:cSld>
+  <p:clrMapOvr>
+    <a:masterClrMapping/>
+  </p:clrMapOvr>
+</p:sld>
+</file>
+
 <file path=ppt/theme/theme1.xml><?xml version="1.0" encoding="utf-8"?>
 <a:theme xmlns:a="http://schemas.openxmlformats.org/drawingml/2006/main" name="Office 主题">
   <a:themeElements>

</xml_diff>